<commit_message>
update slide with sinatra
</commit_message>
<xml_diff>
--- a/From Rack to Sinatra.pptx
+++ b/From Rack to Sinatra.pptx
@@ -2,119 +2,122 @@
 <file path=ppt/presentation.xml><?xml version="1.0" encoding="utf-8"?>
 <p:presentation xmlns:a="http://schemas.openxmlformats.org/drawingml/2006/main" xmlns:r="http://schemas.openxmlformats.org/officeDocument/2006/relationships" xmlns:p="http://schemas.openxmlformats.org/presentationml/2006/main">
   <p:sldMasterIdLst>
-    <p:sldMasterId id="2147483648" r:id="rId1"/>
+    <p:sldMasterId id="2147483648" r:id="rId5"/>
   </p:sldMasterIdLst>
   <p:notesMasterIdLst>
-    <p:notesMasterId r:id="rId21"/>
+    <p:notesMasterId r:id="rId7"/>
   </p:notesMasterIdLst>
   <p:sldIdLst>
-    <p:sldId id="256" r:id="rId2"/>
-    <p:sldId id="257" r:id="rId3"/>
-    <p:sldId id="258" r:id="rId4"/>
-    <p:sldId id="259" r:id="rId5"/>
-    <p:sldId id="260" r:id="rId6"/>
-    <p:sldId id="261" r:id="rId7"/>
-    <p:sldId id="262" r:id="rId8"/>
-    <p:sldId id="263" r:id="rId9"/>
-    <p:sldId id="264" r:id="rId10"/>
-    <p:sldId id="266" r:id="rId11"/>
-    <p:sldId id="267" r:id="rId12"/>
-    <p:sldId id="268" r:id="rId13"/>
-    <p:sldId id="269" r:id="rId14"/>
-    <p:sldId id="270" r:id="rId15"/>
-    <p:sldId id="271" r:id="rId16"/>
-    <p:sldId id="272" r:id="rId17"/>
-    <p:sldId id="273" r:id="rId18"/>
-    <p:sldId id="274" r:id="rId19"/>
-    <p:sldId id="275" r:id="rId20"/>
+    <p:sldId id="256" r:id="rId8"/>
+    <p:sldId id="257" r:id="rId9"/>
+    <p:sldId id="258" r:id="rId10"/>
+    <p:sldId id="259" r:id="rId11"/>
+    <p:sldId id="260" r:id="rId12"/>
+    <p:sldId id="261" r:id="rId13"/>
+    <p:sldId id="262" r:id="rId14"/>
+    <p:sldId id="263" r:id="rId15"/>
+    <p:sldId id="264" r:id="rId16"/>
+    <p:sldId id="265" r:id="rId17"/>
+    <p:sldId id="266" r:id="rId18"/>
+    <p:sldId id="267" r:id="rId19"/>
+    <p:sldId id="268" r:id="rId20"/>
+    <p:sldId id="269" r:id="rId21"/>
+    <p:sldId id="270" r:id="rId22"/>
+    <p:sldId id="271" r:id="rId23"/>
+    <p:sldId id="272" r:id="rId24"/>
+    <p:sldId id="273" r:id="rId25"/>
+    <p:sldId id="274" r:id="rId26"/>
+    <p:sldId id="275" r:id="rId27"/>
+    <p:sldId id="276" r:id="rId28"/>
+    <p:sldId id="277" r:id="rId29"/>
+    <p:sldId id="278" r:id="rId30"/>
   </p:sldIdLst>
-  <p:sldSz cx="9144000" cy="6858000" type="screen4x3"/>
+  <p:sldSz cx="9144000" cy="6858000"/>
   <p:notesSz cx="6858000" cy="9144000"/>
   <p:defaultTextStyle>
     <a:lvl1pPr defTabSz="457200">
       <a:defRPr>
-        <a:latin typeface="Calibri"/>
-        <a:ea typeface="Calibri"/>
-        <a:cs typeface="Calibri"/>
-        <a:sym typeface="Calibri"/>
+        <a:latin typeface="+mj-lt"/>
+        <a:ea typeface="+mj-ea"/>
+        <a:cs typeface="+mj-cs"/>
+        <a:sym typeface="Helvetica"/>
       </a:defRPr>
     </a:lvl1pPr>
-    <a:lvl2pPr indent="457200" defTabSz="457200">
+    <a:lvl2pPr defTabSz="457200">
       <a:defRPr>
-        <a:latin typeface="Calibri"/>
-        <a:ea typeface="Calibri"/>
-        <a:cs typeface="Calibri"/>
-        <a:sym typeface="Calibri"/>
+        <a:latin typeface="+mj-lt"/>
+        <a:ea typeface="+mj-ea"/>
+        <a:cs typeface="+mj-cs"/>
+        <a:sym typeface="Helvetica"/>
       </a:defRPr>
     </a:lvl2pPr>
-    <a:lvl3pPr indent="914400" defTabSz="457200">
+    <a:lvl3pPr defTabSz="457200">
       <a:defRPr>
-        <a:latin typeface="Calibri"/>
-        <a:ea typeface="Calibri"/>
-        <a:cs typeface="Calibri"/>
-        <a:sym typeface="Calibri"/>
+        <a:latin typeface="+mj-lt"/>
+        <a:ea typeface="+mj-ea"/>
+        <a:cs typeface="+mj-cs"/>
+        <a:sym typeface="Helvetica"/>
       </a:defRPr>
     </a:lvl3pPr>
-    <a:lvl4pPr indent="1371600" defTabSz="457200">
+    <a:lvl4pPr defTabSz="457200">
       <a:defRPr>
-        <a:latin typeface="Calibri"/>
-        <a:ea typeface="Calibri"/>
-        <a:cs typeface="Calibri"/>
-        <a:sym typeface="Calibri"/>
+        <a:latin typeface="+mj-lt"/>
+        <a:ea typeface="+mj-ea"/>
+        <a:cs typeface="+mj-cs"/>
+        <a:sym typeface="Helvetica"/>
       </a:defRPr>
     </a:lvl4pPr>
-    <a:lvl5pPr indent="1828800" defTabSz="457200">
+    <a:lvl5pPr defTabSz="457200">
       <a:defRPr>
-        <a:latin typeface="Calibri"/>
-        <a:ea typeface="Calibri"/>
-        <a:cs typeface="Calibri"/>
-        <a:sym typeface="Calibri"/>
+        <a:latin typeface="+mj-lt"/>
+        <a:ea typeface="+mj-ea"/>
+        <a:cs typeface="+mj-cs"/>
+        <a:sym typeface="Helvetica"/>
       </a:defRPr>
     </a:lvl5pPr>
-    <a:lvl6pPr indent="2286000" defTabSz="457200">
+    <a:lvl6pPr defTabSz="457200">
       <a:defRPr>
-        <a:latin typeface="Calibri"/>
-        <a:ea typeface="Calibri"/>
-        <a:cs typeface="Calibri"/>
-        <a:sym typeface="Calibri"/>
+        <a:latin typeface="+mj-lt"/>
+        <a:ea typeface="+mj-ea"/>
+        <a:cs typeface="+mj-cs"/>
+        <a:sym typeface="Helvetica"/>
       </a:defRPr>
     </a:lvl6pPr>
-    <a:lvl7pPr indent="2743200" defTabSz="457200">
+    <a:lvl7pPr defTabSz="457200">
       <a:defRPr>
-        <a:latin typeface="Calibri"/>
-        <a:ea typeface="Calibri"/>
-        <a:cs typeface="Calibri"/>
-        <a:sym typeface="Calibri"/>
+        <a:latin typeface="+mj-lt"/>
+        <a:ea typeface="+mj-ea"/>
+        <a:cs typeface="+mj-cs"/>
+        <a:sym typeface="Helvetica"/>
       </a:defRPr>
     </a:lvl7pPr>
-    <a:lvl8pPr indent="3200400" defTabSz="457200">
+    <a:lvl8pPr defTabSz="457200">
       <a:defRPr>
-        <a:latin typeface="Calibri"/>
-        <a:ea typeface="Calibri"/>
-        <a:cs typeface="Calibri"/>
-        <a:sym typeface="Calibri"/>
+        <a:latin typeface="+mj-lt"/>
+        <a:ea typeface="+mj-ea"/>
+        <a:cs typeface="+mj-cs"/>
+        <a:sym typeface="Helvetica"/>
       </a:defRPr>
     </a:lvl8pPr>
-    <a:lvl9pPr indent="3657600" defTabSz="457200">
+    <a:lvl9pPr defTabSz="457200">
       <a:defRPr>
-        <a:latin typeface="Calibri"/>
-        <a:ea typeface="Calibri"/>
-        <a:cs typeface="Calibri"/>
-        <a:sym typeface="Calibri"/>
+        <a:latin typeface="+mj-lt"/>
+        <a:ea typeface="+mj-ea"/>
+        <a:cs typeface="+mj-cs"/>
+        <a:sym typeface="Helvetica"/>
       </a:defRPr>
     </a:lvl9pPr>
   </p:defaultTextStyle>
 </p:presentation>
 </file>
 
+<file path=ppt/commentAuthors.xml><?xml version="1.0" encoding="utf-8"?>
+<p:cmAuthorLst xmlns:a="http://schemas.openxmlformats.org/drawingml/2006/main" xmlns:r="http://schemas.openxmlformats.org/officeDocument/2006/relationships" xmlns:p="http://schemas.openxmlformats.org/presentationml/2006/main"/>
+</file>
+
 <file path=ppt/notesMasters/notesMaster1.xml><?xml version="1.0" encoding="utf-8"?>
 <p:notesMaster xmlns:a="http://schemas.openxmlformats.org/drawingml/2006/main" xmlns:r="http://schemas.openxmlformats.org/officeDocument/2006/relationships" xmlns:p="http://schemas.openxmlformats.org/presentationml/2006/main">
   <p:cSld>
-    <p:bg>
-      <p:bgRef idx="1001">
-        <a:schemeClr val="bg1"/>
-      </p:bgRef>
-    </p:bg>
     <p:spTree>
       <p:nvGrpSpPr>
         <p:cNvPr id="1" name=""/>
@@ -132,9 +135,7 @@
       <p:sp>
         <p:nvSpPr>
           <p:cNvPr id="46" name="Shape 46"/>
-          <p:cNvSpPr>
-            <a:spLocks noGrp="1" noRot="1" noChangeAspect="1"/>
-          </p:cNvSpPr>
+          <p:cNvSpPr/>
           <p:nvPr>
             <p:ph type="sldImg"/>
           </p:nvPr>
@@ -153,16 +154,13 @@
           <a:lstStyle/>
           <a:p>
             <a:pPr lvl="0"/>
-            <a:endParaRPr/>
           </a:p>
         </p:txBody>
       </p:sp>
       <p:sp>
         <p:nvSpPr>
           <p:cNvPr id="47" name="Shape 47"/>
-          <p:cNvSpPr>
-            <a:spLocks noGrp="1"/>
-          </p:cNvSpPr>
+          <p:cNvSpPr/>
           <p:nvPr>
             <p:ph type="body" sz="quarter" idx="1"/>
           </p:nvPr>
@@ -181,16 +179,10 @@
           <a:lstStyle/>
           <a:p>
             <a:pPr lvl="0"/>
-            <a:endParaRPr/>
           </a:p>
         </p:txBody>
       </p:sp>
     </p:spTree>
-    <p:extLst>
-      <p:ext uri="{BB962C8B-B14F-4D97-AF65-F5344CB8AC3E}">
-        <p14:creationId xmlns:p14="http://schemas.microsoft.com/office/powerpoint/2010/main" val="2845708291"/>
-      </p:ext>
-    </p:extLst>
   </p:cSld>
   <p:clrMap bg1="lt1" tx1="dk1" bg2="lt2" tx2="dk2" accent1="accent1" accent2="accent2" accent3="accent3" accent4="accent4" accent5="accent5" accent6="accent6" hlink="hlink" folHlink="folHlink"/>
   <p:notesStyle>
@@ -199,9 +191,9 @@
         <a:spcPct val="117999"/>
       </a:lnSpc>
       <a:defRPr sz="2200">
-        <a:latin typeface="+mj-lt"/>
-        <a:ea typeface="+mj-ea"/>
-        <a:cs typeface="+mj-cs"/>
+        <a:latin typeface="+mn-lt"/>
+        <a:ea typeface="+mn-ea"/>
+        <a:cs typeface="+mn-cs"/>
         <a:sym typeface="Helvetica Neue"/>
       </a:defRPr>
     </a:lvl1pPr>
@@ -210,9 +202,9 @@
         <a:spcPct val="117999"/>
       </a:lnSpc>
       <a:defRPr sz="2200">
-        <a:latin typeface="+mj-lt"/>
-        <a:ea typeface="+mj-ea"/>
-        <a:cs typeface="+mj-cs"/>
+        <a:latin typeface="+mn-lt"/>
+        <a:ea typeface="+mn-ea"/>
+        <a:cs typeface="+mn-cs"/>
         <a:sym typeface="Helvetica Neue"/>
       </a:defRPr>
     </a:lvl2pPr>
@@ -221,9 +213,9 @@
         <a:spcPct val="117999"/>
       </a:lnSpc>
       <a:defRPr sz="2200">
-        <a:latin typeface="+mj-lt"/>
-        <a:ea typeface="+mj-ea"/>
-        <a:cs typeface="+mj-cs"/>
+        <a:latin typeface="+mn-lt"/>
+        <a:ea typeface="+mn-ea"/>
+        <a:cs typeface="+mn-cs"/>
         <a:sym typeface="Helvetica Neue"/>
       </a:defRPr>
     </a:lvl3pPr>
@@ -232,9 +224,9 @@
         <a:spcPct val="117999"/>
       </a:lnSpc>
       <a:defRPr sz="2200">
-        <a:latin typeface="+mj-lt"/>
-        <a:ea typeface="+mj-ea"/>
-        <a:cs typeface="+mj-cs"/>
+        <a:latin typeface="+mn-lt"/>
+        <a:ea typeface="+mn-ea"/>
+        <a:cs typeface="+mn-cs"/>
         <a:sym typeface="Helvetica Neue"/>
       </a:defRPr>
     </a:lvl4pPr>
@@ -243,9 +235,9 @@
         <a:spcPct val="117999"/>
       </a:lnSpc>
       <a:defRPr sz="2200">
-        <a:latin typeface="+mj-lt"/>
-        <a:ea typeface="+mj-ea"/>
-        <a:cs typeface="+mj-cs"/>
+        <a:latin typeface="+mn-lt"/>
+        <a:ea typeface="+mn-ea"/>
+        <a:cs typeface="+mn-cs"/>
         <a:sym typeface="Helvetica Neue"/>
       </a:defRPr>
     </a:lvl5pPr>
@@ -254,9 +246,9 @@
         <a:spcPct val="117999"/>
       </a:lnSpc>
       <a:defRPr sz="2200">
-        <a:latin typeface="+mj-lt"/>
-        <a:ea typeface="+mj-ea"/>
-        <a:cs typeface="+mj-cs"/>
+        <a:latin typeface="+mn-lt"/>
+        <a:ea typeface="+mn-ea"/>
+        <a:cs typeface="+mn-cs"/>
         <a:sym typeface="Helvetica Neue"/>
       </a:defRPr>
     </a:lvl6pPr>
@@ -265,9 +257,9 @@
         <a:spcPct val="117999"/>
       </a:lnSpc>
       <a:defRPr sz="2200">
-        <a:latin typeface="+mj-lt"/>
-        <a:ea typeface="+mj-ea"/>
-        <a:cs typeface="+mj-cs"/>
+        <a:latin typeface="+mn-lt"/>
+        <a:ea typeface="+mn-ea"/>
+        <a:cs typeface="+mn-cs"/>
         <a:sym typeface="Helvetica Neue"/>
       </a:defRPr>
     </a:lvl7pPr>
@@ -276,9 +268,9 @@
         <a:spcPct val="117999"/>
       </a:lnSpc>
       <a:defRPr sz="2200">
-        <a:latin typeface="+mj-lt"/>
-        <a:ea typeface="+mj-ea"/>
-        <a:cs typeface="+mj-cs"/>
+        <a:latin typeface="+mn-lt"/>
+        <a:ea typeface="+mn-ea"/>
+        <a:cs typeface="+mn-cs"/>
         <a:sym typeface="Helvetica Neue"/>
       </a:defRPr>
     </a:lvl8pPr>
@@ -287,9 +279,9 @@
         <a:spcPct val="117999"/>
       </a:lnSpc>
       <a:defRPr sz="2200">
-        <a:latin typeface="+mj-lt"/>
-        <a:ea typeface="+mj-ea"/>
-        <a:cs typeface="+mj-cs"/>
+        <a:latin typeface="+mn-lt"/>
+        <a:ea typeface="+mn-ea"/>
+        <a:cs typeface="+mn-cs"/>
         <a:sym typeface="Helvetica Neue"/>
       </a:defRPr>
     </a:lvl9pPr>
@@ -298,7 +290,7 @@
 </file>
 
 <file path=ppt/notesSlides/notesSlide1.xml><?xml version="1.0" encoding="utf-8"?>
-<p:notes xmlns:a="http://schemas.openxmlformats.org/drawingml/2006/main" xmlns:r="http://schemas.openxmlformats.org/officeDocument/2006/relationships" xmlns:p="http://schemas.openxmlformats.org/presentationml/2006/main">
+<p:notes xmlns:a="http://schemas.openxmlformats.org/drawingml/2006/main" xmlns:r="http://schemas.openxmlformats.org/officeDocument/2006/relationships" xmlns:p="http://schemas.openxmlformats.org/presentationml/2006/main" showMasterSp="1" showMasterPhAnim="1">
   <p:cSld>
     <p:spTree>
       <p:nvGrpSpPr>
@@ -317,9 +309,7 @@
       <p:sp>
         <p:nvSpPr>
           <p:cNvPr id="64" name="Shape 64"/>
-          <p:cNvSpPr>
-            <a:spLocks noGrp="1" noRot="1" noChangeAspect="1"/>
-          </p:cNvSpPr>
+          <p:cNvSpPr/>
           <p:nvPr>
             <p:ph type="sldImg"/>
           </p:nvPr>
@@ -334,16 +324,13 @@
           <a:lstStyle/>
           <a:p>
             <a:pPr lvl="0"/>
-            <a:endParaRPr/>
           </a:p>
         </p:txBody>
       </p:sp>
       <p:sp>
         <p:nvSpPr>
           <p:cNvPr id="65" name="Shape 65"/>
-          <p:cNvSpPr>
-            <a:spLocks noGrp="1"/>
-          </p:cNvSpPr>
+          <p:cNvSpPr/>
           <p:nvPr>
             <p:ph type="body" sz="quarter" idx="1"/>
           </p:nvPr>
@@ -355,37 +342,27 @@
         </p:spPr>
         <p:txBody>
           <a:bodyPr/>
-          <a:lstStyle/>
-          <a:p>
-            <a:pPr lvl="0">
+          <a:lstStyle>
+            <a:lvl1pPr>
               <a:lnSpc>
                 <a:spcPct val="100000"/>
               </a:lnSpc>
-              <a:defRPr sz="1800"/>
-            </a:pPr>
-            <a:r>
-              <a:rPr sz="1200">
+              <a:defRPr sz="1200">
                 <a:latin typeface="Calibri"/>
                 <a:ea typeface="Calibri"/>
                 <a:cs typeface="Calibri"/>
                 <a:sym typeface="Calibri"/>
-              </a:rPr>
+              </a:defRPr>
+            </a:lvl1pPr>
+          </a:lstStyle>
+          <a:p>
+            <a:pPr lvl="0">
+              <a:defRPr sz="1800"/>
+            </a:pPr>
+            <a:r>
+              <a:rPr sz="1200"/>
               <a:t> A HttpServer is bound to an IP address and port number and listens for incoming TCP connections from clients on this address. </a:t>
             </a:r>
-          </a:p>
-          <a:p>
-            <a:pPr lvl="0">
-              <a:lnSpc>
-                <a:spcPct val="100000"/>
-              </a:lnSpc>
-              <a:defRPr sz="1800"/>
-            </a:pPr>
-            <a:endParaRPr sz="1200">
-              <a:latin typeface="Calibri"/>
-              <a:ea typeface="Calibri"/>
-              <a:cs typeface="Calibri"/>
-              <a:sym typeface="Calibri"/>
-            </a:endParaRPr>
           </a:p>
         </p:txBody>
       </p:sp>
@@ -398,7 +375,7 @@
 </file>
 
 <file path=ppt/notesSlides/notesSlide2.xml><?xml version="1.0" encoding="utf-8"?>
-<p:notes xmlns:a="http://schemas.openxmlformats.org/drawingml/2006/main" xmlns:r="http://schemas.openxmlformats.org/officeDocument/2006/relationships" xmlns:p="http://schemas.openxmlformats.org/presentationml/2006/main">
+<p:notes xmlns:a="http://schemas.openxmlformats.org/drawingml/2006/main" xmlns:r="http://schemas.openxmlformats.org/officeDocument/2006/relationships" xmlns:p="http://schemas.openxmlformats.org/presentationml/2006/main" showMasterSp="1" showMasterPhAnim="1">
   <p:cSld>
     <p:spTree>
       <p:nvGrpSpPr>
@@ -416,10 +393,8 @@
       </p:grpSpPr>
       <p:sp>
         <p:nvSpPr>
-          <p:cNvPr id="84" name="Shape 84"/>
-          <p:cNvSpPr>
-            <a:spLocks noGrp="1" noRot="1" noChangeAspect="1"/>
-          </p:cNvSpPr>
+          <p:cNvPr id="82" name="Shape 82"/>
+          <p:cNvSpPr/>
           <p:nvPr>
             <p:ph type="sldImg"/>
           </p:nvPr>
@@ -434,16 +409,13 @@
           <a:lstStyle/>
           <a:p>
             <a:pPr lvl="0"/>
-            <a:endParaRPr/>
           </a:p>
         </p:txBody>
       </p:sp>
       <p:sp>
         <p:nvSpPr>
-          <p:cNvPr id="85" name="Shape 85"/>
-          <p:cNvSpPr>
-            <a:spLocks noGrp="1"/>
-          </p:cNvSpPr>
+          <p:cNvPr id="83" name="Shape 83"/>
+          <p:cNvSpPr/>
           <p:nvPr>
             <p:ph type="body" sz="quarter" idx="1"/>
           </p:nvPr>
@@ -488,7 +460,7 @@
 </file>
 
 <file path=ppt/notesSlides/notesSlide3.xml><?xml version="1.0" encoding="utf-8"?>
-<p:notes xmlns:a="http://schemas.openxmlformats.org/drawingml/2006/main" xmlns:r="http://schemas.openxmlformats.org/officeDocument/2006/relationships" xmlns:p="http://schemas.openxmlformats.org/presentationml/2006/main">
+<p:notes xmlns:a="http://schemas.openxmlformats.org/drawingml/2006/main" xmlns:r="http://schemas.openxmlformats.org/officeDocument/2006/relationships" xmlns:p="http://schemas.openxmlformats.org/presentationml/2006/main" showMasterSp="1" showMasterPhAnim="1">
   <p:cSld>
     <p:spTree>
       <p:nvGrpSpPr>
@@ -506,10 +478,8 @@
       </p:grpSpPr>
       <p:sp>
         <p:nvSpPr>
-          <p:cNvPr id="90" name="Shape 90"/>
-          <p:cNvSpPr>
-            <a:spLocks noGrp="1" noRot="1" noChangeAspect="1"/>
-          </p:cNvSpPr>
+          <p:cNvPr id="88" name="Shape 88"/>
+          <p:cNvSpPr/>
           <p:nvPr>
             <p:ph type="sldImg"/>
           </p:nvPr>
@@ -524,16 +494,13 @@
           <a:lstStyle/>
           <a:p>
             <a:pPr lvl="0"/>
-            <a:endParaRPr/>
           </a:p>
         </p:txBody>
       </p:sp>
       <p:sp>
         <p:nvSpPr>
-          <p:cNvPr id="91" name="Shape 91"/>
-          <p:cNvSpPr>
-            <a:spLocks noGrp="1"/>
-          </p:cNvSpPr>
+          <p:cNvPr id="89" name="Shape 89"/>
+          <p:cNvSpPr/>
           <p:nvPr>
             <p:ph type="body" sz="quarter" idx="1"/>
           </p:nvPr>
@@ -578,7 +545,7 @@
 </file>
 
 <file path=ppt/notesSlides/notesSlide4.xml><?xml version="1.0" encoding="utf-8"?>
-<p:notes xmlns:a="http://schemas.openxmlformats.org/drawingml/2006/main" xmlns:r="http://schemas.openxmlformats.org/officeDocument/2006/relationships" xmlns:p="http://schemas.openxmlformats.org/presentationml/2006/main">
+<p:notes xmlns:a="http://schemas.openxmlformats.org/drawingml/2006/main" xmlns:r="http://schemas.openxmlformats.org/officeDocument/2006/relationships" xmlns:p="http://schemas.openxmlformats.org/presentationml/2006/main" showMasterSp="1" showMasterPhAnim="1">
   <p:cSld>
     <p:spTree>
       <p:nvGrpSpPr>
@@ -596,10 +563,8 @@
       </p:grpSpPr>
       <p:sp>
         <p:nvSpPr>
-          <p:cNvPr id="96" name="Shape 96"/>
-          <p:cNvSpPr>
-            <a:spLocks noGrp="1" noRot="1" noChangeAspect="1"/>
-          </p:cNvSpPr>
+          <p:cNvPr id="94" name="Shape 94"/>
+          <p:cNvSpPr/>
           <p:nvPr>
             <p:ph type="sldImg"/>
           </p:nvPr>
@@ -614,16 +579,13 @@
           <a:lstStyle/>
           <a:p>
             <a:pPr lvl="0"/>
-            <a:endParaRPr/>
           </a:p>
         </p:txBody>
       </p:sp>
       <p:sp>
         <p:nvSpPr>
-          <p:cNvPr id="97" name="Shape 97"/>
-          <p:cNvSpPr>
-            <a:spLocks noGrp="1"/>
-          </p:cNvSpPr>
+          <p:cNvPr id="95" name="Shape 95"/>
+          <p:cNvSpPr/>
           <p:nvPr>
             <p:ph type="body" sz="quarter" idx="1"/>
           </p:nvPr>
@@ -668,7 +630,7 @@
 </file>
 
 <file path=ppt/notesSlides/notesSlide5.xml><?xml version="1.0" encoding="utf-8"?>
-<p:notes xmlns:a="http://schemas.openxmlformats.org/drawingml/2006/main" xmlns:r="http://schemas.openxmlformats.org/officeDocument/2006/relationships" xmlns:p="http://schemas.openxmlformats.org/presentationml/2006/main">
+<p:notes xmlns:a="http://schemas.openxmlformats.org/drawingml/2006/main" xmlns:r="http://schemas.openxmlformats.org/officeDocument/2006/relationships" xmlns:p="http://schemas.openxmlformats.org/presentationml/2006/main" showMasterSp="1" showMasterPhAnim="1">
   <p:cSld>
     <p:spTree>
       <p:nvGrpSpPr>
@@ -686,10 +648,8 @@
       </p:grpSpPr>
       <p:sp>
         <p:nvSpPr>
-          <p:cNvPr id="100" name="Shape 100"/>
-          <p:cNvSpPr>
-            <a:spLocks noGrp="1" noRot="1" noChangeAspect="1"/>
-          </p:cNvSpPr>
+          <p:cNvPr id="98" name="Shape 98"/>
+          <p:cNvSpPr/>
           <p:nvPr>
             <p:ph type="sldImg"/>
           </p:nvPr>
@@ -704,16 +664,13 @@
           <a:lstStyle/>
           <a:p>
             <a:pPr lvl="0"/>
-            <a:endParaRPr/>
           </a:p>
         </p:txBody>
       </p:sp>
       <p:sp>
         <p:nvSpPr>
-          <p:cNvPr id="101" name="Shape 101"/>
-          <p:cNvSpPr>
-            <a:spLocks noGrp="1"/>
-          </p:cNvSpPr>
+          <p:cNvPr id="99" name="Shape 99"/>
+          <p:cNvSpPr/>
           <p:nvPr>
             <p:ph type="body" sz="quarter" idx="1"/>
           </p:nvPr>
@@ -773,20 +730,6 @@
               </a:rPr>
               <a:t>post</a:t>
             </a:r>
-          </a:p>
-          <a:p>
-            <a:pPr lvl="0">
-              <a:lnSpc>
-                <a:spcPct val="100000"/>
-              </a:lnSpc>
-              <a:defRPr sz="1800"/>
-            </a:pPr>
-            <a:endParaRPr sz="1200">
-              <a:latin typeface="Calibri"/>
-              <a:ea typeface="Calibri"/>
-              <a:cs typeface="Calibri"/>
-              <a:sym typeface="Calibri"/>
-            </a:endParaRPr>
           </a:p>
         </p:txBody>
       </p:sp>
@@ -799,7 +742,7 @@
 </file>
 
 <file path=ppt/notesSlides/notesSlide6.xml><?xml version="1.0" encoding="utf-8"?>
-<p:notes xmlns:a="http://schemas.openxmlformats.org/drawingml/2006/main" xmlns:r="http://schemas.openxmlformats.org/officeDocument/2006/relationships" xmlns:p="http://schemas.openxmlformats.org/presentationml/2006/main">
+<p:notes xmlns:a="http://schemas.openxmlformats.org/drawingml/2006/main" xmlns:r="http://schemas.openxmlformats.org/officeDocument/2006/relationships" xmlns:p="http://schemas.openxmlformats.org/presentationml/2006/main" showMasterSp="1" showMasterPhAnim="1">
   <p:cSld>
     <p:spTree>
       <p:nvGrpSpPr>
@@ -817,10 +760,8 @@
       </p:grpSpPr>
       <p:sp>
         <p:nvSpPr>
-          <p:cNvPr id="104" name="Shape 104"/>
-          <p:cNvSpPr>
-            <a:spLocks noGrp="1" noRot="1" noChangeAspect="1"/>
-          </p:cNvSpPr>
+          <p:cNvPr id="102" name="Shape 102"/>
+          <p:cNvSpPr/>
           <p:nvPr>
             <p:ph type="sldImg"/>
           </p:nvPr>
@@ -835,16 +776,13 @@
           <a:lstStyle/>
           <a:p>
             <a:pPr lvl="0"/>
-            <a:endParaRPr/>
           </a:p>
         </p:txBody>
       </p:sp>
       <p:sp>
         <p:nvSpPr>
-          <p:cNvPr id="105" name="Shape 105"/>
-          <p:cNvSpPr>
-            <a:spLocks noGrp="1"/>
-          </p:cNvSpPr>
+          <p:cNvPr id="103" name="Shape 103"/>
+          <p:cNvSpPr/>
           <p:nvPr>
             <p:ph type="body" sz="quarter" idx="1"/>
           </p:nvPr>
@@ -889,7 +827,7 @@
 </file>
 
 <file path=ppt/notesSlides/notesSlide7.xml><?xml version="1.0" encoding="utf-8"?>
-<p:notes xmlns:a="http://schemas.openxmlformats.org/drawingml/2006/main" xmlns:r="http://schemas.openxmlformats.org/officeDocument/2006/relationships" xmlns:p="http://schemas.openxmlformats.org/presentationml/2006/main">
+<p:notes xmlns:a="http://schemas.openxmlformats.org/drawingml/2006/main" xmlns:r="http://schemas.openxmlformats.org/officeDocument/2006/relationships" xmlns:p="http://schemas.openxmlformats.org/presentationml/2006/main" showMasterSp="1" showMasterPhAnim="1">
   <p:cSld>
     <p:spTree>
       <p:nvGrpSpPr>
@@ -907,10 +845,8 @@
       </p:grpSpPr>
       <p:sp>
         <p:nvSpPr>
-          <p:cNvPr id="108" name="Shape 108"/>
-          <p:cNvSpPr>
-            <a:spLocks noGrp="1" noRot="1" noChangeAspect="1"/>
-          </p:cNvSpPr>
+          <p:cNvPr id="106" name="Shape 106"/>
+          <p:cNvSpPr/>
           <p:nvPr>
             <p:ph type="sldImg"/>
           </p:nvPr>
@@ -925,16 +861,13 @@
           <a:lstStyle/>
           <a:p>
             <a:pPr lvl="0"/>
-            <a:endParaRPr/>
           </a:p>
         </p:txBody>
       </p:sp>
       <p:sp>
         <p:nvSpPr>
-          <p:cNvPr id="109" name="Shape 109"/>
-          <p:cNvSpPr>
-            <a:spLocks noGrp="1"/>
-          </p:cNvSpPr>
+          <p:cNvPr id="107" name="Shape 107"/>
+          <p:cNvSpPr/>
           <p:nvPr>
             <p:ph type="body" sz="quarter" idx="1"/>
           </p:nvPr>
@@ -994,20 +927,6 @@
               </a:rPr>
               <a:t>post</a:t>
             </a:r>
-          </a:p>
-          <a:p>
-            <a:pPr lvl="0">
-              <a:lnSpc>
-                <a:spcPct val="100000"/>
-              </a:lnSpc>
-              <a:defRPr sz="1800"/>
-            </a:pPr>
-            <a:endParaRPr sz="1200">
-              <a:latin typeface="Calibri"/>
-              <a:ea typeface="Calibri"/>
-              <a:cs typeface="Calibri"/>
-              <a:sym typeface="Calibri"/>
-            </a:endParaRPr>
           </a:p>
         </p:txBody>
       </p:sp>
@@ -1020,7 +939,7 @@
 </file>
 
 <file path=ppt/notesSlides/notesSlide8.xml><?xml version="1.0" encoding="utf-8"?>
-<p:notes xmlns:a="http://schemas.openxmlformats.org/drawingml/2006/main" xmlns:r="http://schemas.openxmlformats.org/officeDocument/2006/relationships" xmlns:p="http://schemas.openxmlformats.org/presentationml/2006/main">
+<p:notes xmlns:a="http://schemas.openxmlformats.org/drawingml/2006/main" xmlns:r="http://schemas.openxmlformats.org/officeDocument/2006/relationships" xmlns:p="http://schemas.openxmlformats.org/presentationml/2006/main" showMasterSp="1" showMasterPhAnim="1">
   <p:cSld>
     <p:spTree>
       <p:nvGrpSpPr>
@@ -1038,10 +957,8 @@
       </p:grpSpPr>
       <p:sp>
         <p:nvSpPr>
-          <p:cNvPr id="112" name="Shape 112"/>
-          <p:cNvSpPr>
-            <a:spLocks noGrp="1" noRot="1" noChangeAspect="1"/>
-          </p:cNvSpPr>
+          <p:cNvPr id="110" name="Shape 110"/>
+          <p:cNvSpPr/>
           <p:nvPr>
             <p:ph type="sldImg"/>
           </p:nvPr>
@@ -1056,16 +973,13 @@
           <a:lstStyle/>
           <a:p>
             <a:pPr lvl="0"/>
-            <a:endParaRPr/>
           </a:p>
         </p:txBody>
       </p:sp>
       <p:sp>
         <p:nvSpPr>
-          <p:cNvPr id="113" name="Shape 113"/>
-          <p:cNvSpPr>
-            <a:spLocks noGrp="1"/>
-          </p:cNvSpPr>
+          <p:cNvPr id="111" name="Shape 111"/>
+          <p:cNvSpPr/>
           <p:nvPr>
             <p:ph type="body" sz="quarter" idx="1"/>
           </p:nvPr>
@@ -1125,20 +1039,6 @@
               </a:rPr>
               <a:t>post</a:t>
             </a:r>
-          </a:p>
-          <a:p>
-            <a:pPr lvl="0">
-              <a:lnSpc>
-                <a:spcPct val="100000"/>
-              </a:lnSpc>
-              <a:defRPr sz="1800"/>
-            </a:pPr>
-            <a:endParaRPr sz="1200">
-              <a:latin typeface="Calibri"/>
-              <a:ea typeface="Calibri"/>
-              <a:cs typeface="Calibri"/>
-              <a:sym typeface="Calibri"/>
-            </a:endParaRPr>
           </a:p>
         </p:txBody>
       </p:sp>
@@ -1151,7 +1051,7 @@
 </file>
 
 <file path=ppt/slideLayouts/slideLayout1.xml><?xml version="1.0" encoding="utf-8"?>
-<p:sldLayout xmlns:a="http://schemas.openxmlformats.org/drawingml/2006/main" xmlns:r="http://schemas.openxmlformats.org/officeDocument/2006/relationships" xmlns:p="http://schemas.openxmlformats.org/presentationml/2006/main" type="tx">
+<p:sldLayout xmlns:a="http://schemas.openxmlformats.org/drawingml/2006/main" xmlns:r="http://schemas.openxmlformats.org/officeDocument/2006/relationships" xmlns:p="http://schemas.openxmlformats.org/presentationml/2006/main" type="tx" showMasterSp="1" showMasterPhAnim="1">
   <p:cSld name="Title Slide">
     <p:spTree>
       <p:nvGrpSpPr>
@@ -1170,9 +1070,7 @@
       <p:sp>
         <p:nvSpPr>
           <p:cNvPr id="6" name="Shape 6"/>
-          <p:cNvSpPr>
-            <a:spLocks noGrp="1"/>
-          </p:cNvSpPr>
+          <p:cNvSpPr/>
           <p:nvPr>
             <p:ph type="title"/>
           </p:nvPr>
@@ -1211,9 +1109,7 @@
       <p:sp>
         <p:nvSpPr>
           <p:cNvPr id="7" name="Shape 7"/>
-          <p:cNvSpPr>
-            <a:spLocks noGrp="1"/>
-          </p:cNvSpPr>
+          <p:cNvSpPr/>
           <p:nvPr>
             <p:ph type="body" idx="1"/>
           </p:nvPr>
@@ -1258,9 +1154,7 @@
       <p:sp>
         <p:nvSpPr>
           <p:cNvPr id="8" name="Shape 8"/>
-          <p:cNvSpPr>
-            <a:spLocks noGrp="1"/>
-          </p:cNvSpPr>
+          <p:cNvSpPr/>
           <p:nvPr>
             <p:ph type="sldNum" sz="quarter" idx="2"/>
           </p:nvPr>
@@ -1275,10 +1169,7 @@
           <a:lstStyle/>
           <a:p>
             <a:pPr lvl="0"/>
-            <a:fld id="{86CB4B4D-7CA3-9044-876B-883B54F8677D}" type="slidenum">
-              <a:t>‹#›</a:t>
-            </a:fld>
-            <a:endParaRPr/>
+            <a:fld id="{86CB4B4D-7CA3-9044-876B-883B54F8677D}" type="slidenum"/>
           </a:p>
         </p:txBody>
       </p:sp>
@@ -1287,12 +1178,12 @@
   <p:clrMapOvr>
     <a:masterClrMapping/>
   </p:clrMapOvr>
-  <p:transition xmlns:p14="http://schemas.microsoft.com/office/powerpoint/2010/main" spd="med"/>
+  <p:transition spd="med" advClick="1"/>
 </p:sldLayout>
 </file>
 
 <file path=ppt/slideLayouts/slideLayout10.xml><?xml version="1.0" encoding="utf-8"?>
-<p:sldLayout xmlns:a="http://schemas.openxmlformats.org/drawingml/2006/main" xmlns:r="http://schemas.openxmlformats.org/officeDocument/2006/relationships" xmlns:p="http://schemas.openxmlformats.org/presentationml/2006/main" type="tx">
+<p:sldLayout xmlns:a="http://schemas.openxmlformats.org/drawingml/2006/main" xmlns:r="http://schemas.openxmlformats.org/officeDocument/2006/relationships" xmlns:p="http://schemas.openxmlformats.org/presentationml/2006/main" type="tx" showMasterSp="1" showMasterPhAnim="1">
   <p:cSld name="Title and Vertical Text">
     <p:spTree>
       <p:nvGrpSpPr>
@@ -1311,9 +1202,7 @@
       <p:sp>
         <p:nvSpPr>
           <p:cNvPr id="39" name="Shape 39"/>
-          <p:cNvSpPr>
-            <a:spLocks noGrp="1"/>
-          </p:cNvSpPr>
+          <p:cNvSpPr/>
           <p:nvPr>
             <p:ph type="title"/>
           </p:nvPr>
@@ -1348,9 +1237,7 @@
       <p:sp>
         <p:nvSpPr>
           <p:cNvPr id="40" name="Shape 40"/>
-          <p:cNvSpPr>
-            <a:spLocks noGrp="1"/>
-          </p:cNvSpPr>
+          <p:cNvSpPr/>
           <p:nvPr>
             <p:ph type="body" idx="1"/>
           </p:nvPr>
@@ -1379,6 +1266,11 @@
               </a:rPr>
               <a:t>Click to edit Master text styles</a:t>
             </a:r>
+            <a:endParaRPr sz="3200">
+              <a:solidFill>
+                <a:srgbClr val="FFFFFF"/>
+              </a:solidFill>
+            </a:endParaRPr>
           </a:p>
           <a:p>
             <a:pPr lvl="1">
@@ -1396,6 +1288,11 @@
               </a:rPr>
               <a:t>Second level</a:t>
             </a:r>
+            <a:endParaRPr sz="3200">
+              <a:solidFill>
+                <a:srgbClr val="FFFFFF"/>
+              </a:solidFill>
+            </a:endParaRPr>
           </a:p>
           <a:p>
             <a:pPr lvl="2">
@@ -1413,6 +1310,11 @@
               </a:rPr>
               <a:t>Third level</a:t>
             </a:r>
+            <a:endParaRPr sz="3200">
+              <a:solidFill>
+                <a:srgbClr val="FFFFFF"/>
+              </a:solidFill>
+            </a:endParaRPr>
           </a:p>
           <a:p>
             <a:pPr lvl="3">
@@ -1430,6 +1332,11 @@
               </a:rPr>
               <a:t>Fourth level</a:t>
             </a:r>
+            <a:endParaRPr sz="3200">
+              <a:solidFill>
+                <a:srgbClr val="FFFFFF"/>
+              </a:solidFill>
+            </a:endParaRPr>
           </a:p>
           <a:p>
             <a:pPr lvl="4">
@@ -1453,9 +1360,7 @@
       <p:sp>
         <p:nvSpPr>
           <p:cNvPr id="41" name="Shape 41"/>
-          <p:cNvSpPr>
-            <a:spLocks noGrp="1"/>
-          </p:cNvSpPr>
+          <p:cNvSpPr/>
           <p:nvPr>
             <p:ph type="sldNum" sz="quarter" idx="2"/>
           </p:nvPr>
@@ -1470,10 +1375,7 @@
           <a:lstStyle/>
           <a:p>
             <a:pPr lvl="0"/>
-            <a:fld id="{86CB4B4D-7CA3-9044-876B-883B54F8677D}" type="slidenum">
-              <a:t>‹#›</a:t>
-            </a:fld>
-            <a:endParaRPr/>
+            <a:fld id="{86CB4B4D-7CA3-9044-876B-883B54F8677D}" type="slidenum"/>
           </a:p>
         </p:txBody>
       </p:sp>
@@ -1482,12 +1384,12 @@
   <p:clrMapOvr>
     <a:masterClrMapping/>
   </p:clrMapOvr>
-  <p:transition xmlns:p14="http://schemas.microsoft.com/office/powerpoint/2010/main" spd="med"/>
+  <p:transition spd="med" advClick="1"/>
 </p:sldLayout>
 </file>
 
 <file path=ppt/slideLayouts/slideLayout11.xml><?xml version="1.0" encoding="utf-8"?>
-<p:sldLayout xmlns:a="http://schemas.openxmlformats.org/drawingml/2006/main" xmlns:r="http://schemas.openxmlformats.org/officeDocument/2006/relationships" xmlns:p="http://schemas.openxmlformats.org/presentationml/2006/main" type="tx">
+<p:sldLayout xmlns:a="http://schemas.openxmlformats.org/drawingml/2006/main" xmlns:r="http://schemas.openxmlformats.org/officeDocument/2006/relationships" xmlns:p="http://schemas.openxmlformats.org/presentationml/2006/main" type="tx" showMasterSp="1" showMasterPhAnim="1">
   <p:cSld name="Vertical Title and Text">
     <p:spTree>
       <p:nvGrpSpPr>
@@ -1506,9 +1408,7 @@
       <p:sp>
         <p:nvSpPr>
           <p:cNvPr id="43" name="Shape 43"/>
-          <p:cNvSpPr>
-            <a:spLocks noGrp="1"/>
-          </p:cNvSpPr>
+          <p:cNvSpPr/>
           <p:nvPr>
             <p:ph type="title"/>
           </p:nvPr>
@@ -1547,9 +1447,7 @@
       <p:sp>
         <p:nvSpPr>
           <p:cNvPr id="44" name="Shape 44"/>
-          <p:cNvSpPr>
-            <a:spLocks noGrp="1"/>
-          </p:cNvSpPr>
+          <p:cNvSpPr/>
           <p:nvPr>
             <p:ph type="body" idx="1"/>
           </p:nvPr>
@@ -1557,7 +1455,7 @@
         <p:spPr>
           <a:xfrm>
             <a:off x="457200" y="274638"/>
-            <a:ext cx="6019800" cy="6583363"/>
+            <a:ext cx="6019800" cy="6583365"/>
           </a:xfrm>
           <a:prstGeom prst="rect">
             <a:avLst/>
@@ -1582,6 +1480,11 @@
               </a:rPr>
               <a:t>Click to edit Master text styles</a:t>
             </a:r>
+            <a:endParaRPr sz="3200">
+              <a:solidFill>
+                <a:srgbClr val="FFFFFF"/>
+              </a:solidFill>
+            </a:endParaRPr>
           </a:p>
           <a:p>
             <a:pPr lvl="1">
@@ -1599,6 +1502,11 @@
               </a:rPr>
               <a:t>Second level</a:t>
             </a:r>
+            <a:endParaRPr sz="3200">
+              <a:solidFill>
+                <a:srgbClr val="FFFFFF"/>
+              </a:solidFill>
+            </a:endParaRPr>
           </a:p>
           <a:p>
             <a:pPr lvl="2">
@@ -1616,6 +1524,11 @@
               </a:rPr>
               <a:t>Third level</a:t>
             </a:r>
+            <a:endParaRPr sz="3200">
+              <a:solidFill>
+                <a:srgbClr val="FFFFFF"/>
+              </a:solidFill>
+            </a:endParaRPr>
           </a:p>
           <a:p>
             <a:pPr lvl="3">
@@ -1633,6 +1546,11 @@
               </a:rPr>
               <a:t>Fourth level</a:t>
             </a:r>
+            <a:endParaRPr sz="3200">
+              <a:solidFill>
+                <a:srgbClr val="FFFFFF"/>
+              </a:solidFill>
+            </a:endParaRPr>
           </a:p>
           <a:p>
             <a:pPr lvl="4">
@@ -1656,9 +1574,7 @@
       <p:sp>
         <p:nvSpPr>
           <p:cNvPr id="45" name="Shape 45"/>
-          <p:cNvSpPr>
-            <a:spLocks noGrp="1"/>
-          </p:cNvSpPr>
+          <p:cNvSpPr/>
           <p:nvPr>
             <p:ph type="sldNum" sz="quarter" idx="2"/>
           </p:nvPr>
@@ -1673,10 +1589,7 @@
           <a:lstStyle/>
           <a:p>
             <a:pPr lvl="0"/>
-            <a:fld id="{86CB4B4D-7CA3-9044-876B-883B54F8677D}" type="slidenum">
-              <a:t>‹#›</a:t>
-            </a:fld>
-            <a:endParaRPr/>
+            <a:fld id="{86CB4B4D-7CA3-9044-876B-883B54F8677D}" type="slidenum"/>
           </a:p>
         </p:txBody>
       </p:sp>
@@ -1685,12 +1598,12 @@
   <p:clrMapOvr>
     <a:masterClrMapping/>
   </p:clrMapOvr>
-  <p:transition xmlns:p14="http://schemas.microsoft.com/office/powerpoint/2010/main" spd="med"/>
+  <p:transition spd="med" advClick="1"/>
 </p:sldLayout>
 </file>
 
 <file path=ppt/slideLayouts/slideLayout2.xml><?xml version="1.0" encoding="utf-8"?>
-<p:sldLayout xmlns:a="http://schemas.openxmlformats.org/drawingml/2006/main" xmlns:r="http://schemas.openxmlformats.org/officeDocument/2006/relationships" xmlns:p="http://schemas.openxmlformats.org/presentationml/2006/main" type="tx">
+<p:sldLayout xmlns:a="http://schemas.openxmlformats.org/drawingml/2006/main" xmlns:r="http://schemas.openxmlformats.org/officeDocument/2006/relationships" xmlns:p="http://schemas.openxmlformats.org/presentationml/2006/main" type="tx" showMasterSp="1" showMasterPhAnim="1">
   <p:cSld name="Title and Content">
     <p:spTree>
       <p:nvGrpSpPr>
@@ -1709,9 +1622,7 @@
       <p:sp>
         <p:nvSpPr>
           <p:cNvPr id="10" name="Shape 10"/>
-          <p:cNvSpPr>
-            <a:spLocks noGrp="1"/>
-          </p:cNvSpPr>
+          <p:cNvSpPr/>
           <p:nvPr>
             <p:ph type="title"/>
           </p:nvPr>
@@ -1746,9 +1657,7 @@
       <p:sp>
         <p:nvSpPr>
           <p:cNvPr id="11" name="Shape 11"/>
-          <p:cNvSpPr>
-            <a:spLocks noGrp="1"/>
-          </p:cNvSpPr>
+          <p:cNvSpPr/>
           <p:nvPr>
             <p:ph type="body" idx="1"/>
           </p:nvPr>
@@ -1777,6 +1686,11 @@
               </a:rPr>
               <a:t>Click to edit Master text styles</a:t>
             </a:r>
+            <a:endParaRPr sz="3200">
+              <a:solidFill>
+                <a:srgbClr val="FFFFFF"/>
+              </a:solidFill>
+            </a:endParaRPr>
           </a:p>
           <a:p>
             <a:pPr lvl="1">
@@ -1794,6 +1708,11 @@
               </a:rPr>
               <a:t>Second level</a:t>
             </a:r>
+            <a:endParaRPr sz="3200">
+              <a:solidFill>
+                <a:srgbClr val="FFFFFF"/>
+              </a:solidFill>
+            </a:endParaRPr>
           </a:p>
           <a:p>
             <a:pPr lvl="2">
@@ -1811,6 +1730,11 @@
               </a:rPr>
               <a:t>Third level</a:t>
             </a:r>
+            <a:endParaRPr sz="3200">
+              <a:solidFill>
+                <a:srgbClr val="FFFFFF"/>
+              </a:solidFill>
+            </a:endParaRPr>
           </a:p>
           <a:p>
             <a:pPr lvl="3">
@@ -1828,6 +1752,11 @@
               </a:rPr>
               <a:t>Fourth level</a:t>
             </a:r>
+            <a:endParaRPr sz="3200">
+              <a:solidFill>
+                <a:srgbClr val="FFFFFF"/>
+              </a:solidFill>
+            </a:endParaRPr>
           </a:p>
           <a:p>
             <a:pPr lvl="4">
@@ -1851,9 +1780,7 @@
       <p:sp>
         <p:nvSpPr>
           <p:cNvPr id="12" name="Shape 12"/>
-          <p:cNvSpPr>
-            <a:spLocks noGrp="1"/>
-          </p:cNvSpPr>
+          <p:cNvSpPr/>
           <p:nvPr>
             <p:ph type="sldNum" sz="quarter" idx="2"/>
           </p:nvPr>
@@ -1868,10 +1795,7 @@
           <a:lstStyle/>
           <a:p>
             <a:pPr lvl="0"/>
-            <a:fld id="{86CB4B4D-7CA3-9044-876B-883B54F8677D}" type="slidenum">
-              <a:t>‹#›</a:t>
-            </a:fld>
-            <a:endParaRPr/>
+            <a:fld id="{86CB4B4D-7CA3-9044-876B-883B54F8677D}" type="slidenum"/>
           </a:p>
         </p:txBody>
       </p:sp>
@@ -1880,12 +1804,12 @@
   <p:clrMapOvr>
     <a:masterClrMapping/>
   </p:clrMapOvr>
-  <p:transition xmlns:p14="http://schemas.microsoft.com/office/powerpoint/2010/main" spd="med"/>
+  <p:transition spd="med" advClick="1"/>
 </p:sldLayout>
 </file>
 
 <file path=ppt/slideLayouts/slideLayout3.xml><?xml version="1.0" encoding="utf-8"?>
-<p:sldLayout xmlns:a="http://schemas.openxmlformats.org/drawingml/2006/main" xmlns:r="http://schemas.openxmlformats.org/officeDocument/2006/relationships" xmlns:p="http://schemas.openxmlformats.org/presentationml/2006/main" type="tx">
+<p:sldLayout xmlns:a="http://schemas.openxmlformats.org/drawingml/2006/main" xmlns:r="http://schemas.openxmlformats.org/officeDocument/2006/relationships" xmlns:p="http://schemas.openxmlformats.org/presentationml/2006/main" type="tx" showMasterSp="1" showMasterPhAnim="1">
   <p:cSld name="Section Header">
     <p:spTree>
       <p:nvGrpSpPr>
@@ -1904,9 +1828,7 @@
       <p:sp>
         <p:nvSpPr>
           <p:cNvPr id="14" name="Shape 14"/>
-          <p:cNvSpPr>
-            <a:spLocks noGrp="1"/>
-          </p:cNvSpPr>
+          <p:cNvSpPr/>
           <p:nvPr>
             <p:ph type="title"/>
           </p:nvPr>
@@ -1924,19 +1846,19 @@
           <a:bodyPr anchor="t"/>
           <a:lstStyle>
             <a:lvl1pPr algn="l">
-              <a:defRPr sz="4000" b="1" cap="all"/>
+              <a:defRPr b="1" cap="all" sz="4000"/>
             </a:lvl1pPr>
           </a:lstStyle>
           <a:p>
             <a:pPr lvl="0">
-              <a:defRPr sz="1800" b="0" cap="none">
+              <a:defRPr b="0" cap="none" sz="1800">
                 <a:solidFill>
                   <a:srgbClr val="000000"/>
                 </a:solidFill>
               </a:defRPr>
             </a:pPr>
             <a:r>
-              <a:rPr sz="4000" b="1" cap="all">
+              <a:rPr b="1" cap="all" sz="4000">
                 <a:solidFill>
                   <a:srgbClr val="FFFFFF"/>
                 </a:solidFill>
@@ -1949,9 +1871,7 @@
       <p:sp>
         <p:nvSpPr>
           <p:cNvPr id="15" name="Shape 15"/>
-          <p:cNvSpPr>
-            <a:spLocks noGrp="1"/>
-          </p:cNvSpPr>
+          <p:cNvSpPr/>
           <p:nvPr>
             <p:ph type="body" idx="1"/>
           </p:nvPr>
@@ -1959,7 +1879,7 @@
         <p:spPr>
           <a:xfrm>
             <a:off x="722312" y="2906713"/>
-            <a:ext cx="7772401" cy="1500188"/>
+            <a:ext cx="7772401" cy="1500190"/>
           </a:xfrm>
           <a:prstGeom prst="rect">
             <a:avLst/>
@@ -2000,9 +1920,7 @@
       <p:sp>
         <p:nvSpPr>
           <p:cNvPr id="16" name="Shape 16"/>
-          <p:cNvSpPr>
-            <a:spLocks noGrp="1"/>
-          </p:cNvSpPr>
+          <p:cNvSpPr/>
           <p:nvPr>
             <p:ph type="sldNum" sz="quarter" idx="2"/>
           </p:nvPr>
@@ -2017,10 +1935,7 @@
           <a:lstStyle/>
           <a:p>
             <a:pPr lvl="0"/>
-            <a:fld id="{86CB4B4D-7CA3-9044-876B-883B54F8677D}" type="slidenum">
-              <a:t>‹#›</a:t>
-            </a:fld>
-            <a:endParaRPr/>
+            <a:fld id="{86CB4B4D-7CA3-9044-876B-883B54F8677D}" type="slidenum"/>
           </a:p>
         </p:txBody>
       </p:sp>
@@ -2029,12 +1944,12 @@
   <p:clrMapOvr>
     <a:masterClrMapping/>
   </p:clrMapOvr>
-  <p:transition xmlns:p14="http://schemas.microsoft.com/office/powerpoint/2010/main" spd="med"/>
+  <p:transition spd="med" advClick="1"/>
 </p:sldLayout>
 </file>
 
 <file path=ppt/slideLayouts/slideLayout4.xml><?xml version="1.0" encoding="utf-8"?>
-<p:sldLayout xmlns:a="http://schemas.openxmlformats.org/drawingml/2006/main" xmlns:r="http://schemas.openxmlformats.org/officeDocument/2006/relationships" xmlns:p="http://schemas.openxmlformats.org/presentationml/2006/main" type="tx">
+<p:sldLayout xmlns:a="http://schemas.openxmlformats.org/drawingml/2006/main" xmlns:r="http://schemas.openxmlformats.org/officeDocument/2006/relationships" xmlns:p="http://schemas.openxmlformats.org/presentationml/2006/main" type="tx" showMasterSp="1" showMasterPhAnim="1">
   <p:cSld name="Two Content">
     <p:spTree>
       <p:nvGrpSpPr>
@@ -2053,9 +1968,7 @@
       <p:sp>
         <p:nvSpPr>
           <p:cNvPr id="18" name="Shape 18"/>
-          <p:cNvSpPr>
-            <a:spLocks noGrp="1"/>
-          </p:cNvSpPr>
+          <p:cNvSpPr/>
           <p:nvPr>
             <p:ph type="title"/>
           </p:nvPr>
@@ -2090,9 +2003,7 @@
       <p:sp>
         <p:nvSpPr>
           <p:cNvPr id="19" name="Shape 19"/>
-          <p:cNvSpPr>
-            <a:spLocks noGrp="1"/>
-          </p:cNvSpPr>
+          <p:cNvSpPr/>
           <p:nvPr>
             <p:ph type="body" idx="1"/>
           </p:nvPr>
@@ -2121,7 +2032,7 @@
               </a:spcBef>
               <a:defRPr sz="2800"/>
             </a:lvl2pPr>
-            <a:lvl3pPr marL="1234439" indent="-320039">
+            <a:lvl3pPr marL="1234438" indent="-320038">
               <a:spcBef>
                 <a:spcPts val="600"/>
               </a:spcBef>
@@ -2156,6 +2067,11 @@
               </a:rPr>
               <a:t>Click to edit Master text styles</a:t>
             </a:r>
+            <a:endParaRPr sz="2800">
+              <a:solidFill>
+                <a:srgbClr val="FFFFFF"/>
+              </a:solidFill>
+            </a:endParaRPr>
           </a:p>
           <a:p>
             <a:pPr lvl="1">
@@ -2173,6 +2089,11 @@
               </a:rPr>
               <a:t>Second level</a:t>
             </a:r>
+            <a:endParaRPr sz="2800">
+              <a:solidFill>
+                <a:srgbClr val="FFFFFF"/>
+              </a:solidFill>
+            </a:endParaRPr>
           </a:p>
           <a:p>
             <a:pPr lvl="2">
@@ -2190,6 +2111,11 @@
               </a:rPr>
               <a:t>Third level</a:t>
             </a:r>
+            <a:endParaRPr sz="2800">
+              <a:solidFill>
+                <a:srgbClr val="FFFFFF"/>
+              </a:solidFill>
+            </a:endParaRPr>
           </a:p>
           <a:p>
             <a:pPr lvl="3">
@@ -2207,6 +2133,11 @@
               </a:rPr>
               <a:t>Fourth level</a:t>
             </a:r>
+            <a:endParaRPr sz="2800">
+              <a:solidFill>
+                <a:srgbClr val="FFFFFF"/>
+              </a:solidFill>
+            </a:endParaRPr>
           </a:p>
           <a:p>
             <a:pPr lvl="4">
@@ -2230,9 +2161,7 @@
       <p:sp>
         <p:nvSpPr>
           <p:cNvPr id="20" name="Shape 20"/>
-          <p:cNvSpPr>
-            <a:spLocks noGrp="1"/>
-          </p:cNvSpPr>
+          <p:cNvSpPr/>
           <p:nvPr>
             <p:ph type="sldNum" sz="quarter" idx="2"/>
           </p:nvPr>
@@ -2247,10 +2176,7 @@
           <a:lstStyle/>
           <a:p>
             <a:pPr lvl="0"/>
-            <a:fld id="{86CB4B4D-7CA3-9044-876B-883B54F8677D}" type="slidenum">
-              <a:t>‹#›</a:t>
-            </a:fld>
-            <a:endParaRPr/>
+            <a:fld id="{86CB4B4D-7CA3-9044-876B-883B54F8677D}" type="slidenum"/>
           </a:p>
         </p:txBody>
       </p:sp>
@@ -2259,12 +2185,12 @@
   <p:clrMapOvr>
     <a:masterClrMapping/>
   </p:clrMapOvr>
-  <p:transition xmlns:p14="http://schemas.microsoft.com/office/powerpoint/2010/main" spd="med"/>
+  <p:transition spd="med" advClick="1"/>
 </p:sldLayout>
 </file>
 
 <file path=ppt/slideLayouts/slideLayout5.xml><?xml version="1.0" encoding="utf-8"?>
-<p:sldLayout xmlns:a="http://schemas.openxmlformats.org/drawingml/2006/main" xmlns:r="http://schemas.openxmlformats.org/officeDocument/2006/relationships" xmlns:p="http://schemas.openxmlformats.org/presentationml/2006/main" type="tx">
+<p:sldLayout xmlns:a="http://schemas.openxmlformats.org/drawingml/2006/main" xmlns:r="http://schemas.openxmlformats.org/officeDocument/2006/relationships" xmlns:p="http://schemas.openxmlformats.org/presentationml/2006/main" type="tx" showMasterSp="1" showMasterPhAnim="1">
   <p:cSld name="Comparison">
     <p:spTree>
       <p:nvGrpSpPr>
@@ -2283,9 +2209,7 @@
       <p:sp>
         <p:nvSpPr>
           <p:cNvPr id="22" name="Shape 22"/>
-          <p:cNvSpPr>
-            <a:spLocks noGrp="1"/>
-          </p:cNvSpPr>
+          <p:cNvSpPr/>
           <p:nvPr>
             <p:ph type="title"/>
           </p:nvPr>
@@ -2324,17 +2248,15 @@
       <p:sp>
         <p:nvSpPr>
           <p:cNvPr id="23" name="Shape 23"/>
-          <p:cNvSpPr>
-            <a:spLocks noGrp="1"/>
-          </p:cNvSpPr>
+          <p:cNvSpPr/>
           <p:nvPr>
             <p:ph type="body" idx="1"/>
           </p:nvPr>
         </p:nvSpPr>
         <p:spPr>
           <a:xfrm>
-            <a:off x="457200" y="1435465"/>
-            <a:ext cx="4040188" cy="739410"/>
+            <a:off x="457200" y="1435464"/>
+            <a:ext cx="4040188" cy="739412"/>
           </a:xfrm>
           <a:prstGeom prst="rect">
             <a:avLst/>
@@ -2350,19 +2272,19 @@
               <a:buSzTx/>
               <a:buFontTx/>
               <a:buNone/>
-              <a:defRPr sz="2400" b="1"/>
+              <a:defRPr b="1" sz="2400"/>
             </a:lvl1pPr>
           </a:lstStyle>
           <a:p>
             <a:pPr lvl="0">
-              <a:defRPr sz="1800" b="0">
+              <a:defRPr b="0" sz="1800">
                 <a:solidFill>
                   <a:srgbClr val="000000"/>
                 </a:solidFill>
               </a:defRPr>
             </a:pPr>
             <a:r>
-              <a:rPr sz="2400" b="1">
+              <a:rPr b="1" sz="2400">
                 <a:solidFill>
                   <a:srgbClr val="FFFFFF"/>
                 </a:solidFill>
@@ -2375,9 +2297,7 @@
       <p:sp>
         <p:nvSpPr>
           <p:cNvPr id="24" name="Shape 24"/>
-          <p:cNvSpPr>
-            <a:spLocks noGrp="1"/>
-          </p:cNvSpPr>
+          <p:cNvSpPr/>
           <p:nvPr>
             <p:ph type="sldNum" sz="quarter" idx="2"/>
           </p:nvPr>
@@ -2392,10 +2312,7 @@
           <a:lstStyle/>
           <a:p>
             <a:pPr lvl="0"/>
-            <a:fld id="{86CB4B4D-7CA3-9044-876B-883B54F8677D}" type="slidenum">
-              <a:t>‹#›</a:t>
-            </a:fld>
-            <a:endParaRPr/>
+            <a:fld id="{86CB4B4D-7CA3-9044-876B-883B54F8677D}" type="slidenum"/>
           </a:p>
         </p:txBody>
       </p:sp>
@@ -2404,12 +2321,12 @@
   <p:clrMapOvr>
     <a:masterClrMapping/>
   </p:clrMapOvr>
-  <p:transition xmlns:p14="http://schemas.microsoft.com/office/powerpoint/2010/main" spd="med"/>
+  <p:transition spd="med" advClick="1"/>
 </p:sldLayout>
 </file>
 
 <file path=ppt/slideLayouts/slideLayout6.xml><?xml version="1.0" encoding="utf-8"?>
-<p:sldLayout xmlns:a="http://schemas.openxmlformats.org/drawingml/2006/main" xmlns:r="http://schemas.openxmlformats.org/officeDocument/2006/relationships" xmlns:p="http://schemas.openxmlformats.org/presentationml/2006/main" type="tx">
+<p:sldLayout xmlns:a="http://schemas.openxmlformats.org/drawingml/2006/main" xmlns:r="http://schemas.openxmlformats.org/officeDocument/2006/relationships" xmlns:p="http://schemas.openxmlformats.org/presentationml/2006/main" type="tx" showMasterSp="1" showMasterPhAnim="1">
   <p:cSld name="Title Only">
     <p:spTree>
       <p:nvGrpSpPr>
@@ -2428,14 +2345,16 @@
       <p:sp>
         <p:nvSpPr>
           <p:cNvPr id="26" name="Shape 26"/>
-          <p:cNvSpPr>
-            <a:spLocks noGrp="1"/>
-          </p:cNvSpPr>
+          <p:cNvSpPr/>
           <p:nvPr>
             <p:ph type="title"/>
           </p:nvPr>
         </p:nvSpPr>
         <p:spPr>
+          <a:xfrm>
+            <a:off x="457200" y="0"/>
+            <a:ext cx="8229600" cy="1692277"/>
+          </a:xfrm>
           <a:prstGeom prst="rect">
             <a:avLst/>
           </a:prstGeom>
@@ -2465,9 +2384,7 @@
       <p:sp>
         <p:nvSpPr>
           <p:cNvPr id="27" name="Shape 27"/>
-          <p:cNvSpPr>
-            <a:spLocks noGrp="1"/>
-          </p:cNvSpPr>
+          <p:cNvSpPr/>
           <p:nvPr>
             <p:ph type="sldNum" sz="quarter" idx="2"/>
           </p:nvPr>
@@ -2482,10 +2399,7 @@
           <a:lstStyle/>
           <a:p>
             <a:pPr lvl="0"/>
-            <a:fld id="{86CB4B4D-7CA3-9044-876B-883B54F8677D}" type="slidenum">
-              <a:t>‹#›</a:t>
-            </a:fld>
-            <a:endParaRPr/>
+            <a:fld id="{86CB4B4D-7CA3-9044-876B-883B54F8677D}" type="slidenum"/>
           </a:p>
         </p:txBody>
       </p:sp>
@@ -2494,12 +2408,12 @@
   <p:clrMapOvr>
     <a:masterClrMapping/>
   </p:clrMapOvr>
-  <p:transition xmlns:p14="http://schemas.microsoft.com/office/powerpoint/2010/main" spd="med"/>
+  <p:transition spd="med" advClick="1"/>
 </p:sldLayout>
 </file>
 
 <file path=ppt/slideLayouts/slideLayout7.xml><?xml version="1.0" encoding="utf-8"?>
-<p:sldLayout xmlns:a="http://schemas.openxmlformats.org/drawingml/2006/main" xmlns:r="http://schemas.openxmlformats.org/officeDocument/2006/relationships" xmlns:p="http://schemas.openxmlformats.org/presentationml/2006/main" type="tx">
+<p:sldLayout xmlns:a="http://schemas.openxmlformats.org/drawingml/2006/main" xmlns:r="http://schemas.openxmlformats.org/officeDocument/2006/relationships" xmlns:p="http://schemas.openxmlformats.org/presentationml/2006/main" type="tx" showMasterSp="1" showMasterPhAnim="1">
   <p:cSld name="Blank">
     <p:spTree>
       <p:nvGrpSpPr>
@@ -2518,9 +2432,7 @@
       <p:sp>
         <p:nvSpPr>
           <p:cNvPr id="29" name="Shape 29"/>
-          <p:cNvSpPr>
-            <a:spLocks noGrp="1"/>
-          </p:cNvSpPr>
+          <p:cNvSpPr/>
           <p:nvPr>
             <p:ph type="sldNum" sz="quarter" idx="2"/>
           </p:nvPr>
@@ -2535,10 +2447,7 @@
           <a:lstStyle/>
           <a:p>
             <a:pPr lvl="0"/>
-            <a:fld id="{86CB4B4D-7CA3-9044-876B-883B54F8677D}" type="slidenum">
-              <a:t>‹#›</a:t>
-            </a:fld>
-            <a:endParaRPr/>
+            <a:fld id="{86CB4B4D-7CA3-9044-876B-883B54F8677D}" type="slidenum"/>
           </a:p>
         </p:txBody>
       </p:sp>
@@ -2547,12 +2456,12 @@
   <p:clrMapOvr>
     <a:masterClrMapping/>
   </p:clrMapOvr>
-  <p:transition xmlns:p14="http://schemas.microsoft.com/office/powerpoint/2010/main" spd="med"/>
+  <p:transition spd="med" advClick="1"/>
 </p:sldLayout>
 </file>
 
 <file path=ppt/slideLayouts/slideLayout8.xml><?xml version="1.0" encoding="utf-8"?>
-<p:sldLayout xmlns:a="http://schemas.openxmlformats.org/drawingml/2006/main" xmlns:r="http://schemas.openxmlformats.org/officeDocument/2006/relationships" xmlns:p="http://schemas.openxmlformats.org/presentationml/2006/main" type="tx">
+<p:sldLayout xmlns:a="http://schemas.openxmlformats.org/drawingml/2006/main" xmlns:r="http://schemas.openxmlformats.org/officeDocument/2006/relationships" xmlns:p="http://schemas.openxmlformats.org/presentationml/2006/main" type="tx" showMasterSp="1" showMasterPhAnim="1">
   <p:cSld name="Content with Caption">
     <p:spTree>
       <p:nvGrpSpPr>
@@ -2571,9 +2480,7 @@
       <p:sp>
         <p:nvSpPr>
           <p:cNvPr id="31" name="Shape 31"/>
-          <p:cNvSpPr>
-            <a:spLocks noGrp="1"/>
-          </p:cNvSpPr>
+          <p:cNvSpPr/>
           <p:nvPr>
             <p:ph type="title"/>
           </p:nvPr>
@@ -2581,7 +2488,7 @@
         <p:spPr>
           <a:xfrm>
             <a:off x="457200" y="0"/>
-            <a:ext cx="3008314" cy="1435100"/>
+            <a:ext cx="3008316" cy="1435100"/>
           </a:xfrm>
           <a:prstGeom prst="rect">
             <a:avLst/>
@@ -2591,19 +2498,19 @@
           <a:bodyPr anchor="b"/>
           <a:lstStyle>
             <a:lvl1pPr algn="l">
-              <a:defRPr sz="2000" b="1"/>
+              <a:defRPr b="1" sz="2000"/>
             </a:lvl1pPr>
           </a:lstStyle>
           <a:p>
             <a:pPr lvl="0">
-              <a:defRPr sz="1800" b="0">
+              <a:defRPr b="0" sz="1800">
                 <a:solidFill>
                   <a:srgbClr val="000000"/>
                 </a:solidFill>
               </a:defRPr>
             </a:pPr>
             <a:r>
-              <a:rPr sz="2000" b="1">
+              <a:rPr b="1" sz="2000">
                 <a:solidFill>
                   <a:srgbClr val="FFFFFF"/>
                 </a:solidFill>
@@ -2616,9 +2523,7 @@
       <p:sp>
         <p:nvSpPr>
           <p:cNvPr id="32" name="Shape 32"/>
-          <p:cNvSpPr>
-            <a:spLocks noGrp="1"/>
-          </p:cNvSpPr>
+          <p:cNvSpPr/>
           <p:nvPr>
             <p:ph type="body" idx="1"/>
           </p:nvPr>
@@ -2651,6 +2556,11 @@
               </a:rPr>
               <a:t>Click to edit Master text styles</a:t>
             </a:r>
+            <a:endParaRPr sz="3200">
+              <a:solidFill>
+                <a:srgbClr val="FFFFFF"/>
+              </a:solidFill>
+            </a:endParaRPr>
           </a:p>
           <a:p>
             <a:pPr lvl="1">
@@ -2668,6 +2578,11 @@
               </a:rPr>
               <a:t>Second level</a:t>
             </a:r>
+            <a:endParaRPr sz="3200">
+              <a:solidFill>
+                <a:srgbClr val="FFFFFF"/>
+              </a:solidFill>
+            </a:endParaRPr>
           </a:p>
           <a:p>
             <a:pPr lvl="2">
@@ -2685,6 +2600,11 @@
               </a:rPr>
               <a:t>Third level</a:t>
             </a:r>
+            <a:endParaRPr sz="3200">
+              <a:solidFill>
+                <a:srgbClr val="FFFFFF"/>
+              </a:solidFill>
+            </a:endParaRPr>
           </a:p>
           <a:p>
             <a:pPr lvl="3">
@@ -2702,6 +2622,11 @@
               </a:rPr>
               <a:t>Fourth level</a:t>
             </a:r>
+            <a:endParaRPr sz="3200">
+              <a:solidFill>
+                <a:srgbClr val="FFFFFF"/>
+              </a:solidFill>
+            </a:endParaRPr>
           </a:p>
           <a:p>
             <a:pPr lvl="4">
@@ -2725,9 +2650,7 @@
       <p:sp>
         <p:nvSpPr>
           <p:cNvPr id="33" name="Shape 33"/>
-          <p:cNvSpPr>
-            <a:spLocks noGrp="1"/>
-          </p:cNvSpPr>
+          <p:cNvSpPr/>
           <p:nvPr>
             <p:ph type="sldNum" sz="quarter" idx="2"/>
           </p:nvPr>
@@ -2742,10 +2665,7 @@
           <a:lstStyle/>
           <a:p>
             <a:pPr lvl="0"/>
-            <a:fld id="{86CB4B4D-7CA3-9044-876B-883B54F8677D}" type="slidenum">
-              <a:t>‹#›</a:t>
-            </a:fld>
-            <a:endParaRPr/>
+            <a:fld id="{86CB4B4D-7CA3-9044-876B-883B54F8677D}" type="slidenum"/>
           </a:p>
         </p:txBody>
       </p:sp>
@@ -2754,12 +2674,12 @@
   <p:clrMapOvr>
     <a:masterClrMapping/>
   </p:clrMapOvr>
-  <p:transition xmlns:p14="http://schemas.microsoft.com/office/powerpoint/2010/main" spd="med"/>
+  <p:transition spd="med" advClick="1"/>
 </p:sldLayout>
 </file>
 
 <file path=ppt/slideLayouts/slideLayout9.xml><?xml version="1.0" encoding="utf-8"?>
-<p:sldLayout xmlns:a="http://schemas.openxmlformats.org/drawingml/2006/main" xmlns:r="http://schemas.openxmlformats.org/officeDocument/2006/relationships" xmlns:p="http://schemas.openxmlformats.org/presentationml/2006/main" type="tx">
+<p:sldLayout xmlns:a="http://schemas.openxmlformats.org/drawingml/2006/main" xmlns:r="http://schemas.openxmlformats.org/officeDocument/2006/relationships" xmlns:p="http://schemas.openxmlformats.org/presentationml/2006/main" type="tx" showMasterSp="1" showMasterPhAnim="1">
   <p:cSld name="Picture with Caption">
     <p:spTree>
       <p:nvGrpSpPr>
@@ -2778,9 +2698,7 @@
       <p:sp>
         <p:nvSpPr>
           <p:cNvPr id="35" name="Shape 35"/>
-          <p:cNvSpPr>
-            <a:spLocks noGrp="1"/>
-          </p:cNvSpPr>
+          <p:cNvSpPr/>
           <p:nvPr>
             <p:ph type="title"/>
           </p:nvPr>
@@ -2788,7 +2706,7 @@
         <p:spPr>
           <a:xfrm>
             <a:off x="1792288" y="4800600"/>
-            <a:ext cx="5486401" cy="566738"/>
+            <a:ext cx="5486403" cy="566738"/>
           </a:xfrm>
           <a:prstGeom prst="rect">
             <a:avLst/>
@@ -2798,19 +2716,19 @@
           <a:bodyPr anchor="b"/>
           <a:lstStyle>
             <a:lvl1pPr algn="l">
-              <a:defRPr sz="2000" b="1"/>
+              <a:defRPr b="1" sz="2000"/>
             </a:lvl1pPr>
           </a:lstStyle>
           <a:p>
             <a:pPr lvl="0">
-              <a:defRPr sz="1800" b="0">
+              <a:defRPr b="0" sz="1800">
                 <a:solidFill>
                   <a:srgbClr val="000000"/>
                 </a:solidFill>
               </a:defRPr>
             </a:pPr>
             <a:r>
-              <a:rPr sz="2000" b="1">
+              <a:rPr b="1" sz="2000">
                 <a:solidFill>
                   <a:srgbClr val="FFFFFF"/>
                 </a:solidFill>
@@ -2823,9 +2741,7 @@
       <p:sp>
         <p:nvSpPr>
           <p:cNvPr id="36" name="Shape 36"/>
-          <p:cNvSpPr>
-            <a:spLocks noGrp="1"/>
-          </p:cNvSpPr>
+          <p:cNvSpPr/>
           <p:nvPr>
             <p:ph type="body" idx="1"/>
           </p:nvPr>
@@ -2833,7 +2749,7 @@
         <p:spPr>
           <a:xfrm>
             <a:off x="1792288" y="5367337"/>
-            <a:ext cx="5486401" cy="804863"/>
+            <a:ext cx="5486403" cy="804865"/>
           </a:xfrm>
           <a:prstGeom prst="rect">
             <a:avLst/>
@@ -2874,9 +2790,7 @@
       <p:sp>
         <p:nvSpPr>
           <p:cNvPr id="37" name="Shape 37"/>
-          <p:cNvSpPr>
-            <a:spLocks noGrp="1"/>
-          </p:cNvSpPr>
+          <p:cNvSpPr/>
           <p:nvPr>
             <p:ph type="sldNum" sz="quarter" idx="2"/>
           </p:nvPr>
@@ -2891,10 +2805,7 @@
           <a:lstStyle/>
           <a:p>
             <a:pPr lvl="0"/>
-            <a:fld id="{86CB4B4D-7CA3-9044-876B-883B54F8677D}" type="slidenum">
-              <a:t>‹#›</a:t>
-            </a:fld>
-            <a:endParaRPr/>
+            <a:fld id="{86CB4B4D-7CA3-9044-876B-883B54F8677D}" type="slidenum"/>
           </a:p>
         </p:txBody>
       </p:sp>
@@ -2903,7 +2814,7 @@
   <p:clrMapOvr>
     <a:masterClrMapping/>
   </p:clrMapOvr>
-  <p:transition xmlns:p14="http://schemas.microsoft.com/office/powerpoint/2010/main" spd="med"/>
+  <p:transition spd="med" advClick="1"/>
 </p:sldLayout>
 </file>
 
@@ -2915,7 +2826,6 @@
         <a:solidFill>
           <a:srgbClr val="000000"/>
         </a:solidFill>
-        <a:effectLst/>
       </p:bgPr>
     </p:bg>
     <p:spTree>
@@ -2935,17 +2845,15 @@
       <p:sp>
         <p:nvSpPr>
           <p:cNvPr id="2" name="Shape 2"/>
-          <p:cNvSpPr>
-            <a:spLocks noGrp="1"/>
-          </p:cNvSpPr>
+          <p:cNvSpPr/>
           <p:nvPr>
             <p:ph type="title"/>
           </p:nvPr>
         </p:nvSpPr>
         <p:spPr>
           <a:xfrm>
-            <a:off x="457200" y="92076"/>
-            <a:ext cx="8229600" cy="1508125"/>
+            <a:off x="457200" y="92075"/>
+            <a:ext cx="8229600" cy="1508126"/>
           </a:xfrm>
           <a:prstGeom prst="rect">
             <a:avLst/>
@@ -2960,8 +2868,8 @@
           </a:extLst>
         </p:spPr>
         <p:txBody>
-          <a:bodyPr lIns="45719" rIns="45719" anchor="ctr">
-            <a:normAutofit/>
+          <a:bodyPr lIns="45718" tIns="45718" rIns="45718" bIns="45718" anchor="ctr">
+            <a:normAutofit fontScale="100000" lnSpcReduction="0"/>
           </a:bodyPr>
           <a:lstStyle/>
           <a:p>
@@ -2986,9 +2894,7 @@
       <p:sp>
         <p:nvSpPr>
           <p:cNvPr id="3" name="Shape 3"/>
-          <p:cNvSpPr>
-            <a:spLocks noGrp="1"/>
-          </p:cNvSpPr>
+          <p:cNvSpPr/>
           <p:nvPr>
             <p:ph type="body" idx="1"/>
           </p:nvPr>
@@ -3011,8 +2917,8 @@
           </a:extLst>
         </p:spPr>
         <p:txBody>
-          <a:bodyPr lIns="45719" rIns="45719">
-            <a:normAutofit/>
+          <a:bodyPr lIns="45718" tIns="45718" rIns="45718" bIns="45718">
+            <a:normAutofit fontScale="100000" lnSpcReduction="0"/>
           </a:bodyPr>
           <a:lstStyle/>
           <a:p>
@@ -3031,6 +2937,11 @@
               </a:rPr>
               <a:t>Click to edit Master text styles</a:t>
             </a:r>
+            <a:endParaRPr sz="3200">
+              <a:solidFill>
+                <a:srgbClr val="FFFFFF"/>
+              </a:solidFill>
+            </a:endParaRPr>
           </a:p>
           <a:p>
             <a:pPr lvl="1">
@@ -3048,6 +2959,11 @@
               </a:rPr>
               <a:t>Second level</a:t>
             </a:r>
+            <a:endParaRPr sz="3200">
+              <a:solidFill>
+                <a:srgbClr val="FFFFFF"/>
+              </a:solidFill>
+            </a:endParaRPr>
           </a:p>
           <a:p>
             <a:pPr lvl="2">
@@ -3065,6 +2981,11 @@
               </a:rPr>
               <a:t>Third level</a:t>
             </a:r>
+            <a:endParaRPr sz="3200">
+              <a:solidFill>
+                <a:srgbClr val="FFFFFF"/>
+              </a:solidFill>
+            </a:endParaRPr>
           </a:p>
           <a:p>
             <a:pPr lvl="3">
@@ -3082,6 +3003,11 @@
               </a:rPr>
               <a:t>Fourth level</a:t>
             </a:r>
+            <a:endParaRPr sz="3200">
+              <a:solidFill>
+                <a:srgbClr val="FFFFFF"/>
+              </a:solidFill>
+            </a:endParaRPr>
           </a:p>
           <a:p>
             <a:pPr lvl="4">
@@ -3105,9 +3031,7 @@
       <p:sp>
         <p:nvSpPr>
           <p:cNvPr id="4" name="Shape 4"/>
-          <p:cNvSpPr>
-            <a:spLocks noGrp="1"/>
-          </p:cNvSpPr>
+          <p:cNvSpPr/>
           <p:nvPr>
             <p:ph type="sldNum" sz="quarter" idx="2"/>
           </p:nvPr>
@@ -3115,7 +3039,7 @@
         <p:spPr>
           <a:xfrm>
             <a:off x="6553200" y="6404292"/>
-            <a:ext cx="2133600" cy="269241"/>
+            <a:ext cx="2133600" cy="269237"/>
           </a:xfrm>
           <a:prstGeom prst="rect">
             <a:avLst/>
@@ -3125,7 +3049,7 @@
           </a:ln>
         </p:spPr>
         <p:txBody>
-          <a:bodyPr lIns="45719" rIns="45719" anchor="ctr">
+          <a:bodyPr lIns="45718" tIns="45718" rIns="45718" bIns="45718" anchor="ctr">
             <a:spAutoFit/>
           </a:bodyPr>
           <a:lstStyle>
@@ -3134,15 +3058,16 @@
                 <a:solidFill>
                   <a:srgbClr val="FFFFFF"/>
                 </a:solidFill>
+                <a:latin typeface="Calibri"/>
+                <a:ea typeface="Calibri"/>
+                <a:cs typeface="Calibri"/>
+                <a:sym typeface="Calibri"/>
               </a:defRPr>
             </a:lvl1pPr>
           </a:lstStyle>
           <a:p>
             <a:pPr lvl="0"/>
-            <a:fld id="{86CB4B4D-7CA3-9044-876B-883B54F8677D}" type="slidenum">
-              <a:t>‹#›</a:t>
-            </a:fld>
-            <a:endParaRPr/>
+            <a:fld id="{86CB4B4D-7CA3-9044-876B-883B54F8677D}" type="slidenum"/>
           </a:p>
         </p:txBody>
       </p:sp>
@@ -3150,19 +3075,19 @@
   </p:cSld>
   <p:clrMap bg1="lt1" tx1="dk1" bg2="lt2" tx2="dk2" accent1="accent1" accent2="accent2" accent3="accent3" accent4="accent4" accent5="accent5" accent6="accent6" hlink="hlink" folHlink="folHlink"/>
   <p:sldLayoutIdLst>
-    <p:sldLayoutId id="2147483649" r:id="rId1"/>
-    <p:sldLayoutId id="2147483650" r:id="rId2"/>
-    <p:sldLayoutId id="2147483651" r:id="rId3"/>
-    <p:sldLayoutId id="2147483652" r:id="rId4"/>
-    <p:sldLayoutId id="2147483653" r:id="rId5"/>
-    <p:sldLayoutId id="2147483654" r:id="rId6"/>
-    <p:sldLayoutId id="2147483655" r:id="rId7"/>
-    <p:sldLayoutId id="2147483656" r:id="rId8"/>
-    <p:sldLayoutId id="2147483657" r:id="rId9"/>
-    <p:sldLayoutId id="2147483658" r:id="rId10"/>
-    <p:sldLayoutId id="2147483659" r:id="rId11"/>
+    <p:sldLayoutId id="2147483649" r:id="rId2"/>
+    <p:sldLayoutId id="2147483650" r:id="rId3"/>
+    <p:sldLayoutId id="2147483651" r:id="rId4"/>
+    <p:sldLayoutId id="2147483652" r:id="rId5"/>
+    <p:sldLayoutId id="2147483653" r:id="rId6"/>
+    <p:sldLayoutId id="2147483654" r:id="rId7"/>
+    <p:sldLayoutId id="2147483655" r:id="rId8"/>
+    <p:sldLayoutId id="2147483656" r:id="rId9"/>
+    <p:sldLayoutId id="2147483657" r:id="rId10"/>
+    <p:sldLayoutId id="2147483658" r:id="rId11"/>
+    <p:sldLayoutId id="2147483659" r:id="rId12"/>
   </p:sldLayoutIdLst>
-  <p:transition xmlns:p14="http://schemas.microsoft.com/office/powerpoint/2010/main" spd="med"/>
+  <p:transition spd="med" advClick="1"/>
   <p:txStyles>
     <p:titleStyle>
       <a:lvl1pPr algn="ctr">
@@ -3432,7 +3357,7 @@
           <a:sym typeface="Calibri"/>
         </a:defRPr>
       </a:lvl1pPr>
-      <a:lvl2pPr indent="457200" algn="r" defTabSz="457200">
+      <a:lvl2pPr algn="r" defTabSz="457200">
         <a:defRPr sz="1200">
           <a:solidFill>
             <a:schemeClr val="tx1"/>
@@ -3443,7 +3368,7 @@
           <a:sym typeface="Calibri"/>
         </a:defRPr>
       </a:lvl2pPr>
-      <a:lvl3pPr indent="914400" algn="r" defTabSz="457200">
+      <a:lvl3pPr algn="r" defTabSz="457200">
         <a:defRPr sz="1200">
           <a:solidFill>
             <a:schemeClr val="tx1"/>
@@ -3454,7 +3379,7 @@
           <a:sym typeface="Calibri"/>
         </a:defRPr>
       </a:lvl3pPr>
-      <a:lvl4pPr indent="1371600" algn="r" defTabSz="457200">
+      <a:lvl4pPr algn="r" defTabSz="457200">
         <a:defRPr sz="1200">
           <a:solidFill>
             <a:schemeClr val="tx1"/>
@@ -3465,7 +3390,7 @@
           <a:sym typeface="Calibri"/>
         </a:defRPr>
       </a:lvl4pPr>
-      <a:lvl5pPr indent="1828800" algn="r" defTabSz="457200">
+      <a:lvl5pPr algn="r" defTabSz="457200">
         <a:defRPr sz="1200">
           <a:solidFill>
             <a:schemeClr val="tx1"/>
@@ -3476,7 +3401,7 @@
           <a:sym typeface="Calibri"/>
         </a:defRPr>
       </a:lvl5pPr>
-      <a:lvl6pPr indent="2286000" algn="r" defTabSz="457200">
+      <a:lvl6pPr algn="r" defTabSz="457200">
         <a:defRPr sz="1200">
           <a:solidFill>
             <a:schemeClr val="tx1"/>
@@ -3487,7 +3412,7 @@
           <a:sym typeface="Calibri"/>
         </a:defRPr>
       </a:lvl6pPr>
-      <a:lvl7pPr indent="2743200" algn="r" defTabSz="457200">
+      <a:lvl7pPr algn="r" defTabSz="457200">
         <a:defRPr sz="1200">
           <a:solidFill>
             <a:schemeClr val="tx1"/>
@@ -3498,7 +3423,7 @@
           <a:sym typeface="Calibri"/>
         </a:defRPr>
       </a:lvl7pPr>
-      <a:lvl8pPr indent="3200400" algn="r" defTabSz="457200">
+      <a:lvl8pPr algn="r" defTabSz="457200">
         <a:defRPr sz="1200">
           <a:solidFill>
             <a:schemeClr val="tx1"/>
@@ -3509,7 +3434,7 @@
           <a:sym typeface="Calibri"/>
         </a:defRPr>
       </a:lvl8pPr>
-      <a:lvl9pPr indent="3657600" algn="r" defTabSz="457200">
+      <a:lvl9pPr algn="r" defTabSz="457200">
         <a:defRPr sz="1200">
           <a:solidFill>
             <a:schemeClr val="tx1"/>
@@ -3526,7 +3451,7 @@
 </file>
 
 <file path=ppt/slides/slide1.xml><?xml version="1.0" encoding="utf-8"?>
-<p:sld xmlns:a="http://schemas.openxmlformats.org/drawingml/2006/main" xmlns:r="http://schemas.openxmlformats.org/officeDocument/2006/relationships" xmlns:p="http://schemas.openxmlformats.org/presentationml/2006/main">
+<p:sld xmlns:a="http://schemas.openxmlformats.org/drawingml/2006/main" xmlns:r="http://schemas.openxmlformats.org/officeDocument/2006/relationships" xmlns:p="http://schemas.openxmlformats.org/presentationml/2006/main" showMasterSp="1" showMasterPhAnim="1">
   <p:cSld>
     <p:spTree>
       <p:nvGrpSpPr>
@@ -3545,9 +3470,7 @@
       <p:sp>
         <p:nvSpPr>
           <p:cNvPr id="49" name="Shape 49"/>
-          <p:cNvSpPr>
-            <a:spLocks noGrp="1"/>
-          </p:cNvSpPr>
+          <p:cNvSpPr/>
           <p:nvPr>
             <p:ph type="title"/>
           </p:nvPr>
@@ -3586,9 +3509,7 @@
       <p:sp>
         <p:nvSpPr>
           <p:cNvPr id="50" name="Shape 50"/>
-          <p:cNvSpPr>
-            <a:spLocks noGrp="1"/>
-          </p:cNvSpPr>
+          <p:cNvSpPr/>
           <p:nvPr>
             <p:ph type="body" idx="1"/>
           </p:nvPr>
@@ -3607,7 +3528,6 @@
           <a:lstStyle/>
           <a:p>
             <a:pPr lvl="0"/>
-            <a:endParaRPr/>
           </a:p>
         </p:txBody>
       </p:sp>
@@ -3616,12 +3536,92 @@
   <p:clrMapOvr>
     <a:masterClrMapping/>
   </p:clrMapOvr>
-  <p:transition xmlns:p14="http://schemas.microsoft.com/office/powerpoint/2010/main" spd="med"/>
+  <p:transition spd="med" advClick="1"/>
 </p:sld>
 </file>
 
 <file path=ppt/slides/slide10.xml><?xml version="1.0" encoding="utf-8"?>
-<p:sld xmlns:a="http://schemas.openxmlformats.org/drawingml/2006/main" xmlns:r="http://schemas.openxmlformats.org/officeDocument/2006/relationships" xmlns:p="http://schemas.openxmlformats.org/presentationml/2006/main">
+<p:sld xmlns:a="http://schemas.openxmlformats.org/drawingml/2006/main" xmlns:r="http://schemas.openxmlformats.org/officeDocument/2006/relationships" xmlns:p="http://schemas.openxmlformats.org/presentationml/2006/main" showMasterSp="1" showMasterPhAnim="1">
+  <p:cSld>
+    <p:spTree>
+      <p:nvGrpSpPr>
+        <p:cNvPr id="1" name=""/>
+        <p:cNvGrpSpPr/>
+        <p:nvPr/>
+      </p:nvGrpSpPr>
+      <p:grpSpPr>
+        <a:xfrm>
+          <a:off x="0" y="0"/>
+          <a:ext cx="0" cy="0"/>
+          <a:chOff x="0" y="0"/>
+          <a:chExt cx="0" cy="0"/>
+        </a:xfrm>
+      </p:grpSpPr>
+      <p:sp>
+        <p:nvSpPr>
+          <p:cNvPr id="79" name="Shape 79"/>
+          <p:cNvSpPr/>
+          <p:nvPr>
+            <p:ph type="title"/>
+          </p:nvPr>
+        </p:nvSpPr>
+        <p:spPr>
+          <a:xfrm>
+            <a:off x="457200" y="2723208"/>
+            <a:ext cx="8229600" cy="1143001"/>
+          </a:xfrm>
+          <a:prstGeom prst="rect">
+            <a:avLst/>
+          </a:prstGeom>
+        </p:spPr>
+        <p:txBody>
+          <a:bodyPr/>
+          <a:lstStyle/>
+          <a:p>
+            <a:pPr lvl="0">
+              <a:defRPr sz="1800">
+                <a:solidFill>
+                  <a:srgbClr val="000000"/>
+                </a:solidFill>
+              </a:defRPr>
+            </a:pPr>
+            <a:r>
+              <a:rPr sz="3900">
+                <a:solidFill>
+                  <a:srgbClr val="FFFFFF"/>
+                </a:solidFill>
+              </a:rPr>
+              <a:t>Key Conceptions</a:t>
+            </a:r>
+            <a:br>
+              <a:rPr sz="3900">
+                <a:solidFill>
+                  <a:srgbClr val="FFFFFF"/>
+                </a:solidFill>
+              </a:rPr>
+            </a:br>
+            <a:r>
+              <a:rPr sz="2400">
+                <a:solidFill>
+                  <a:srgbClr val="E46C0A"/>
+                </a:solidFill>
+              </a:rPr>
+              <a:t>HTTP Request, HTTP Response, URI, Port</a:t>
+            </a:r>
+          </a:p>
+        </p:txBody>
+      </p:sp>
+    </p:spTree>
+  </p:cSld>
+  <p:clrMapOvr>
+    <a:masterClrMapping/>
+  </p:clrMapOvr>
+  <p:transition spd="med" advClick="1"/>
+</p:sld>
+</file>
+
+<file path=ppt/slides/slide11.xml><?xml version="1.0" encoding="utf-8"?>
+<p:sld xmlns:a="http://schemas.openxmlformats.org/drawingml/2006/main" xmlns:r="http://schemas.openxmlformats.org/officeDocument/2006/relationships" xmlns:p="http://schemas.openxmlformats.org/presentationml/2006/main" showMasterSp="1" showMasterPhAnim="1">
   <p:cSld>
     <p:spTree>
       <p:nvGrpSpPr>
@@ -3640,9 +3640,7 @@
       <p:sp>
         <p:nvSpPr>
           <p:cNvPr id="81" name="Shape 81"/>
-          <p:cNvSpPr>
-            <a:spLocks noGrp="1"/>
-          </p:cNvSpPr>
+          <p:cNvSpPr/>
           <p:nvPr>
             <p:ph type="title"/>
           </p:nvPr>
@@ -3658,7 +3656,11 @@
         </p:spPr>
         <p:txBody>
           <a:bodyPr/>
-          <a:lstStyle/>
+          <a:lstStyle>
+            <a:lvl1pPr defTabSz="832102">
+              <a:defRPr sz="3100"/>
+            </a:lvl1pPr>
+          </a:lstStyle>
           <a:p>
             <a:pPr lvl="0">
               <a:defRPr sz="1800">
@@ -3668,27 +3670,12 @@
               </a:defRPr>
             </a:pPr>
             <a:r>
-              <a:rPr sz="3900">
-                <a:solidFill>
-                  <a:srgbClr val="FFFFFF"/>
-                </a:solidFill>
-              </a:rPr>
-              <a:t>Key Conceptions</a:t>
-            </a:r>
-            <a:br>
-              <a:rPr sz="3900">
-                <a:solidFill>
-                  <a:srgbClr val="FFFFFF"/>
-                </a:solidFill>
-              </a:rPr>
-            </a:br>
-            <a:r>
-              <a:rPr sz="2400">
-                <a:solidFill>
-                  <a:srgbClr val="E46C0A"/>
-                </a:solidFill>
-              </a:rPr>
-              <a:t>HTTP Request, HTTP Response, URI, Port</a:t>
+              <a:rPr sz="3100">
+                <a:solidFill>
+                  <a:srgbClr val="FFFFFF"/>
+                </a:solidFill>
+              </a:rPr>
+              <a:t>So, as a Web App developer, what should we do? </a:t>
             </a:r>
           </a:p>
         </p:txBody>
@@ -3698,12 +3685,12 @@
   <p:clrMapOvr>
     <a:masterClrMapping/>
   </p:clrMapOvr>
-  <p:transition xmlns:p14="http://schemas.microsoft.com/office/powerpoint/2010/main" spd="med"/>
+  <p:transition spd="med" advClick="1"/>
 </p:sld>
 </file>
 
-<file path=ppt/slides/slide11.xml><?xml version="1.0" encoding="utf-8"?>
-<p:sld xmlns:a="http://schemas.openxmlformats.org/drawingml/2006/main" xmlns:r="http://schemas.openxmlformats.org/officeDocument/2006/relationships" xmlns:p="http://schemas.openxmlformats.org/presentationml/2006/main">
+<file path=ppt/slides/slide12.xml><?xml version="1.0" encoding="utf-8"?>
+<p:sld xmlns:a="http://schemas.openxmlformats.org/drawingml/2006/main" xmlns:r="http://schemas.openxmlformats.org/officeDocument/2006/relationships" xmlns:p="http://schemas.openxmlformats.org/presentationml/2006/main" showMasterSp="1" showMasterPhAnim="1">
   <p:cSld>
     <p:spTree>
       <p:nvGrpSpPr>
@@ -3721,10 +3708,8 @@
       </p:grpSpPr>
       <p:sp>
         <p:nvSpPr>
-          <p:cNvPr id="83" name="Shape 83"/>
-          <p:cNvSpPr>
-            <a:spLocks noGrp="1"/>
-          </p:cNvSpPr>
+          <p:cNvPr id="85" name="Shape 85"/>
+          <p:cNvSpPr/>
           <p:nvPr>
             <p:ph type="title"/>
           </p:nvPr>
@@ -3739,16 +3724,10 @@
           </a:prstGeom>
         </p:spPr>
         <p:txBody>
-          <a:bodyPr>
-            <a:normAutofit fontScale="90000"/>
-          </a:bodyPr>
-          <a:lstStyle>
-            <a:lvl1pPr defTabSz="832104">
-              <a:defRPr sz="3549"/>
-            </a:lvl1pPr>
-          </a:lstStyle>
-          <a:p>
-            <a:pPr lvl="0">
+          <a:bodyPr/>
+          <a:lstStyle/>
+          <a:p>
+            <a:pPr lvl="0" defTabSz="749808">
               <a:defRPr sz="1800">
                 <a:solidFill>
                   <a:srgbClr val="000000"/>
@@ -3756,12 +3735,42 @@
               </a:defRPr>
             </a:pPr>
             <a:r>
-              <a:rPr sz="3549">
-                <a:solidFill>
-                  <a:srgbClr val="FFFFFF"/>
-                </a:solidFill>
-              </a:rPr>
-              <a:t>So, as a Web App developer, what should we do? </a:t>
+              <a:rPr sz="2700">
+                <a:solidFill>
+                  <a:srgbClr val="FFFFFF"/>
+                </a:solidFill>
+              </a:rPr>
+              <a:t>Rack</a:t>
+            </a:r>
+            <a:br>
+              <a:rPr sz="2700">
+                <a:solidFill>
+                  <a:srgbClr val="FFFFFF"/>
+                </a:solidFill>
+              </a:rPr>
+            </a:br>
+            <a:r>
+              <a:rPr sz="1700">
+                <a:solidFill>
+                  <a:srgbClr val="E46C0A"/>
+                </a:solidFill>
+              </a:rPr>
+              <a:t>A interface between http server </a:t>
+            </a:r>
+            <a:br>
+              <a:rPr sz="1700">
+                <a:solidFill>
+                  <a:srgbClr val="E46C0A"/>
+                </a:solidFill>
+              </a:rPr>
+            </a:br>
+            <a:r>
+              <a:rPr sz="1700">
+                <a:solidFill>
+                  <a:srgbClr val="E46C0A"/>
+                </a:solidFill>
+              </a:rPr>
+              <a:t>and web app in Ruby world</a:t>
             </a:r>
           </a:p>
         </p:txBody>
@@ -3771,12 +3780,12 @@
   <p:clrMapOvr>
     <a:masterClrMapping/>
   </p:clrMapOvr>
-  <p:transition xmlns:p14="http://schemas.microsoft.com/office/powerpoint/2010/main" spd="med"/>
+  <p:transition spd="med" advClick="1"/>
 </p:sld>
 </file>
 
-<file path=ppt/slides/slide12.xml><?xml version="1.0" encoding="utf-8"?>
-<p:sld xmlns:a="http://schemas.openxmlformats.org/drawingml/2006/main" xmlns:r="http://schemas.openxmlformats.org/officeDocument/2006/relationships" xmlns:p="http://schemas.openxmlformats.org/presentationml/2006/main">
+<file path=ppt/slides/slide13.xml><?xml version="1.0" encoding="utf-8"?>
+<p:sld xmlns:a="http://schemas.openxmlformats.org/drawingml/2006/main" xmlns:r="http://schemas.openxmlformats.org/officeDocument/2006/relationships" xmlns:p="http://schemas.openxmlformats.org/presentationml/2006/main" showMasterSp="1" showMasterPhAnim="1">
   <p:cSld>
     <p:spTree>
       <p:nvGrpSpPr>
@@ -3795,9 +3804,7 @@
       <p:sp>
         <p:nvSpPr>
           <p:cNvPr id="87" name="Shape 87"/>
-          <p:cNvSpPr>
-            <a:spLocks noGrp="1"/>
-          </p:cNvSpPr>
+          <p:cNvSpPr/>
           <p:nvPr>
             <p:ph type="title"/>
           </p:nvPr>
@@ -3812,12 +3819,10 @@
           </a:prstGeom>
         </p:spPr>
         <p:txBody>
-          <a:bodyPr>
-            <a:normAutofit fontScale="90000"/>
-          </a:bodyPr>
+          <a:bodyPr/>
           <a:lstStyle/>
           <a:p>
-            <a:pPr lvl="0" defTabSz="749808">
+            <a:pPr lvl="0">
               <a:defRPr sz="1800">
                 <a:solidFill>
                   <a:srgbClr val="000000"/>
@@ -3825,42 +3830,27 @@
               </a:defRPr>
             </a:pPr>
             <a:r>
-              <a:rPr sz="3198">
-                <a:solidFill>
-                  <a:srgbClr val="FFFFFF"/>
-                </a:solidFill>
-              </a:rPr>
-              <a:t>Rack</a:t>
+              <a:rPr sz="3900">
+                <a:solidFill>
+                  <a:srgbClr val="FFFFFF"/>
+                </a:solidFill>
+              </a:rPr>
+              <a:t>Example</a:t>
             </a:r>
             <a:br>
-              <a:rPr sz="3198">
+              <a:rPr sz="3900">
                 <a:solidFill>
                   <a:srgbClr val="FFFFFF"/>
                 </a:solidFill>
               </a:rPr>
             </a:br>
             <a:r>
-              <a:rPr sz="1968">
+              <a:rPr sz="2400">
                 <a:solidFill>
                   <a:srgbClr val="E46C0A"/>
                 </a:solidFill>
               </a:rPr>
-              <a:t>A interface between http server </a:t>
-            </a:r>
-            <a:br>
-              <a:rPr sz="1968">
-                <a:solidFill>
-                  <a:srgbClr val="E46C0A"/>
-                </a:solidFill>
-              </a:rPr>
-            </a:br>
-            <a:r>
-              <a:rPr sz="1968">
-                <a:solidFill>
-                  <a:srgbClr val="E46C0A"/>
-                </a:solidFill>
-              </a:rPr>
-              <a:t>and web app in Ruby world</a:t>
+              <a:t>Connecting to HTTP Server</a:t>
             </a:r>
           </a:p>
         </p:txBody>
@@ -3870,12 +3860,12 @@
   <p:clrMapOvr>
     <a:masterClrMapping/>
   </p:clrMapOvr>
-  <p:transition xmlns:p14="http://schemas.microsoft.com/office/powerpoint/2010/main" spd="med"/>
+  <p:transition spd="med" advClick="1"/>
 </p:sld>
 </file>
 
-<file path=ppt/slides/slide13.xml><?xml version="1.0" encoding="utf-8"?>
-<p:sld xmlns:a="http://schemas.openxmlformats.org/drawingml/2006/main" xmlns:r="http://schemas.openxmlformats.org/officeDocument/2006/relationships" xmlns:p="http://schemas.openxmlformats.org/presentationml/2006/main">
+<file path=ppt/slides/slide14.xml><?xml version="1.0" encoding="utf-8"?>
+<p:sld xmlns:a="http://schemas.openxmlformats.org/drawingml/2006/main" xmlns:r="http://schemas.openxmlformats.org/officeDocument/2006/relationships" xmlns:p="http://schemas.openxmlformats.org/presentationml/2006/main" showMasterSp="1" showMasterPhAnim="1">
   <p:cSld>
     <p:spTree>
       <p:nvGrpSpPr>
@@ -3893,10 +3883,8 @@
       </p:grpSpPr>
       <p:sp>
         <p:nvSpPr>
-          <p:cNvPr id="89" name="Shape 89"/>
-          <p:cNvSpPr>
-            <a:spLocks noGrp="1"/>
-          </p:cNvSpPr>
+          <p:cNvPr id="91" name="Shape 91"/>
+          <p:cNvSpPr/>
           <p:nvPr>
             <p:ph type="title"/>
           </p:nvPr>
@@ -3942,7 +3930,7 @@
                   <a:srgbClr val="E46C0A"/>
                 </a:solidFill>
               </a:rPr>
-              <a:t>Connecting to HTTP Server</a:t>
+              <a:t>Handling HTTP Request and Response – Rack env</a:t>
             </a:r>
           </a:p>
         </p:txBody>
@@ -3952,12 +3940,12 @@
   <p:clrMapOvr>
     <a:masterClrMapping/>
   </p:clrMapOvr>
-  <p:transition xmlns:p14="http://schemas.microsoft.com/office/powerpoint/2010/main" spd="med"/>
+  <p:transition spd="med" advClick="1"/>
 </p:sld>
 </file>
 
-<file path=ppt/slides/slide14.xml><?xml version="1.0" encoding="utf-8"?>
-<p:sld xmlns:a="http://schemas.openxmlformats.org/drawingml/2006/main" xmlns:r="http://schemas.openxmlformats.org/officeDocument/2006/relationships" xmlns:p="http://schemas.openxmlformats.org/presentationml/2006/main">
+<file path=ppt/slides/slide15.xml><?xml version="1.0" encoding="utf-8"?>
+<p:sld xmlns:a="http://schemas.openxmlformats.org/drawingml/2006/main" xmlns:r="http://schemas.openxmlformats.org/officeDocument/2006/relationships" xmlns:p="http://schemas.openxmlformats.org/presentationml/2006/main" showMasterSp="1" showMasterPhAnim="1">
   <p:cSld>
     <p:spTree>
       <p:nvGrpSpPr>
@@ -3976,9 +3964,7 @@
       <p:sp>
         <p:nvSpPr>
           <p:cNvPr id="93" name="Shape 93"/>
-          <p:cNvSpPr>
-            <a:spLocks noGrp="1"/>
-          </p:cNvSpPr>
+          <p:cNvSpPr/>
           <p:nvPr>
             <p:ph type="title"/>
           </p:nvPr>
@@ -4024,7 +4010,7 @@
                   <a:srgbClr val="E46C0A"/>
                 </a:solidFill>
               </a:rPr>
-              <a:t>Handling HTTP Request and Response – Rack env</a:t>
+              <a:t>URL Mapping – env &amp; Request</a:t>
             </a:r>
           </a:p>
         </p:txBody>
@@ -4034,12 +4020,12 @@
   <p:clrMapOvr>
     <a:masterClrMapping/>
   </p:clrMapOvr>
-  <p:transition xmlns:p14="http://schemas.microsoft.com/office/powerpoint/2010/main" spd="med"/>
+  <p:transition spd="med" advClick="1"/>
 </p:sld>
 </file>
 
-<file path=ppt/slides/slide15.xml><?xml version="1.0" encoding="utf-8"?>
-<p:sld xmlns:a="http://schemas.openxmlformats.org/drawingml/2006/main" xmlns:r="http://schemas.openxmlformats.org/officeDocument/2006/relationships" xmlns:p="http://schemas.openxmlformats.org/presentationml/2006/main">
+<file path=ppt/slides/slide16.xml><?xml version="1.0" encoding="utf-8"?>
+<p:sld xmlns:a="http://schemas.openxmlformats.org/drawingml/2006/main" xmlns:r="http://schemas.openxmlformats.org/officeDocument/2006/relationships" xmlns:p="http://schemas.openxmlformats.org/presentationml/2006/main" showMasterSp="1" showMasterPhAnim="1">
   <p:cSld>
     <p:spTree>
       <p:nvGrpSpPr>
@@ -4057,10 +4043,8 @@
       </p:grpSpPr>
       <p:sp>
         <p:nvSpPr>
-          <p:cNvPr id="95" name="Shape 95"/>
-          <p:cNvSpPr>
-            <a:spLocks noGrp="1"/>
-          </p:cNvSpPr>
+          <p:cNvPr id="97" name="Shape 97"/>
+          <p:cNvSpPr/>
           <p:nvPr>
             <p:ph type="title"/>
           </p:nvPr>
@@ -4106,7 +4090,7 @@
                   <a:srgbClr val="E46C0A"/>
                 </a:solidFill>
               </a:rPr>
-              <a:t>URL Mapping – env &amp; Request</a:t>
+              <a:t>HTTP Methods</a:t>
             </a:r>
           </a:p>
         </p:txBody>
@@ -4116,12 +4100,12 @@
   <p:clrMapOvr>
     <a:masterClrMapping/>
   </p:clrMapOvr>
-  <p:transition xmlns:p14="http://schemas.microsoft.com/office/powerpoint/2010/main" spd="med"/>
+  <p:transition spd="med" advClick="1"/>
 </p:sld>
 </file>
 
-<file path=ppt/slides/slide16.xml><?xml version="1.0" encoding="utf-8"?>
-<p:sld xmlns:a="http://schemas.openxmlformats.org/drawingml/2006/main" xmlns:r="http://schemas.openxmlformats.org/officeDocument/2006/relationships" xmlns:p="http://schemas.openxmlformats.org/presentationml/2006/main">
+<file path=ppt/slides/slide17.xml><?xml version="1.0" encoding="utf-8"?>
+<p:sld xmlns:a="http://schemas.openxmlformats.org/drawingml/2006/main" xmlns:r="http://schemas.openxmlformats.org/officeDocument/2006/relationships" xmlns:p="http://schemas.openxmlformats.org/presentationml/2006/main" showMasterSp="1" showMasterPhAnim="1">
   <p:cSld>
     <p:spTree>
       <p:nvGrpSpPr>
@@ -4139,10 +4123,8 @@
       </p:grpSpPr>
       <p:sp>
         <p:nvSpPr>
-          <p:cNvPr id="99" name="Shape 99"/>
-          <p:cNvSpPr>
-            <a:spLocks noGrp="1"/>
-          </p:cNvSpPr>
+          <p:cNvPr id="101" name="Shape 101"/>
+          <p:cNvSpPr/>
           <p:nvPr>
             <p:ph type="title"/>
           </p:nvPr>
@@ -4188,7 +4170,7 @@
                   <a:srgbClr val="E46C0A"/>
                 </a:solidFill>
               </a:rPr>
-              <a:t>HTTP Methods</a:t>
+              <a:t>Static File</a:t>
             </a:r>
           </a:p>
         </p:txBody>
@@ -4198,12 +4180,12 @@
   <p:clrMapOvr>
     <a:masterClrMapping/>
   </p:clrMapOvr>
-  <p:transition xmlns:p14="http://schemas.microsoft.com/office/powerpoint/2010/main" spd="med"/>
+  <p:transition spd="med" advClick="1"/>
 </p:sld>
 </file>
 
-<file path=ppt/slides/slide17.xml><?xml version="1.0" encoding="utf-8"?>
-<p:sld xmlns:a="http://schemas.openxmlformats.org/drawingml/2006/main" xmlns:r="http://schemas.openxmlformats.org/officeDocument/2006/relationships" xmlns:p="http://schemas.openxmlformats.org/presentationml/2006/main">
+<file path=ppt/slides/slide18.xml><?xml version="1.0" encoding="utf-8"?>
+<p:sld xmlns:a="http://schemas.openxmlformats.org/drawingml/2006/main" xmlns:r="http://schemas.openxmlformats.org/officeDocument/2006/relationships" xmlns:p="http://schemas.openxmlformats.org/presentationml/2006/main" showMasterSp="1" showMasterPhAnim="1">
   <p:cSld>
     <p:spTree>
       <p:nvGrpSpPr>
@@ -4221,10 +4203,8 @@
       </p:grpSpPr>
       <p:sp>
         <p:nvSpPr>
-          <p:cNvPr id="103" name="Shape 103"/>
-          <p:cNvSpPr>
-            <a:spLocks noGrp="1"/>
-          </p:cNvSpPr>
+          <p:cNvPr id="105" name="Shape 105"/>
+          <p:cNvSpPr/>
           <p:nvPr>
             <p:ph type="title"/>
           </p:nvPr>
@@ -4270,7 +4250,7 @@
                   <a:srgbClr val="E46C0A"/>
                 </a:solidFill>
               </a:rPr>
-              <a:t>Static File</a:t>
+              <a:t>Rack Middleware: mapping, http methods, static</a:t>
             </a:r>
           </a:p>
         </p:txBody>
@@ -4280,12 +4260,12 @@
   <p:clrMapOvr>
     <a:masterClrMapping/>
   </p:clrMapOvr>
-  <p:transition xmlns:p14="http://schemas.microsoft.com/office/powerpoint/2010/main" spd="med"/>
+  <p:transition spd="med" advClick="1"/>
 </p:sld>
 </file>
 
-<file path=ppt/slides/slide18.xml><?xml version="1.0" encoding="utf-8"?>
-<p:sld xmlns:a="http://schemas.openxmlformats.org/drawingml/2006/main" xmlns:r="http://schemas.openxmlformats.org/officeDocument/2006/relationships" xmlns:p="http://schemas.openxmlformats.org/presentationml/2006/main">
+<file path=ppt/slides/slide19.xml><?xml version="1.0" encoding="utf-8"?>
+<p:sld xmlns:a="http://schemas.openxmlformats.org/drawingml/2006/main" xmlns:r="http://schemas.openxmlformats.org/officeDocument/2006/relationships" xmlns:p="http://schemas.openxmlformats.org/presentationml/2006/main" showMasterSp="1" showMasterPhAnim="1">
   <p:cSld>
     <p:spTree>
       <p:nvGrpSpPr>
@@ -4303,10 +4283,8 @@
       </p:grpSpPr>
       <p:sp>
         <p:nvSpPr>
-          <p:cNvPr id="107" name="Shape 107"/>
-          <p:cNvSpPr>
-            <a:spLocks noGrp="1"/>
-          </p:cNvSpPr>
+          <p:cNvPr id="109" name="Shape 109"/>
+          <p:cNvSpPr/>
           <p:nvPr>
             <p:ph type="title"/>
           </p:nvPr>
@@ -4332,27 +4310,12 @@
               </a:defRPr>
             </a:pPr>
             <a:r>
-              <a:rPr sz="3900">
-                <a:solidFill>
-                  <a:srgbClr val="FFFFFF"/>
-                </a:solidFill>
-              </a:rPr>
-              <a:t>Example</a:t>
-            </a:r>
-            <a:br>
-              <a:rPr sz="3900">
-                <a:solidFill>
-                  <a:srgbClr val="FFFFFF"/>
-                </a:solidFill>
-              </a:rPr>
-            </a:br>
-            <a:r>
-              <a:rPr sz="2400">
-                <a:solidFill>
-                  <a:srgbClr val="E46C0A"/>
-                </a:solidFill>
-              </a:rPr>
-              <a:t>Rack Middleware: mapping, http methods, static</a:t>
+              <a:rPr sz="4400">
+                <a:solidFill>
+                  <a:srgbClr val="FFFFFF"/>
+                </a:solidFill>
+              </a:rPr>
+              <a:t>But …</a:t>
             </a:r>
           </a:p>
         </p:txBody>
@@ -4362,79 +4325,12 @@
   <p:clrMapOvr>
     <a:masterClrMapping/>
   </p:clrMapOvr>
-  <p:transition xmlns:p14="http://schemas.microsoft.com/office/powerpoint/2010/main" spd="med"/>
-</p:sld>
-</file>
-
-<file path=ppt/slides/slide19.xml><?xml version="1.0" encoding="utf-8"?>
-<p:sld xmlns:a="http://schemas.openxmlformats.org/drawingml/2006/main" xmlns:r="http://schemas.openxmlformats.org/officeDocument/2006/relationships" xmlns:p="http://schemas.openxmlformats.org/presentationml/2006/main">
-  <p:cSld>
-    <p:spTree>
-      <p:nvGrpSpPr>
-        <p:cNvPr id="1" name=""/>
-        <p:cNvGrpSpPr/>
-        <p:nvPr/>
-      </p:nvGrpSpPr>
-      <p:grpSpPr>
-        <a:xfrm>
-          <a:off x="0" y="0"/>
-          <a:ext cx="0" cy="0"/>
-          <a:chOff x="0" y="0"/>
-          <a:chExt cx="0" cy="0"/>
-        </a:xfrm>
-      </p:grpSpPr>
-      <p:sp>
-        <p:nvSpPr>
-          <p:cNvPr id="111" name="Shape 111"/>
-          <p:cNvSpPr>
-            <a:spLocks noGrp="1"/>
-          </p:cNvSpPr>
-          <p:nvPr>
-            <p:ph type="title"/>
-          </p:nvPr>
-        </p:nvSpPr>
-        <p:spPr>
-          <a:xfrm>
-            <a:off x="457200" y="2723208"/>
-            <a:ext cx="8229600" cy="1143001"/>
-          </a:xfrm>
-          <a:prstGeom prst="rect">
-            <a:avLst/>
-          </a:prstGeom>
-        </p:spPr>
-        <p:txBody>
-          <a:bodyPr/>
-          <a:lstStyle/>
-          <a:p>
-            <a:pPr lvl="0">
-              <a:defRPr sz="1800">
-                <a:solidFill>
-                  <a:srgbClr val="000000"/>
-                </a:solidFill>
-              </a:defRPr>
-            </a:pPr>
-            <a:r>
-              <a:rPr sz="4400">
-                <a:solidFill>
-                  <a:srgbClr val="FFFFFF"/>
-                </a:solidFill>
-              </a:rPr>
-              <a:t>But …</a:t>
-            </a:r>
-          </a:p>
-        </p:txBody>
-      </p:sp>
-    </p:spTree>
-  </p:cSld>
-  <p:clrMapOvr>
-    <a:masterClrMapping/>
-  </p:clrMapOvr>
-  <p:transition xmlns:p14="http://schemas.microsoft.com/office/powerpoint/2010/main" spd="med"/>
+  <p:transition spd="med" advClick="1"/>
 </p:sld>
 </file>
 
 <file path=ppt/slides/slide2.xml><?xml version="1.0" encoding="utf-8"?>
-<p:sld xmlns:a="http://schemas.openxmlformats.org/drawingml/2006/main" xmlns:r="http://schemas.openxmlformats.org/officeDocument/2006/relationships" xmlns:p="http://schemas.openxmlformats.org/presentationml/2006/main">
+<p:sld xmlns:a="http://schemas.openxmlformats.org/drawingml/2006/main" xmlns:r="http://schemas.openxmlformats.org/officeDocument/2006/relationships" xmlns:p="http://schemas.openxmlformats.org/presentationml/2006/main" showMasterSp="1" showMasterPhAnim="1">
   <p:cSld>
     <p:spTree>
       <p:nvGrpSpPr>
@@ -4494,7 +4390,7 @@
         <p:spPr>
           <a:xfrm>
             <a:off x="4859151" y="2400300"/>
-            <a:ext cx="952567" cy="2044843"/>
+            <a:ext cx="952569" cy="2044844"/>
           </a:xfrm>
           <a:prstGeom prst="rect">
             <a:avLst/>
@@ -4521,7 +4417,7 @@
         <p:spPr>
           <a:xfrm>
             <a:off x="2987511" y="2489200"/>
-            <a:ext cx="1231987" cy="1867031"/>
+            <a:ext cx="1231989" cy="1867031"/>
           </a:xfrm>
           <a:prstGeom prst="rect">
             <a:avLst/>
@@ -4547,8 +4443,8 @@
         </p:blipFill>
         <p:spPr>
           <a:xfrm>
-            <a:off x="5734742" y="3331423"/>
-            <a:ext cx="698549" cy="381027"/>
+            <a:off x="5734741" y="3331423"/>
+            <a:ext cx="698551" cy="381029"/>
           </a:xfrm>
           <a:prstGeom prst="rect">
             <a:avLst/>
@@ -4575,7 +4471,7 @@
         <p:spPr>
           <a:xfrm>
             <a:off x="6308978" y="2400300"/>
-            <a:ext cx="977969" cy="2044843"/>
+            <a:ext cx="977971" cy="2044844"/>
           </a:xfrm>
           <a:prstGeom prst="rect">
             <a:avLst/>
@@ -4602,7 +4498,7 @@
         <p:spPr>
           <a:xfrm>
             <a:off x="4229346" y="3331793"/>
-            <a:ext cx="698549" cy="381027"/>
+            <a:ext cx="698551" cy="381029"/>
           </a:xfrm>
           <a:prstGeom prst="rect">
             <a:avLst/>
@@ -4628,8 +4524,8 @@
         </p:blipFill>
         <p:spPr>
           <a:xfrm>
-            <a:off x="7235629" y="3324214"/>
-            <a:ext cx="698549" cy="381027"/>
+            <a:off x="7235628" y="3324214"/>
+            <a:ext cx="698551" cy="381029"/>
           </a:xfrm>
           <a:prstGeom prst="rect">
             <a:avLst/>
@@ -4655,8 +4551,8 @@
         </p:blipFill>
         <p:spPr>
           <a:xfrm>
-            <a:off x="7827811" y="2897896"/>
-            <a:ext cx="1024281" cy="1129581"/>
+            <a:off x="7827811" y="2897895"/>
+            <a:ext cx="1024283" cy="1129583"/>
           </a:xfrm>
           <a:prstGeom prst="rect">
             <a:avLst/>
@@ -4674,8 +4570,8 @@
         </p:nvSpPr>
         <p:spPr>
           <a:xfrm flipH="1" flipV="1">
-            <a:off x="1533057" y="5400585"/>
-            <a:ext cx="469070" cy="503446"/>
+            <a:off x="1533057" y="5400586"/>
+            <a:ext cx="469071" cy="503447"/>
           </a:xfrm>
           <a:prstGeom prst="line">
             <a:avLst/>
@@ -4687,7 +4583,7 @@
             <a:tailEnd type="triangle"/>
           </a:ln>
           <a:effectLst>
-            <a:outerShdw blurRad="38100" dist="20000" dir="5400000" rotWithShape="0">
+            <a:outerShdw sx="100000" sy="100000" kx="0" ky="0" algn="b" rotWithShape="0" blurRad="38100" dist="20000" dir="5400000">
               <a:srgbClr val="000000">
                 <a:alpha val="38000"/>
               </a:srgbClr>
@@ -4699,14 +4595,8 @@
           <a:lstStyle/>
           <a:p>
             <a:pPr lvl="0">
-              <a:defRPr sz="1200">
-                <a:latin typeface="+mn-lt"/>
-                <a:ea typeface="+mn-ea"/>
-                <a:cs typeface="+mn-cs"/>
-                <a:sym typeface="Helvetica"/>
-              </a:defRPr>
-            </a:pPr>
-            <a:endParaRPr/>
+              <a:defRPr sz="1200"/>
+            </a:pPr>
           </a:p>
         </p:txBody>
       </p:sp>
@@ -4719,7 +4609,7 @@
         <p:spPr>
           <a:xfrm>
             <a:off x="2025454" y="5698075"/>
-            <a:ext cx="5036007" cy="624841"/>
+            <a:ext cx="5036003" cy="624837"/>
           </a:xfrm>
           <a:prstGeom prst="rect">
             <a:avLst/>
@@ -4734,7 +4624,7 @@
           </a:extLst>
         </p:spPr>
         <p:txBody>
-          <a:bodyPr wrap="none" lIns="45719" rIns="45719">
+          <a:bodyPr wrap="none" lIns="45718" tIns="45718" rIns="45718" bIns="45718">
             <a:spAutoFit/>
           </a:bodyPr>
           <a:lstStyle>
@@ -4743,6 +4633,10 @@
                 <a:solidFill>
                   <a:srgbClr val="FFFFFF"/>
                 </a:solidFill>
+                <a:latin typeface="Calibri"/>
+                <a:ea typeface="Calibri"/>
+                <a:cs typeface="Calibri"/>
+                <a:sym typeface="Calibri"/>
               </a:defRPr>
             </a:lvl1pPr>
           </a:lstStyle>
@@ -4770,14 +4664,14 @@
   <p:clrMapOvr>
     <a:masterClrMapping/>
   </p:clrMapOvr>
-  <p:transition xmlns:p14="http://schemas.microsoft.com/office/powerpoint/2010/main" spd="med"/>
+  <p:transition spd="med" advClick="1"/>
   <p:timing>
     <p:tnLst>
       <p:par>
-        <p:cTn xmlns:p14="http://schemas.microsoft.com/office/powerpoint/2010/main" id="1" dur="indefinite" restart="never" fill="hold" nodeType="tmRoot">
+        <p:cTn id="1" nodeType="tmRoot" restart="never" dur="indefinite" fill="hold">
           <p:childTnLst>
             <p:seq concurrent="1" prevAc="none" nextAc="seek">
-              <p:cTn id="2" dur="indefinite" fill="hold" nodeType="mainSeq">
+              <p:cTn id="2" nodeType="mainSeq" dur="indefinite" fill="hold">
                 <p:childTnLst>
                   <p:par>
                     <p:cTn id="3" fill="hold">
@@ -4792,11 +4686,11 @@
                             </p:stCondLst>
                             <p:childTnLst>
                               <p:par>
-                                <p:cTn id="5" presetID="1" presetClass="entr" presetSubtype="0" fill="hold" grpId="1" nodeType="clickEffect">
+                                <p:cTn id="5" nodeType="clickEffect" presetClass="entr" presetSubtype="0" presetID="1" grpId="1" fill="hold">
                                   <p:stCondLst>
                                     <p:cond delay="0"/>
                                   </p:stCondLst>
-                                  <p:iterate>
+                                  <p:iterate type="el" backwards="0">
                                     <p:tmAbs val="0"/>
                                   </p:iterate>
                                   <p:childTnLst>
@@ -4827,11 +4721,11 @@
                             </p:stCondLst>
                             <p:childTnLst>
                               <p:par>
-                                <p:cTn id="8" presetID="1" presetClass="entr" presetSubtype="0" fill="hold" grpId="2" nodeType="afterEffect">
+                                <p:cTn id="8" nodeType="afterEffect" presetClass="entr" presetSubtype="0" presetID="1" grpId="2" fill="hold">
                                   <p:stCondLst>
                                     <p:cond delay="0"/>
                                   </p:stCondLst>
-                                  <p:iterate>
+                                  <p:iterate type="el" backwards="0">
                                     <p:tmAbs val="0"/>
                                   </p:iterate>
                                   <p:childTnLst>
@@ -4861,14 +4755,14 @@
                 </p:childTnLst>
               </p:cTn>
               <p:prevCondLst>
-                <p:cond evt="onPrev" delay="0">
+                <p:cond evt="onPrev">
                   <p:tgtEl>
                     <p:sldTgt/>
                   </p:tgtEl>
                 </p:cond>
               </p:prevCondLst>
               <p:nextCondLst>
-                <p:cond evt="onNext" delay="0">
+                <p:cond evt="onNext">
                   <p:tgtEl>
                     <p:sldTgt/>
                   </p:tgtEl>
@@ -4880,15 +4774,492 @@
       </p:par>
     </p:tnLst>
     <p:bldLst>
-      <p:bldP spid="60" grpId="1" animBg="1" advAuto="0"/>
-      <p:bldP spid="61" grpId="2" animBg="1" advAuto="0"/>
+      <p:bldP build="whole" bldLvl="1" animBg="1" rev="0" advAuto="0" spid="61" grpId="2"/>
+      <p:bldP build="whole" bldLvl="1" animBg="1" rev="0" advAuto="0" spid="60" grpId="1"/>
     </p:bldLst>
   </p:timing>
 </p:sld>
 </file>
 
+<file path=ppt/slides/slide20.xml><?xml version="1.0" encoding="utf-8"?>
+<p:sld xmlns:a="http://schemas.openxmlformats.org/drawingml/2006/main" xmlns:r="http://schemas.openxmlformats.org/officeDocument/2006/relationships" xmlns:p="http://schemas.openxmlformats.org/presentationml/2006/main" showMasterSp="1" showMasterPhAnim="1">
+  <p:cSld>
+    <p:spTree>
+      <p:nvGrpSpPr>
+        <p:cNvPr id="1" name=""/>
+        <p:cNvGrpSpPr/>
+        <p:nvPr/>
+      </p:nvGrpSpPr>
+      <p:grpSpPr>
+        <a:xfrm>
+          <a:off x="0" y="0"/>
+          <a:ext cx="0" cy="0"/>
+          <a:chOff x="0" y="0"/>
+          <a:chExt cx="0" cy="0"/>
+        </a:xfrm>
+      </p:grpSpPr>
+      <p:sp>
+        <p:nvSpPr>
+          <p:cNvPr id="113" name="Shape 113"/>
+          <p:cNvSpPr/>
+          <p:nvPr>
+            <p:ph type="sldNum" sz="quarter" idx="2"/>
+          </p:nvPr>
+        </p:nvSpPr>
+        <p:spPr>
+          <a:xfrm>
+            <a:off x="6553200" y="6404290"/>
+            <a:ext cx="2133600" cy="269240"/>
+          </a:xfrm>
+          <a:prstGeom prst="rect">
+            <a:avLst/>
+          </a:prstGeom>
+          <a:extLst>
+            <a:ext uri="{C572A759-6A51-4108-AA02-DFA0A04FC94B}">
+              <ma14:wrappingTextBoxFlag xmlns:ma14="http://schemas.microsoft.com/office/mac/drawingml/2011/main" val="1"/>
+            </a:ext>
+          </a:extLst>
+        </p:spPr>
+        <p:txBody>
+          <a:bodyPr lIns="0" tIns="0" rIns="0" bIns="0">
+            <a:normAutofit fontScale="100000" lnSpcReduction="0"/>
+          </a:bodyPr>
+          <a:lstStyle/>
+          <a:p>
+            <a:pPr lvl="0">
+              <a:defRPr sz="1800">
+                <a:solidFill>
+                  <a:srgbClr val="000000"/>
+                </a:solidFill>
+              </a:defRPr>
+            </a:pPr>
+            <a:fld id="{86CB4B4D-7CA3-9044-876B-883B54F8677D}" type="slidenum">
+              <a:rPr sz="1200">
+                <a:solidFill>
+                  <a:srgbClr val="FFFFFF"/>
+                </a:solidFill>
+              </a:rPr>
+            </a:fld>
+          </a:p>
+        </p:txBody>
+      </p:sp>
+      <p:sp>
+        <p:nvSpPr>
+          <p:cNvPr id="114" name="Shape 114"/>
+          <p:cNvSpPr/>
+          <p:nvPr/>
+        </p:nvSpPr>
+        <p:spPr>
+          <a:xfrm>
+            <a:off x="3707606" y="3187699"/>
+            <a:ext cx="1728788" cy="482601"/>
+          </a:xfrm>
+          <a:prstGeom prst="rect">
+            <a:avLst/>
+          </a:prstGeom>
+          <a:ln w="12700">
+            <a:miter lim="400000"/>
+          </a:ln>
+          <a:extLst>
+            <a:ext uri="{C572A759-6A51-4108-AA02-DFA0A04FC94B}">
+              <ma14:wrappingTextBoxFlag xmlns:ma14="http://schemas.microsoft.com/office/mac/drawingml/2011/main" val="1"/>
+            </a:ext>
+          </a:extLst>
+        </p:spPr>
+        <p:txBody>
+          <a:bodyPr wrap="none" lIns="0" tIns="0" rIns="0" bIns="0">
+            <a:spAutoFit/>
+          </a:bodyPr>
+          <a:lstStyle>
+            <a:lvl1pPr>
+              <a:defRPr sz="3200">
+                <a:solidFill>
+                  <a:srgbClr val="FFFFFF"/>
+                </a:solidFill>
+              </a:defRPr>
+            </a:lvl1pPr>
+          </a:lstStyle>
+          <a:p>
+            <a:pPr lvl="0">
+              <a:defRPr sz="1800">
+                <a:solidFill>
+                  <a:srgbClr val="000000"/>
+                </a:solidFill>
+              </a:defRPr>
+            </a:pPr>
+            <a:r>
+              <a:rPr sz="3200">
+                <a:solidFill>
+                  <a:srgbClr val="FFFFFF"/>
+                </a:solidFill>
+              </a:rPr>
+              <a:t>Simplicity</a:t>
+            </a:r>
+          </a:p>
+        </p:txBody>
+      </p:sp>
+    </p:spTree>
+  </p:cSld>
+  <p:clrMapOvr>
+    <a:masterClrMapping/>
+  </p:clrMapOvr>
+  <p:transition spd="med" advClick="1"/>
+</p:sld>
+</file>
+
+<file path=ppt/slides/slide21.xml><?xml version="1.0" encoding="utf-8"?>
+<p:sld xmlns:a="http://schemas.openxmlformats.org/drawingml/2006/main" xmlns:r="http://schemas.openxmlformats.org/officeDocument/2006/relationships" xmlns:p="http://schemas.openxmlformats.org/presentationml/2006/main" showMasterSp="1" showMasterPhAnim="1">
+  <p:cSld>
+    <p:spTree>
+      <p:nvGrpSpPr>
+        <p:cNvPr id="1" name=""/>
+        <p:cNvGrpSpPr/>
+        <p:nvPr/>
+      </p:nvGrpSpPr>
+      <p:grpSpPr>
+        <a:xfrm>
+          <a:off x="0" y="0"/>
+          <a:ext cx="0" cy="0"/>
+          <a:chOff x="0" y="0"/>
+          <a:chExt cx="0" cy="0"/>
+        </a:xfrm>
+      </p:grpSpPr>
+      <p:sp>
+        <p:nvSpPr>
+          <p:cNvPr id="116" name="Shape 116"/>
+          <p:cNvSpPr/>
+          <p:nvPr>
+            <p:ph type="sldNum" sz="quarter" idx="2"/>
+          </p:nvPr>
+        </p:nvSpPr>
+        <p:spPr>
+          <a:xfrm>
+            <a:off x="6553200" y="6404292"/>
+            <a:ext cx="2133600" cy="269240"/>
+          </a:xfrm>
+          <a:prstGeom prst="rect">
+            <a:avLst/>
+          </a:prstGeom>
+          <a:extLst>
+            <a:ext uri="{C572A759-6A51-4108-AA02-DFA0A04FC94B}">
+              <ma14:wrappingTextBoxFlag xmlns:ma14="http://schemas.microsoft.com/office/mac/drawingml/2011/main" val="1"/>
+            </a:ext>
+          </a:extLst>
+        </p:spPr>
+        <p:txBody>
+          <a:bodyPr lIns="0" tIns="0" rIns="0" bIns="0">
+            <a:normAutofit fontScale="100000" lnSpcReduction="0"/>
+          </a:bodyPr>
+          <a:lstStyle>
+            <a:lvl1pPr defTabSz="425195">
+              <a:defRPr sz="1116"/>
+            </a:lvl1pPr>
+          </a:lstStyle>
+          <a:p>
+            <a:pPr lvl="0">
+              <a:defRPr sz="1800">
+                <a:solidFill>
+                  <a:srgbClr val="000000"/>
+                </a:solidFill>
+              </a:defRPr>
+            </a:pPr>
+            <a:fld id="{86CB4B4D-7CA3-9044-876B-883B54F8677D}" type="slidenum">
+              <a:rPr sz="1116">
+                <a:solidFill>
+                  <a:srgbClr val="FFFFFF"/>
+                </a:solidFill>
+              </a:rPr>
+            </a:fld>
+          </a:p>
+        </p:txBody>
+      </p:sp>
+      <p:sp>
+        <p:nvSpPr>
+          <p:cNvPr id="117" name="Shape 117"/>
+          <p:cNvSpPr/>
+          <p:nvPr/>
+        </p:nvSpPr>
+        <p:spPr>
+          <a:xfrm>
+            <a:off x="3876099" y="3141981"/>
+            <a:ext cx="1391798" cy="574037"/>
+          </a:xfrm>
+          <a:prstGeom prst="rect">
+            <a:avLst/>
+          </a:prstGeom>
+          <a:ln w="12700">
+            <a:miter lim="400000"/>
+          </a:ln>
+          <a:extLst>
+            <a:ext uri="{C572A759-6A51-4108-AA02-DFA0A04FC94B}">
+              <ma14:wrappingTextBoxFlag xmlns:ma14="http://schemas.microsoft.com/office/mac/drawingml/2011/main" val="1"/>
+            </a:ext>
+          </a:extLst>
+        </p:spPr>
+        <p:txBody>
+          <a:bodyPr wrap="none" lIns="45718" tIns="45718" rIns="45718" bIns="45718">
+            <a:spAutoFit/>
+          </a:bodyPr>
+          <a:lstStyle>
+            <a:lvl1pPr>
+              <a:defRPr sz="3200">
+                <a:solidFill>
+                  <a:srgbClr val="FFFFFF"/>
+                </a:solidFill>
+              </a:defRPr>
+            </a:lvl1pPr>
+          </a:lstStyle>
+          <a:p>
+            <a:pPr lvl="0">
+              <a:defRPr sz="1800">
+                <a:solidFill>
+                  <a:srgbClr val="000000"/>
+                </a:solidFill>
+              </a:defRPr>
+            </a:pPr>
+            <a:r>
+              <a:rPr sz="3200">
+                <a:solidFill>
+                  <a:srgbClr val="FFFFFF"/>
+                </a:solidFill>
+              </a:rPr>
+              <a:t>Sinatra</a:t>
+            </a:r>
+          </a:p>
+        </p:txBody>
+      </p:sp>
+    </p:spTree>
+  </p:cSld>
+  <p:clrMapOvr>
+    <a:masterClrMapping/>
+  </p:clrMapOvr>
+  <p:transition spd="med" advClick="1"/>
+</p:sld>
+</file>
+
+<file path=ppt/slides/slide22.xml><?xml version="1.0" encoding="utf-8"?>
+<p:sld xmlns:a="http://schemas.openxmlformats.org/drawingml/2006/main" xmlns:r="http://schemas.openxmlformats.org/officeDocument/2006/relationships" xmlns:p="http://schemas.openxmlformats.org/presentationml/2006/main" showMasterSp="1" showMasterPhAnim="1">
+  <p:cSld>
+    <p:spTree>
+      <p:nvGrpSpPr>
+        <p:cNvPr id="1" name=""/>
+        <p:cNvGrpSpPr/>
+        <p:nvPr/>
+      </p:nvGrpSpPr>
+      <p:grpSpPr>
+        <a:xfrm>
+          <a:off x="0" y="0"/>
+          <a:ext cx="0" cy="0"/>
+          <a:chOff x="0" y="0"/>
+          <a:chExt cx="0" cy="0"/>
+        </a:xfrm>
+      </p:grpSpPr>
+      <p:sp>
+        <p:nvSpPr>
+          <p:cNvPr id="119" name="Shape 119"/>
+          <p:cNvSpPr/>
+          <p:nvPr>
+            <p:ph type="sldNum" sz="quarter" idx="2"/>
+          </p:nvPr>
+        </p:nvSpPr>
+        <p:spPr>
+          <a:xfrm>
+            <a:off x="6553200" y="6404292"/>
+            <a:ext cx="2133600" cy="269240"/>
+          </a:xfrm>
+          <a:prstGeom prst="rect">
+            <a:avLst/>
+          </a:prstGeom>
+          <a:extLst>
+            <a:ext uri="{C572A759-6A51-4108-AA02-DFA0A04FC94B}">
+              <ma14:wrappingTextBoxFlag xmlns:ma14="http://schemas.microsoft.com/office/mac/drawingml/2011/main" val="1"/>
+            </a:ext>
+          </a:extLst>
+        </p:spPr>
+        <p:txBody>
+          <a:bodyPr lIns="0" tIns="0" rIns="0" bIns="0">
+            <a:normAutofit fontScale="100000" lnSpcReduction="0"/>
+          </a:bodyPr>
+          <a:lstStyle>
+            <a:lvl1pPr defTabSz="425195">
+              <a:defRPr sz="1116"/>
+            </a:lvl1pPr>
+          </a:lstStyle>
+          <a:p>
+            <a:pPr lvl="0">
+              <a:defRPr sz="1800">
+                <a:solidFill>
+                  <a:srgbClr val="000000"/>
+                </a:solidFill>
+              </a:defRPr>
+            </a:pPr>
+            <a:fld id="{86CB4B4D-7CA3-9044-876B-883B54F8677D}" type="slidenum">
+              <a:rPr sz="1116">
+                <a:solidFill>
+                  <a:srgbClr val="FFFFFF"/>
+                </a:solidFill>
+              </a:rPr>
+            </a:fld>
+          </a:p>
+        </p:txBody>
+      </p:sp>
+      <p:pic>
+        <p:nvPicPr>
+          <p:cNvPr id="120" name="image7.png" descr="mvc.png"/>
+          <p:cNvPicPr/>
+          <p:nvPr/>
+        </p:nvPicPr>
+        <p:blipFill>
+          <a:blip r:embed="rId2">
+            <a:extLst/>
+          </a:blip>
+          <a:srcRect l="0" t="3355" r="13709" b="14872"/>
+          <a:stretch>
+            <a:fillRect/>
+          </a:stretch>
+        </p:blipFill>
+        <p:spPr>
+          <a:xfrm>
+            <a:off x="769540" y="1118393"/>
+            <a:ext cx="7604970" cy="4621313"/>
+          </a:xfrm>
+          <a:prstGeom prst="rect">
+            <a:avLst/>
+          </a:prstGeom>
+          <a:ln w="12700">
+            <a:miter lim="400000"/>
+          </a:ln>
+        </p:spPr>
+      </p:pic>
+    </p:spTree>
+  </p:cSld>
+  <p:clrMapOvr>
+    <a:masterClrMapping/>
+  </p:clrMapOvr>
+  <p:transition spd="med" advClick="1"/>
+</p:sld>
+</file>
+
+<file path=ppt/slides/slide23.xml><?xml version="1.0" encoding="utf-8"?>
+<p:sld xmlns:a="http://schemas.openxmlformats.org/drawingml/2006/main" xmlns:r="http://schemas.openxmlformats.org/officeDocument/2006/relationships" xmlns:p="http://schemas.openxmlformats.org/presentationml/2006/main" showMasterSp="1" showMasterPhAnim="1">
+  <p:cSld>
+    <p:spTree>
+      <p:nvGrpSpPr>
+        <p:cNvPr id="1" name=""/>
+        <p:cNvGrpSpPr/>
+        <p:nvPr/>
+      </p:nvGrpSpPr>
+      <p:grpSpPr>
+        <a:xfrm>
+          <a:off x="0" y="0"/>
+          <a:ext cx="0" cy="0"/>
+          <a:chOff x="0" y="0"/>
+          <a:chExt cx="0" cy="0"/>
+        </a:xfrm>
+      </p:grpSpPr>
+      <p:sp>
+        <p:nvSpPr>
+          <p:cNvPr id="122" name="Shape 122"/>
+          <p:cNvSpPr/>
+          <p:nvPr>
+            <p:ph type="title"/>
+          </p:nvPr>
+        </p:nvSpPr>
+        <p:spPr>
+          <a:xfrm>
+            <a:off x="1792288" y="4800600"/>
+            <a:ext cx="5486403" cy="566738"/>
+          </a:xfrm>
+          <a:prstGeom prst="rect">
+            <a:avLst/>
+          </a:prstGeom>
+        </p:spPr>
+        <p:txBody>
+          <a:bodyPr/>
+          <a:lstStyle>
+            <a:lvl1pPr algn="ctr">
+              <a:defRPr sz="3000"/>
+            </a:lvl1pPr>
+          </a:lstStyle>
+          <a:p>
+            <a:pPr lvl="0">
+              <a:defRPr b="0" sz="1800">
+                <a:solidFill>
+                  <a:srgbClr val="000000"/>
+                </a:solidFill>
+              </a:defRPr>
+            </a:pPr>
+            <a:r>
+              <a:rPr b="1" sz="3000">
+                <a:solidFill>
+                  <a:srgbClr val="FFFFFF"/>
+                </a:solidFill>
+              </a:rPr>
+              <a:t>END</a:t>
+            </a:r>
+          </a:p>
+        </p:txBody>
+      </p:sp>
+      <p:sp>
+        <p:nvSpPr>
+          <p:cNvPr id="123" name="Shape 123"/>
+          <p:cNvSpPr/>
+          <p:nvPr>
+            <p:ph type="sldNum" sz="quarter" idx="2"/>
+          </p:nvPr>
+        </p:nvSpPr>
+        <p:spPr>
+          <a:xfrm>
+            <a:off x="6553200" y="6404292"/>
+            <a:ext cx="2133600" cy="269240"/>
+          </a:xfrm>
+          <a:prstGeom prst="rect">
+            <a:avLst/>
+          </a:prstGeom>
+          <a:extLst>
+            <a:ext uri="{C572A759-6A51-4108-AA02-DFA0A04FC94B}">
+              <ma14:wrappingTextBoxFlag xmlns:ma14="http://schemas.microsoft.com/office/mac/drawingml/2011/main" val="1"/>
+            </a:ext>
+          </a:extLst>
+        </p:spPr>
+        <p:txBody>
+          <a:bodyPr lIns="0" tIns="0" rIns="0" bIns="0">
+            <a:normAutofit fontScale="100000" lnSpcReduction="0"/>
+          </a:bodyPr>
+          <a:lstStyle>
+            <a:lvl1pPr defTabSz="425195">
+              <a:defRPr sz="1116"/>
+            </a:lvl1pPr>
+          </a:lstStyle>
+          <a:p>
+            <a:pPr lvl="0">
+              <a:defRPr sz="1800">
+                <a:solidFill>
+                  <a:srgbClr val="000000"/>
+                </a:solidFill>
+              </a:defRPr>
+            </a:pPr>
+            <a:fld id="{86CB4B4D-7CA3-9044-876B-883B54F8677D}" type="slidenum">
+              <a:rPr sz="1116">
+                <a:solidFill>
+                  <a:srgbClr val="FFFFFF"/>
+                </a:solidFill>
+              </a:rPr>
+            </a:fld>
+          </a:p>
+        </p:txBody>
+      </p:sp>
+    </p:spTree>
+  </p:cSld>
+  <p:clrMapOvr>
+    <a:masterClrMapping/>
+  </p:clrMapOvr>
+  <p:transition spd="med" advClick="1"/>
+</p:sld>
+</file>
+
 <file path=ppt/slides/slide3.xml><?xml version="1.0" encoding="utf-8"?>
-<p:sld xmlns:a="http://schemas.openxmlformats.org/drawingml/2006/main" xmlns:r="http://schemas.openxmlformats.org/officeDocument/2006/relationships" xmlns:p="http://schemas.openxmlformats.org/presentationml/2006/main">
+<p:sld xmlns:a="http://schemas.openxmlformats.org/drawingml/2006/main" xmlns:r="http://schemas.openxmlformats.org/officeDocument/2006/relationships" xmlns:p="http://schemas.openxmlformats.org/presentationml/2006/main" showMasterSp="1" showMasterPhAnim="1">
   <p:cSld>
     <p:spTree>
       <p:nvGrpSpPr>
@@ -4907,17 +5278,15 @@
       <p:sp>
         <p:nvSpPr>
           <p:cNvPr id="63" name="Shape 63"/>
-          <p:cNvSpPr>
-            <a:spLocks noGrp="1"/>
-          </p:cNvSpPr>
+          <p:cNvSpPr/>
           <p:nvPr>
             <p:ph type="title"/>
           </p:nvPr>
         </p:nvSpPr>
         <p:spPr>
           <a:xfrm>
-            <a:off x="457200" y="2700324"/>
-            <a:ext cx="8229600" cy="1143001"/>
+            <a:off x="457200" y="2700322"/>
+            <a:ext cx="8229600" cy="1143003"/>
           </a:xfrm>
           <a:prstGeom prst="rect">
             <a:avLst/>
@@ -4950,12 +5319,12 @@
   <p:clrMapOvr>
     <a:masterClrMapping/>
   </p:clrMapOvr>
-  <p:transition xmlns:p14="http://schemas.microsoft.com/office/powerpoint/2010/main" spd="med"/>
+  <p:transition spd="med" advClick="1"/>
 </p:sld>
 </file>
 
 <file path=ppt/slides/slide4.xml><?xml version="1.0" encoding="utf-8"?>
-<p:sld xmlns:a="http://schemas.openxmlformats.org/drawingml/2006/main" xmlns:r="http://schemas.openxmlformats.org/officeDocument/2006/relationships" xmlns:p="http://schemas.openxmlformats.org/presentationml/2006/main">
+<p:sld xmlns:a="http://schemas.openxmlformats.org/drawingml/2006/main" xmlns:r="http://schemas.openxmlformats.org/officeDocument/2006/relationships" xmlns:p="http://schemas.openxmlformats.org/presentationml/2006/main" showMasterSp="1" showMasterPhAnim="1">
   <p:cSld>
     <p:spTree>
       <p:nvGrpSpPr>
@@ -4974,9 +5343,7 @@
       <p:sp>
         <p:nvSpPr>
           <p:cNvPr id="67" name="Shape 67"/>
-          <p:cNvSpPr>
-            <a:spLocks noGrp="1"/>
-          </p:cNvSpPr>
+          <p:cNvSpPr/>
           <p:nvPr>
             <p:ph type="title"/>
           </p:nvPr>
@@ -4984,7 +5351,7 @@
         <p:spPr>
           <a:xfrm>
             <a:off x="571607" y="2082429"/>
-            <a:ext cx="8229601" cy="2310109"/>
+            <a:ext cx="8229601" cy="2310111"/>
           </a:xfrm>
           <a:prstGeom prst="rect">
             <a:avLst/>
@@ -5065,12 +5432,12 @@
   <p:clrMapOvr>
     <a:masterClrMapping/>
   </p:clrMapOvr>
-  <p:transition xmlns:p14="http://schemas.microsoft.com/office/powerpoint/2010/main" spd="med"/>
+  <p:transition spd="med" advClick="1"/>
 </p:sld>
 </file>
 
 <file path=ppt/slides/slide5.xml><?xml version="1.0" encoding="utf-8"?>
-<p:sld xmlns:a="http://schemas.openxmlformats.org/drawingml/2006/main" xmlns:r="http://schemas.openxmlformats.org/officeDocument/2006/relationships" xmlns:p="http://schemas.openxmlformats.org/presentationml/2006/main">
+<p:sld xmlns:a="http://schemas.openxmlformats.org/drawingml/2006/main" xmlns:r="http://schemas.openxmlformats.org/officeDocument/2006/relationships" xmlns:p="http://schemas.openxmlformats.org/presentationml/2006/main" showMasterSp="1" showMasterPhAnim="1">
   <p:cSld>
     <p:spTree>
       <p:nvGrpSpPr>
@@ -5089,9 +5456,7 @@
       <p:sp>
         <p:nvSpPr>
           <p:cNvPr id="69" name="Shape 69"/>
-          <p:cNvSpPr>
-            <a:spLocks noGrp="1"/>
-          </p:cNvSpPr>
+          <p:cNvSpPr/>
           <p:nvPr>
             <p:ph type="title"/>
           </p:nvPr>
@@ -5099,7 +5464,7 @@
         <p:spPr>
           <a:xfrm>
             <a:off x="457200" y="2780419"/>
-            <a:ext cx="8229600" cy="1143001"/>
+            <a:ext cx="8229600" cy="1143003"/>
           </a:xfrm>
           <a:prstGeom prst="rect">
             <a:avLst/>
@@ -5108,8 +5473,8 @@
         <p:txBody>
           <a:bodyPr/>
           <a:lstStyle>
-            <a:lvl1pPr defTabSz="832104">
-              <a:defRPr sz="3549"/>
+            <a:lvl1pPr defTabSz="832102">
+              <a:defRPr sz="3500"/>
             </a:lvl1pPr>
           </a:lstStyle>
           <a:p>
@@ -5121,7 +5486,7 @@
               </a:defRPr>
             </a:pPr>
             <a:r>
-              <a:rPr sz="3549">
+              <a:rPr sz="3500">
                 <a:solidFill>
                   <a:srgbClr val="FFFFFF"/>
                 </a:solidFill>
@@ -5136,12 +5501,12 @@
   <p:clrMapOvr>
     <a:masterClrMapping/>
   </p:clrMapOvr>
-  <p:transition xmlns:p14="http://schemas.microsoft.com/office/powerpoint/2010/main" spd="med"/>
+  <p:transition spd="med" advClick="1"/>
 </p:sld>
 </file>
 
 <file path=ppt/slides/slide6.xml><?xml version="1.0" encoding="utf-8"?>
-<p:sld xmlns:a="http://schemas.openxmlformats.org/drawingml/2006/main" xmlns:r="http://schemas.openxmlformats.org/officeDocument/2006/relationships" xmlns:p="http://schemas.openxmlformats.org/presentationml/2006/main">
+<p:sld xmlns:a="http://schemas.openxmlformats.org/drawingml/2006/main" xmlns:r="http://schemas.openxmlformats.org/officeDocument/2006/relationships" xmlns:p="http://schemas.openxmlformats.org/presentationml/2006/main" showMasterSp="1" showMasterPhAnim="1">
   <p:cSld>
     <p:spTree>
       <p:nvGrpSpPr>
@@ -5160,17 +5525,15 @@
       <p:sp>
         <p:nvSpPr>
           <p:cNvPr id="71" name="Shape 71"/>
-          <p:cNvSpPr>
-            <a:spLocks noGrp="1"/>
-          </p:cNvSpPr>
+          <p:cNvSpPr/>
           <p:nvPr>
             <p:ph type="title"/>
           </p:nvPr>
         </p:nvSpPr>
         <p:spPr>
           <a:xfrm>
-            <a:off x="2865686" y="2196849"/>
-            <a:ext cx="4433496" cy="3032110"/>
+            <a:off x="2865685" y="2196849"/>
+            <a:ext cx="4433497" cy="3032112"/>
           </a:xfrm>
           <a:prstGeom prst="rect">
             <a:avLst/>
@@ -5202,11 +5565,6 @@
                 </a:solidFill>
               </a:rPr>
             </a:br>
-            <a:endParaRPr sz="4400">
-              <a:solidFill>
-                <a:srgbClr val="FFFFFF"/>
-              </a:solidFill>
-            </a:endParaRPr>
           </a:p>
         </p:txBody>
       </p:sp>
@@ -5215,12 +5573,12 @@
   <p:clrMapOvr>
     <a:masterClrMapping/>
   </p:clrMapOvr>
-  <p:transition xmlns:p14="http://schemas.microsoft.com/office/powerpoint/2010/main" spd="med"/>
+  <p:transition spd="med" advClick="1"/>
 </p:sld>
 </file>
 
 <file path=ppt/slides/slide7.xml><?xml version="1.0" encoding="utf-8"?>
-<p:sld xmlns:a="http://schemas.openxmlformats.org/drawingml/2006/main" xmlns:r="http://schemas.openxmlformats.org/officeDocument/2006/relationships" xmlns:p="http://schemas.openxmlformats.org/presentationml/2006/main">
+<p:sld xmlns:a="http://schemas.openxmlformats.org/drawingml/2006/main" xmlns:r="http://schemas.openxmlformats.org/officeDocument/2006/relationships" xmlns:p="http://schemas.openxmlformats.org/presentationml/2006/main" showMasterSp="1" showMasterPhAnim="1">
   <p:cSld>
     <p:spTree>
       <p:nvGrpSpPr>
@@ -5239,17 +5597,15 @@
       <p:sp>
         <p:nvSpPr>
           <p:cNvPr id="73" name="Shape 73"/>
-          <p:cNvSpPr>
-            <a:spLocks noGrp="1"/>
-          </p:cNvSpPr>
+          <p:cNvSpPr/>
           <p:nvPr>
             <p:ph type="title"/>
           </p:nvPr>
         </p:nvSpPr>
         <p:spPr>
           <a:xfrm>
-            <a:off x="2882632" y="1487448"/>
-            <a:ext cx="3112307" cy="3546997"/>
+            <a:off x="2882630" y="1487446"/>
+            <a:ext cx="3112311" cy="3546999"/>
           </a:xfrm>
           <a:prstGeom prst="rect">
             <a:avLst/>
@@ -5342,12 +5698,12 @@
   <p:clrMapOvr>
     <a:masterClrMapping/>
   </p:clrMapOvr>
-  <p:transition xmlns:p14="http://schemas.microsoft.com/office/powerpoint/2010/main" spd="med"/>
+  <p:transition spd="med" advClick="1"/>
 </p:sld>
 </file>
 
 <file path=ppt/slides/slide8.xml><?xml version="1.0" encoding="utf-8"?>
-<p:sld xmlns:a="http://schemas.openxmlformats.org/drawingml/2006/main" xmlns:r="http://schemas.openxmlformats.org/officeDocument/2006/relationships" xmlns:p="http://schemas.openxmlformats.org/presentationml/2006/main">
+<p:sld xmlns:a="http://schemas.openxmlformats.org/drawingml/2006/main" xmlns:r="http://schemas.openxmlformats.org/officeDocument/2006/relationships" xmlns:p="http://schemas.openxmlformats.org/presentationml/2006/main" showMasterSp="1" showMasterPhAnim="1">
   <p:cSld>
     <p:spTree>
       <p:nvGrpSpPr>
@@ -5366,17 +5722,15 @@
       <p:sp>
         <p:nvSpPr>
           <p:cNvPr id="75" name="Shape 75"/>
-          <p:cNvSpPr>
-            <a:spLocks noGrp="1"/>
-          </p:cNvSpPr>
+          <p:cNvSpPr/>
           <p:nvPr>
             <p:ph type="title"/>
           </p:nvPr>
         </p:nvSpPr>
         <p:spPr>
           <a:xfrm>
-            <a:off x="457200" y="2734649"/>
-            <a:ext cx="8229600" cy="1143001"/>
+            <a:off x="457200" y="2734647"/>
+            <a:ext cx="8229600" cy="1143004"/>
           </a:xfrm>
           <a:prstGeom prst="rect">
             <a:avLst/>
@@ -5409,12 +5763,12 @@
   <p:clrMapOvr>
     <a:masterClrMapping/>
   </p:clrMapOvr>
-  <p:transition xmlns:p14="http://schemas.microsoft.com/office/powerpoint/2010/main" spd="med"/>
+  <p:transition spd="med" advClick="1"/>
 </p:sld>
 </file>
 
 <file path=ppt/slides/slide9.xml><?xml version="1.0" encoding="utf-8"?>
-<p:sld xmlns:a="http://schemas.openxmlformats.org/drawingml/2006/main" xmlns:r="http://schemas.openxmlformats.org/officeDocument/2006/relationships" xmlns:p="http://schemas.openxmlformats.org/presentationml/2006/main">
+<p:sld xmlns:a="http://schemas.openxmlformats.org/drawingml/2006/main" xmlns:r="http://schemas.openxmlformats.org/officeDocument/2006/relationships" xmlns:p="http://schemas.openxmlformats.org/presentationml/2006/main" showMasterSp="1" showMasterPhAnim="1">
   <p:cSld>
     <p:spTree>
       <p:nvGrpSpPr>
@@ -5433,17 +5787,15 @@
       <p:sp>
         <p:nvSpPr>
           <p:cNvPr id="77" name="Shape 77"/>
-          <p:cNvSpPr>
-            <a:spLocks noGrp="1"/>
-          </p:cNvSpPr>
+          <p:cNvSpPr/>
           <p:nvPr>
             <p:ph type="title"/>
           </p:nvPr>
         </p:nvSpPr>
         <p:spPr>
           <a:xfrm>
-            <a:off x="457200" y="2734649"/>
-            <a:ext cx="8229600" cy="1143001"/>
+            <a:off x="457200" y="2734647"/>
+            <a:ext cx="8229600" cy="1143004"/>
           </a:xfrm>
           <a:prstGeom prst="rect">
             <a:avLst/>
@@ -5461,65 +5813,28 @@
               </a:defRPr>
             </a:pPr>
             <a:r>
-              <a:rPr sz="4400" dirty="0" smtClean="0">
-                <a:solidFill>
-                  <a:srgbClr val="FFFFFF"/>
-                </a:solidFill>
-              </a:rPr>
-              <a:t>URI</a:t>
-            </a:r>
-            <a:r>
-              <a:rPr lang="en-US" sz="4400" dirty="0" smtClean="0">
-                <a:solidFill>
-                  <a:srgbClr val="FFFFFF"/>
-                </a:solidFill>
-              </a:rPr>
-              <a:t>/URL</a:t>
-            </a:r>
-            <a:r>
-              <a:rPr sz="4400" dirty="0">
-                <a:solidFill>
-                  <a:srgbClr val="FFFFFF"/>
-                </a:solidFill>
-              </a:rPr>
-              <a:t/>
+              <a:rPr sz="4400">
+                <a:solidFill>
+                  <a:srgbClr val="FFFFFF"/>
+                </a:solidFill>
+              </a:rPr>
+              <a:t>URI/URL</a:t>
             </a:r>
             <a:br>
-              <a:rPr sz="4400" dirty="0">
+              <a:rPr sz="4400">
                 <a:solidFill>
                   <a:srgbClr val="FFFFFF"/>
                 </a:solidFill>
               </a:rPr>
             </a:br>
             <a:r>
-              <a:rPr sz="2400" i="1" dirty="0">
+              <a:rPr i="1" sz="2400">
                 <a:solidFill>
                   <a:srgbClr val="E46C0A"/>
                 </a:solidFill>
               </a:rPr>
-              <a:t>Uniform Resource </a:t>
-            </a:r>
-            <a:r>
-              <a:rPr sz="2400" i="1" dirty="0" smtClean="0">
-                <a:solidFill>
-                  <a:srgbClr val="E46C0A"/>
-                </a:solidFill>
-              </a:rPr>
-              <a:t>Identifier</a:t>
-            </a:r>
-            <a:r>
-              <a:rPr lang="en-US" sz="2400" i="1" smtClean="0">
-                <a:solidFill>
-                  <a:srgbClr val="E46C0A"/>
-                </a:solidFill>
-              </a:rPr>
-              <a:t>/Locator</a:t>
-            </a:r>
-            <a:endParaRPr sz="2400" i="1" dirty="0">
-              <a:solidFill>
-                <a:srgbClr val="E46C0A"/>
-              </a:solidFill>
-            </a:endParaRPr>
+              <a:t>Uniform Resource Identifier/Locator</a:t>
+            </a:r>
           </a:p>
         </p:txBody>
       </p:sp>
@@ -5528,12 +5843,12 @@
   <p:clrMapOvr>
     <a:masterClrMapping/>
   </p:clrMapOvr>
-  <p:transition xmlns:p14="http://schemas.microsoft.com/office/powerpoint/2010/main" spd="med"/>
+  <p:transition spd="med" advClick="1"/>
 </p:sld>
 </file>
 
 <file path=ppt/theme/theme1.xml><?xml version="1.0" encoding="utf-8"?>
-<a:theme xmlns:a="http://schemas.openxmlformats.org/drawingml/2006/main" name="Default">
+<a:theme xmlns:a="http://schemas.openxmlformats.org/drawingml/2006/main" xmlns:r="http://schemas.openxmlformats.org/officeDocument/2006/relationships" name="Default">
   <a:themeElements>
     <a:clrScheme name="Default">
       <a:dk1>
@@ -5575,14 +5890,14 @@
     </a:clrScheme>
     <a:fontScheme name="Default">
       <a:majorFont>
+        <a:latin typeface="Helvetica"/>
+        <a:ea typeface="Helvetica"/>
+        <a:cs typeface="Helvetica"/>
+      </a:majorFont>
+      <a:minorFont>
         <a:latin typeface="Helvetica Neue"/>
         <a:ea typeface="Helvetica Neue"/>
         <a:cs typeface="Helvetica Neue"/>
-      </a:majorFont>
-      <a:minorFont>
-        <a:latin typeface="Helvetica"/>
-        <a:ea typeface="Helvetica"/>
-        <a:cs typeface="Helvetica"/>
       </a:minorFont>
     </a:fontScheme>
     <a:fmtScheme name="Default">
@@ -5659,7 +5974,7 @@
       <a:effectStyleLst>
         <a:effectStyle>
           <a:effectLst>
-            <a:outerShdw blurRad="38100" dist="23000" dir="5400000" rotWithShape="0">
+            <a:outerShdw sx="100000" sy="100000" kx="0" ky="0" algn="b" rotWithShape="0" blurRad="38100" dist="23000" dir="5400000">
               <a:srgbClr val="000000">
                 <a:alpha val="35000"/>
               </a:srgbClr>
@@ -5668,7 +5983,7 @@
         </a:effectStyle>
         <a:effectStyle>
           <a:effectLst>
-            <a:outerShdw blurRad="38100" dist="23000" dir="5400000" rotWithShape="0">
+            <a:outerShdw sx="100000" sy="100000" kx="0" ky="0" algn="b" rotWithShape="0" blurRad="38100" dist="23000" dir="5400000">
               <a:srgbClr val="000000">
                 <a:alpha val="35000"/>
               </a:srgbClr>
@@ -5677,9 +5992,9 @@
         </a:effectStyle>
         <a:effectStyle>
           <a:effectLst>
-            <a:outerShdw blurRad="38100" dist="20000" dir="5400000" rotWithShape="0">
+            <a:outerShdw sx="100000" sy="100000" kx="0" ky="0" algn="b" rotWithShape="0" blurRad="38100" dist="23000" dir="5400000">
               <a:srgbClr val="000000">
-                <a:alpha val="38000"/>
+                <a:alpha val="35000"/>
               </a:srgbClr>
             </a:outerShdw>
           </a:effectLst>
@@ -5741,7 +6056,7 @@
     <a:spDef>
       <a:spPr>
         <a:solidFill>
-          <a:srgbClr val="FFFFFF"/>
+          <a:srgbClr val="000000"/>
         </a:solidFill>
         <a:ln w="25400" cap="flat">
           <a:solidFill>
@@ -5751,14 +6066,14 @@
           <a:bevel/>
         </a:ln>
         <a:effectLst>
-          <a:outerShdw blurRad="38100" dist="23000" dir="5400000" rotWithShape="0">
+          <a:outerShdw sx="100000" sy="100000" kx="0" ky="0" algn="b" rotWithShape="0" blurRad="38100" dist="23000" dir="5400000">
             <a:srgbClr val="000000">
               <a:alpha val="35000"/>
             </a:srgbClr>
           </a:outerShdw>
         </a:effectLst>
       </a:spPr>
-      <a:bodyPr rot="0" spcFirstLastPara="1" vertOverflow="overflow" horzOverflow="overflow" vert="horz" wrap="square" lIns="45719" tIns="45719" rIns="45719" bIns="45719" numCol="1" spcCol="38100" rtlCol="0" anchor="ctr">
+      <a:bodyPr rot="0" spcFirstLastPara="1" vertOverflow="overflow" horzOverflow="overflow" vert="horz" wrap="square" lIns="45718" tIns="45718" rIns="45718" bIns="45718" numCol="1" spcCol="38100" rtlCol="0" anchor="ctr" upright="0">
         <a:spAutoFit/>
       </a:bodyPr>
       <a:lstStyle>
@@ -5777,7 +6092,7 @@
           <a:buFontTx/>
           <a:buNone/>
           <a:tabLst/>
-          <a:defRPr kumimoji="0" sz="1800" b="0" i="0" u="none" strike="noStrike" cap="none" spc="0" normalizeH="0" baseline="0">
+          <a:defRPr b="0" baseline="0" cap="none" i="0" spc="0" strike="noStrike" sz="1800" u="none" kumimoji="0" normalizeH="0">
             <a:ln>
               <a:noFill/>
             </a:ln>
@@ -5786,10 +6101,10 @@
             </a:solidFill>
             <a:effectLst/>
             <a:uFillTx/>
-            <a:latin typeface="Calibri"/>
-            <a:ea typeface="Calibri"/>
-            <a:cs typeface="Calibri"/>
-            <a:sym typeface="Calibri"/>
+            <a:latin typeface="+mj-lt"/>
+            <a:ea typeface="+mj-ea"/>
+            <a:cs typeface="+mj-cs"/>
+            <a:sym typeface="Helvetica"/>
           </a:defRPr>
         </a:defPPr>
         <a:lvl1pPr marL="0" marR="0" indent="0" algn="l" defTabSz="914400" rtl="0" fontAlgn="auto" latinLnBrk="1" hangingPunct="0">
@@ -5807,7 +6122,7 @@
           <a:buFontTx/>
           <a:buNone/>
           <a:tabLst/>
-          <a:defRPr kumimoji="0" sz="1800" b="0" i="0" u="none" strike="noStrike" cap="none" spc="0" normalizeH="0" baseline="0">
+          <a:defRPr b="0" baseline="0" cap="none" i="0" spc="0" strike="noStrike" sz="1800" u="none" kumimoji="0" normalizeH="0">
             <a:ln>
               <a:noFill/>
             </a:ln>
@@ -5833,7 +6148,7 @@
           <a:buFontTx/>
           <a:buNone/>
           <a:tabLst/>
-          <a:defRPr kumimoji="0" sz="1800" b="0" i="0" u="none" strike="noStrike" cap="none" spc="0" normalizeH="0" baseline="0">
+          <a:defRPr b="0" baseline="0" cap="none" i="0" spc="0" strike="noStrike" sz="1800" u="none" kumimoji="0" normalizeH="0">
             <a:ln>
               <a:noFill/>
             </a:ln>
@@ -5859,7 +6174,7 @@
           <a:buFontTx/>
           <a:buNone/>
           <a:tabLst/>
-          <a:defRPr kumimoji="0" sz="1800" b="0" i="0" u="none" strike="noStrike" cap="none" spc="0" normalizeH="0" baseline="0">
+          <a:defRPr b="0" baseline="0" cap="none" i="0" spc="0" strike="noStrike" sz="1800" u="none" kumimoji="0" normalizeH="0">
             <a:ln>
               <a:noFill/>
             </a:ln>
@@ -5885,7 +6200,7 @@
           <a:buFontTx/>
           <a:buNone/>
           <a:tabLst/>
-          <a:defRPr kumimoji="0" sz="1800" b="0" i="0" u="none" strike="noStrike" cap="none" spc="0" normalizeH="0" baseline="0">
+          <a:defRPr b="0" baseline="0" cap="none" i="0" spc="0" strike="noStrike" sz="1800" u="none" kumimoji="0" normalizeH="0">
             <a:ln>
               <a:noFill/>
             </a:ln>
@@ -5911,7 +6226,7 @@
           <a:buFontTx/>
           <a:buNone/>
           <a:tabLst/>
-          <a:defRPr kumimoji="0" sz="1800" b="0" i="0" u="none" strike="noStrike" cap="none" spc="0" normalizeH="0" baseline="0">
+          <a:defRPr b="0" baseline="0" cap="none" i="0" spc="0" strike="noStrike" sz="1800" u="none" kumimoji="0" normalizeH="0">
             <a:ln>
               <a:noFill/>
             </a:ln>
@@ -5937,7 +6252,7 @@
           <a:buFontTx/>
           <a:buNone/>
           <a:tabLst/>
-          <a:defRPr kumimoji="0" sz="1800" b="0" i="0" u="none" strike="noStrike" cap="none" spc="0" normalizeH="0" baseline="0">
+          <a:defRPr b="0" baseline="0" cap="none" i="0" spc="0" strike="noStrike" sz="1800" u="none" kumimoji="0" normalizeH="0">
             <a:ln>
               <a:noFill/>
             </a:ln>
@@ -5963,7 +6278,7 @@
           <a:buFontTx/>
           <a:buNone/>
           <a:tabLst/>
-          <a:defRPr kumimoji="0" sz="1800" b="0" i="0" u="none" strike="noStrike" cap="none" spc="0" normalizeH="0" baseline="0">
+          <a:defRPr b="0" baseline="0" cap="none" i="0" spc="0" strike="noStrike" sz="1800" u="none" kumimoji="0" normalizeH="0">
             <a:ln>
               <a:noFill/>
             </a:ln>
@@ -5989,7 +6304,7 @@
           <a:buFontTx/>
           <a:buNone/>
           <a:tabLst/>
-          <a:defRPr kumimoji="0" sz="1800" b="0" i="0" u="none" strike="noStrike" cap="none" spc="0" normalizeH="0" baseline="0">
+          <a:defRPr b="0" baseline="0" cap="none" i="0" spc="0" strike="noStrike" sz="1800" u="none" kumimoji="0" normalizeH="0">
             <a:ln>
               <a:noFill/>
             </a:ln>
@@ -6015,7 +6330,7 @@
           <a:buFontTx/>
           <a:buNone/>
           <a:tabLst/>
-          <a:defRPr kumimoji="0" sz="1800" b="0" i="0" u="none" strike="noStrike" cap="none" spc="0" normalizeH="0" baseline="0">
+          <a:defRPr b="0" baseline="0" cap="none" i="0" spc="0" strike="noStrike" sz="1800" u="none" kumimoji="0" normalizeH="0">
             <a:ln>
               <a:noFill/>
             </a:ln>
@@ -6028,15 +6343,9 @@
         </a:lvl9pPr>
       </a:lstStyle>
       <a:style>
-        <a:lnRef idx="0">
-          <a:scrgbClr r="0" g="0" b="0"/>
-        </a:lnRef>
-        <a:fillRef idx="0">
-          <a:scrgbClr r="0" g="0" b="0"/>
-        </a:fillRef>
-        <a:effectRef idx="0">
-          <a:scrgbClr r="0" g="0" b="0"/>
-        </a:effectRef>
+        <a:lnRef idx="0"/>
+        <a:fillRef idx="0"/>
+        <a:effectRef idx="0"/>
         <a:fontRef idx="none"/>
       </a:style>
     </a:spDef>
@@ -6051,14 +6360,14 @@
           <a:bevel/>
         </a:ln>
         <a:effectLst>
-          <a:outerShdw blurRad="38100" dist="20000" dir="5400000" rotWithShape="0">
+          <a:outerShdw sx="100000" sy="100000" kx="0" ky="0" algn="b" rotWithShape="0" blurRad="38100" dist="23000" dir="5400000">
             <a:srgbClr val="000000">
-              <a:alpha val="38000"/>
+              <a:alpha val="35000"/>
             </a:srgbClr>
           </a:outerShdw>
         </a:effectLst>
       </a:spPr>
-      <a:bodyPr rot="0" spcFirstLastPara="1" vertOverflow="overflow" horzOverflow="overflow" vert="horz" wrap="square" lIns="91439" tIns="45719" rIns="91439" bIns="45719" numCol="1" spcCol="38100" rtlCol="0" anchor="t">
+      <a:bodyPr rot="0" spcFirstLastPara="1" vertOverflow="overflow" horzOverflow="overflow" vert="horz" wrap="square" lIns="91439" tIns="45719" rIns="91439" bIns="45719" numCol="1" spcCol="38100" rtlCol="0" anchor="t" upright="0">
         <a:noAutofit/>
       </a:bodyPr>
       <a:lstStyle>
@@ -6077,7 +6386,7 @@
           <a:buFontTx/>
           <a:buNone/>
           <a:tabLst/>
-          <a:defRPr kumimoji="0" sz="1800" b="0" i="0" u="none" strike="noStrike" cap="none" spc="0" normalizeH="0" baseline="0">
+          <a:defRPr b="0" baseline="0" cap="none" i="0" spc="0" strike="noStrike" sz="1800" u="none" kumimoji="0" normalizeH="0">
             <a:ln>
               <a:noFill/>
             </a:ln>
@@ -6103,7 +6412,7 @@
           <a:buFontTx/>
           <a:buNone/>
           <a:tabLst/>
-          <a:defRPr kumimoji="0" sz="1800" b="0" i="0" u="none" strike="noStrike" cap="none" spc="0" normalizeH="0" baseline="0">
+          <a:defRPr b="0" baseline="0" cap="none" i="0" spc="0" strike="noStrike" sz="1800" u="none" kumimoji="0" normalizeH="0">
             <a:ln>
               <a:noFill/>
             </a:ln>
@@ -6129,7 +6438,7 @@
           <a:buFontTx/>
           <a:buNone/>
           <a:tabLst/>
-          <a:defRPr kumimoji="0" sz="1800" b="0" i="0" u="none" strike="noStrike" cap="none" spc="0" normalizeH="0" baseline="0">
+          <a:defRPr b="0" baseline="0" cap="none" i="0" spc="0" strike="noStrike" sz="1800" u="none" kumimoji="0" normalizeH="0">
             <a:ln>
               <a:noFill/>
             </a:ln>
@@ -6155,7 +6464,7 @@
           <a:buFontTx/>
           <a:buNone/>
           <a:tabLst/>
-          <a:defRPr kumimoji="0" sz="1800" b="0" i="0" u="none" strike="noStrike" cap="none" spc="0" normalizeH="0" baseline="0">
+          <a:defRPr b="0" baseline="0" cap="none" i="0" spc="0" strike="noStrike" sz="1800" u="none" kumimoji="0" normalizeH="0">
             <a:ln>
               <a:noFill/>
             </a:ln>
@@ -6181,7 +6490,7 @@
           <a:buFontTx/>
           <a:buNone/>
           <a:tabLst/>
-          <a:defRPr kumimoji="0" sz="1800" b="0" i="0" u="none" strike="noStrike" cap="none" spc="0" normalizeH="0" baseline="0">
+          <a:defRPr b="0" baseline="0" cap="none" i="0" spc="0" strike="noStrike" sz="1800" u="none" kumimoji="0" normalizeH="0">
             <a:ln>
               <a:noFill/>
             </a:ln>
@@ -6207,7 +6516,7 @@
           <a:buFontTx/>
           <a:buNone/>
           <a:tabLst/>
-          <a:defRPr kumimoji="0" sz="1800" b="0" i="0" u="none" strike="noStrike" cap="none" spc="0" normalizeH="0" baseline="0">
+          <a:defRPr b="0" baseline="0" cap="none" i="0" spc="0" strike="noStrike" sz="1800" u="none" kumimoji="0" normalizeH="0">
             <a:ln>
               <a:noFill/>
             </a:ln>
@@ -6233,7 +6542,7 @@
           <a:buFontTx/>
           <a:buNone/>
           <a:tabLst/>
-          <a:defRPr kumimoji="0" sz="1800" b="0" i="0" u="none" strike="noStrike" cap="none" spc="0" normalizeH="0" baseline="0">
+          <a:defRPr b="0" baseline="0" cap="none" i="0" spc="0" strike="noStrike" sz="1800" u="none" kumimoji="0" normalizeH="0">
             <a:ln>
               <a:noFill/>
             </a:ln>
@@ -6259,7 +6568,7 @@
           <a:buFontTx/>
           <a:buNone/>
           <a:tabLst/>
-          <a:defRPr kumimoji="0" sz="1800" b="0" i="0" u="none" strike="noStrike" cap="none" spc="0" normalizeH="0" baseline="0">
+          <a:defRPr b="0" baseline="0" cap="none" i="0" spc="0" strike="noStrike" sz="1800" u="none" kumimoji="0" normalizeH="0">
             <a:ln>
               <a:noFill/>
             </a:ln>
@@ -6285,7 +6594,7 @@
           <a:buFontTx/>
           <a:buNone/>
           <a:tabLst/>
-          <a:defRPr kumimoji="0" sz="1800" b="0" i="0" u="none" strike="noStrike" cap="none" spc="0" normalizeH="0" baseline="0">
+          <a:defRPr b="0" baseline="0" cap="none" i="0" spc="0" strike="noStrike" sz="1800" u="none" kumimoji="0" normalizeH="0">
             <a:ln>
               <a:noFill/>
             </a:ln>
@@ -6311,7 +6620,7 @@
           <a:buFontTx/>
           <a:buNone/>
           <a:tabLst/>
-          <a:defRPr kumimoji="0" sz="1800" b="0" i="0" u="none" strike="noStrike" cap="none" spc="0" normalizeH="0" baseline="0">
+          <a:defRPr b="0" baseline="0" cap="none" i="0" spc="0" strike="noStrike" sz="1800" u="none" kumimoji="0" normalizeH="0">
             <a:ln>
               <a:noFill/>
             </a:ln>
@@ -6324,15 +6633,9 @@
         </a:lvl9pPr>
       </a:lstStyle>
       <a:style>
-        <a:lnRef idx="0">
-          <a:scrgbClr r="0" g="0" b="0"/>
-        </a:lnRef>
-        <a:fillRef idx="0">
-          <a:scrgbClr r="0" g="0" b="0"/>
-        </a:fillRef>
-        <a:effectRef idx="0">
-          <a:scrgbClr r="0" g="0" b="0"/>
-        </a:effectRef>
+        <a:lnRef idx="0"/>
+        <a:fillRef idx="0"/>
+        <a:effectRef idx="0"/>
         <a:fontRef idx="none"/>
       </a:style>
     </a:lnDef>
@@ -6345,7 +6648,7 @@
         </a:ln>
         <a:effectLst/>
       </a:spPr>
-      <a:bodyPr rot="0" spcFirstLastPara="1" vertOverflow="overflow" horzOverflow="overflow" vert="horz" wrap="square" lIns="45719" tIns="45719" rIns="45719" bIns="45719" numCol="1" spcCol="38100" rtlCol="0" anchor="t">
+      <a:bodyPr rot="0" spcFirstLastPara="1" vertOverflow="overflow" horzOverflow="overflow" vert="horz" wrap="square" lIns="45718" tIns="45718" rIns="45718" bIns="45718" numCol="1" spcCol="38100" rtlCol="0" anchor="t" upright="0">
         <a:spAutoFit/>
       </a:bodyPr>
       <a:lstStyle>
@@ -6364,7 +6667,7 @@
           <a:buFontTx/>
           <a:buNone/>
           <a:tabLst/>
-          <a:defRPr kumimoji="0" sz="1800" b="0" i="0" u="none" strike="noStrike" cap="none" spc="0" normalizeH="0" baseline="0">
+          <a:defRPr b="0" baseline="0" cap="none" i="0" spc="0" strike="noStrike" sz="1800" u="none" kumimoji="0" normalizeH="0">
             <a:ln>
               <a:noFill/>
             </a:ln>
@@ -6373,10 +6676,10 @@
             </a:solidFill>
             <a:effectLst/>
             <a:uFillTx/>
-            <a:latin typeface="Calibri"/>
-            <a:ea typeface="Calibri"/>
-            <a:cs typeface="Calibri"/>
-            <a:sym typeface="Calibri"/>
+            <a:latin typeface="+mj-lt"/>
+            <a:ea typeface="+mj-ea"/>
+            <a:cs typeface="+mj-cs"/>
+            <a:sym typeface="Helvetica"/>
           </a:defRPr>
         </a:defPPr>
         <a:lvl1pPr marL="0" marR="0" indent="0" algn="l" defTabSz="914400" rtl="0" fontAlgn="auto" latinLnBrk="1" hangingPunct="0">
@@ -6394,7 +6697,7 @@
           <a:buFontTx/>
           <a:buNone/>
           <a:tabLst/>
-          <a:defRPr kumimoji="0" sz="1800" b="0" i="0" u="none" strike="noStrike" cap="none" spc="0" normalizeH="0" baseline="0">
+          <a:defRPr b="0" baseline="0" cap="none" i="0" spc="0" strike="noStrike" sz="1800" u="none" kumimoji="0" normalizeH="0">
             <a:ln>
               <a:noFill/>
             </a:ln>
@@ -6420,7 +6723,7 @@
           <a:buFontTx/>
           <a:buNone/>
           <a:tabLst/>
-          <a:defRPr kumimoji="0" sz="1800" b="0" i="0" u="none" strike="noStrike" cap="none" spc="0" normalizeH="0" baseline="0">
+          <a:defRPr b="0" baseline="0" cap="none" i="0" spc="0" strike="noStrike" sz="1800" u="none" kumimoji="0" normalizeH="0">
             <a:ln>
               <a:noFill/>
             </a:ln>
@@ -6446,7 +6749,7 @@
           <a:buFontTx/>
           <a:buNone/>
           <a:tabLst/>
-          <a:defRPr kumimoji="0" sz="1800" b="0" i="0" u="none" strike="noStrike" cap="none" spc="0" normalizeH="0" baseline="0">
+          <a:defRPr b="0" baseline="0" cap="none" i="0" spc="0" strike="noStrike" sz="1800" u="none" kumimoji="0" normalizeH="0">
             <a:ln>
               <a:noFill/>
             </a:ln>
@@ -6472,7 +6775,7 @@
           <a:buFontTx/>
           <a:buNone/>
           <a:tabLst/>
-          <a:defRPr kumimoji="0" sz="1800" b="0" i="0" u="none" strike="noStrike" cap="none" spc="0" normalizeH="0" baseline="0">
+          <a:defRPr b="0" baseline="0" cap="none" i="0" spc="0" strike="noStrike" sz="1800" u="none" kumimoji="0" normalizeH="0">
             <a:ln>
               <a:noFill/>
             </a:ln>
@@ -6498,7 +6801,7 @@
           <a:buFontTx/>
           <a:buNone/>
           <a:tabLst/>
-          <a:defRPr kumimoji="0" sz="1800" b="0" i="0" u="none" strike="noStrike" cap="none" spc="0" normalizeH="0" baseline="0">
+          <a:defRPr b="0" baseline="0" cap="none" i="0" spc="0" strike="noStrike" sz="1800" u="none" kumimoji="0" normalizeH="0">
             <a:ln>
               <a:noFill/>
             </a:ln>
@@ -6524,7 +6827,7 @@
           <a:buFontTx/>
           <a:buNone/>
           <a:tabLst/>
-          <a:defRPr kumimoji="0" sz="1800" b="0" i="0" u="none" strike="noStrike" cap="none" spc="0" normalizeH="0" baseline="0">
+          <a:defRPr b="0" baseline="0" cap="none" i="0" spc="0" strike="noStrike" sz="1800" u="none" kumimoji="0" normalizeH="0">
             <a:ln>
               <a:noFill/>
             </a:ln>
@@ -6550,7 +6853,7 @@
           <a:buFontTx/>
           <a:buNone/>
           <a:tabLst/>
-          <a:defRPr kumimoji="0" sz="1800" b="0" i="0" u="none" strike="noStrike" cap="none" spc="0" normalizeH="0" baseline="0">
+          <a:defRPr b="0" baseline="0" cap="none" i="0" spc="0" strike="noStrike" sz="1800" u="none" kumimoji="0" normalizeH="0">
             <a:ln>
               <a:noFill/>
             </a:ln>
@@ -6576,7 +6879,7 @@
           <a:buFontTx/>
           <a:buNone/>
           <a:tabLst/>
-          <a:defRPr kumimoji="0" sz="1800" b="0" i="0" u="none" strike="noStrike" cap="none" spc="0" normalizeH="0" baseline="0">
+          <a:defRPr b="0" baseline="0" cap="none" i="0" spc="0" strike="noStrike" sz="1800" u="none" kumimoji="0" normalizeH="0">
             <a:ln>
               <a:noFill/>
             </a:ln>
@@ -6602,7 +6905,7 @@
           <a:buFontTx/>
           <a:buNone/>
           <a:tabLst/>
-          <a:defRPr kumimoji="0" sz="1800" b="0" i="0" u="none" strike="noStrike" cap="none" spc="0" normalizeH="0" baseline="0">
+          <a:defRPr b="0" baseline="0" cap="none" i="0" spc="0" strike="noStrike" sz="1800" u="none" kumimoji="0" normalizeH="0">
             <a:ln>
               <a:noFill/>
             </a:ln>
@@ -6615,25 +6918,18 @@
         </a:lvl9pPr>
       </a:lstStyle>
       <a:style>
-        <a:lnRef idx="0">
-          <a:scrgbClr r="0" g="0" b="0"/>
-        </a:lnRef>
-        <a:fillRef idx="0">
-          <a:scrgbClr r="0" g="0" b="0"/>
-        </a:fillRef>
-        <a:effectRef idx="0">
-          <a:scrgbClr r="0" g="0" b="0"/>
-        </a:effectRef>
+        <a:lnRef idx="0"/>
+        <a:fillRef idx="0"/>
+        <a:effectRef idx="0"/>
         <a:fontRef idx="none"/>
       </a:style>
     </a:txDef>
   </a:objectDefaults>
-  <a:extraClrSchemeLst/>
 </a:theme>
 </file>
 
 <file path=ppt/theme/theme2.xml><?xml version="1.0" encoding="utf-8"?>
-<a:theme xmlns:a="http://schemas.openxmlformats.org/drawingml/2006/main" name="Default">
+<a:theme xmlns:a="http://schemas.openxmlformats.org/drawingml/2006/main" xmlns:r="http://schemas.openxmlformats.org/officeDocument/2006/relationships" name="Default">
   <a:themeElements>
     <a:clrScheme name="Default">
       <a:dk1>
@@ -6675,14 +6971,14 @@
     </a:clrScheme>
     <a:fontScheme name="Default">
       <a:majorFont>
+        <a:latin typeface="Helvetica"/>
+        <a:ea typeface="Helvetica"/>
+        <a:cs typeface="Helvetica"/>
+      </a:majorFont>
+      <a:minorFont>
         <a:latin typeface="Helvetica Neue"/>
         <a:ea typeface="Helvetica Neue"/>
         <a:cs typeface="Helvetica Neue"/>
-      </a:majorFont>
-      <a:minorFont>
-        <a:latin typeface="Helvetica"/>
-        <a:ea typeface="Helvetica"/>
-        <a:cs typeface="Helvetica"/>
       </a:minorFont>
     </a:fontScheme>
     <a:fmtScheme name="Default">
@@ -6759,7 +7055,7 @@
       <a:effectStyleLst>
         <a:effectStyle>
           <a:effectLst>
-            <a:outerShdw blurRad="38100" dist="23000" dir="5400000" rotWithShape="0">
+            <a:outerShdw sx="100000" sy="100000" kx="0" ky="0" algn="b" rotWithShape="0" blurRad="38100" dist="23000" dir="5400000">
               <a:srgbClr val="000000">
                 <a:alpha val="35000"/>
               </a:srgbClr>
@@ -6768,7 +7064,7 @@
         </a:effectStyle>
         <a:effectStyle>
           <a:effectLst>
-            <a:outerShdw blurRad="38100" dist="23000" dir="5400000" rotWithShape="0">
+            <a:outerShdw sx="100000" sy="100000" kx="0" ky="0" algn="b" rotWithShape="0" blurRad="38100" dist="23000" dir="5400000">
               <a:srgbClr val="000000">
                 <a:alpha val="35000"/>
               </a:srgbClr>
@@ -6777,9 +7073,9 @@
         </a:effectStyle>
         <a:effectStyle>
           <a:effectLst>
-            <a:outerShdw blurRad="38100" dist="20000" dir="5400000" rotWithShape="0">
+            <a:outerShdw sx="100000" sy="100000" kx="0" ky="0" algn="b" rotWithShape="0" blurRad="38100" dist="23000" dir="5400000">
               <a:srgbClr val="000000">
-                <a:alpha val="38000"/>
+                <a:alpha val="35000"/>
               </a:srgbClr>
             </a:outerShdw>
           </a:effectLst>
@@ -6841,7 +7137,7 @@
     <a:spDef>
       <a:spPr>
         <a:solidFill>
-          <a:srgbClr val="FFFFFF"/>
+          <a:srgbClr val="000000"/>
         </a:solidFill>
         <a:ln w="25400" cap="flat">
           <a:solidFill>
@@ -6851,14 +7147,14 @@
           <a:bevel/>
         </a:ln>
         <a:effectLst>
-          <a:outerShdw blurRad="38100" dist="23000" dir="5400000" rotWithShape="0">
+          <a:outerShdw sx="100000" sy="100000" kx="0" ky="0" algn="b" rotWithShape="0" blurRad="38100" dist="23000" dir="5400000">
             <a:srgbClr val="000000">
               <a:alpha val="35000"/>
             </a:srgbClr>
           </a:outerShdw>
         </a:effectLst>
       </a:spPr>
-      <a:bodyPr rot="0" spcFirstLastPara="1" vertOverflow="overflow" horzOverflow="overflow" vert="horz" wrap="square" lIns="45719" tIns="45719" rIns="45719" bIns="45719" numCol="1" spcCol="38100" rtlCol="0" anchor="ctr">
+      <a:bodyPr rot="0" spcFirstLastPara="1" vertOverflow="overflow" horzOverflow="overflow" vert="horz" wrap="square" lIns="45718" tIns="45718" rIns="45718" bIns="45718" numCol="1" spcCol="38100" rtlCol="0" anchor="ctr" upright="0">
         <a:spAutoFit/>
       </a:bodyPr>
       <a:lstStyle>
@@ -6877,7 +7173,7 @@
           <a:buFontTx/>
           <a:buNone/>
           <a:tabLst/>
-          <a:defRPr kumimoji="0" sz="1800" b="0" i="0" u="none" strike="noStrike" cap="none" spc="0" normalizeH="0" baseline="0">
+          <a:defRPr b="0" baseline="0" cap="none" i="0" spc="0" strike="noStrike" sz="1800" u="none" kumimoji="0" normalizeH="0">
             <a:ln>
               <a:noFill/>
             </a:ln>
@@ -6886,10 +7182,10 @@
             </a:solidFill>
             <a:effectLst/>
             <a:uFillTx/>
-            <a:latin typeface="Calibri"/>
-            <a:ea typeface="Calibri"/>
-            <a:cs typeface="Calibri"/>
-            <a:sym typeface="Calibri"/>
+            <a:latin typeface="+mj-lt"/>
+            <a:ea typeface="+mj-ea"/>
+            <a:cs typeface="+mj-cs"/>
+            <a:sym typeface="Helvetica"/>
           </a:defRPr>
         </a:defPPr>
         <a:lvl1pPr marL="0" marR="0" indent="0" algn="l" defTabSz="914400" rtl="0" fontAlgn="auto" latinLnBrk="1" hangingPunct="0">
@@ -6907,7 +7203,7 @@
           <a:buFontTx/>
           <a:buNone/>
           <a:tabLst/>
-          <a:defRPr kumimoji="0" sz="1800" b="0" i="0" u="none" strike="noStrike" cap="none" spc="0" normalizeH="0" baseline="0">
+          <a:defRPr b="0" baseline="0" cap="none" i="0" spc="0" strike="noStrike" sz="1800" u="none" kumimoji="0" normalizeH="0">
             <a:ln>
               <a:noFill/>
             </a:ln>
@@ -6933,7 +7229,7 @@
           <a:buFontTx/>
           <a:buNone/>
           <a:tabLst/>
-          <a:defRPr kumimoji="0" sz="1800" b="0" i="0" u="none" strike="noStrike" cap="none" spc="0" normalizeH="0" baseline="0">
+          <a:defRPr b="0" baseline="0" cap="none" i="0" spc="0" strike="noStrike" sz="1800" u="none" kumimoji="0" normalizeH="0">
             <a:ln>
               <a:noFill/>
             </a:ln>
@@ -6959,7 +7255,7 @@
           <a:buFontTx/>
           <a:buNone/>
           <a:tabLst/>
-          <a:defRPr kumimoji="0" sz="1800" b="0" i="0" u="none" strike="noStrike" cap="none" spc="0" normalizeH="0" baseline="0">
+          <a:defRPr b="0" baseline="0" cap="none" i="0" spc="0" strike="noStrike" sz="1800" u="none" kumimoji="0" normalizeH="0">
             <a:ln>
               <a:noFill/>
             </a:ln>
@@ -6985,7 +7281,7 @@
           <a:buFontTx/>
           <a:buNone/>
           <a:tabLst/>
-          <a:defRPr kumimoji="0" sz="1800" b="0" i="0" u="none" strike="noStrike" cap="none" spc="0" normalizeH="0" baseline="0">
+          <a:defRPr b="0" baseline="0" cap="none" i="0" spc="0" strike="noStrike" sz="1800" u="none" kumimoji="0" normalizeH="0">
             <a:ln>
               <a:noFill/>
             </a:ln>
@@ -7011,7 +7307,7 @@
           <a:buFontTx/>
           <a:buNone/>
           <a:tabLst/>
-          <a:defRPr kumimoji="0" sz="1800" b="0" i="0" u="none" strike="noStrike" cap="none" spc="0" normalizeH="0" baseline="0">
+          <a:defRPr b="0" baseline="0" cap="none" i="0" spc="0" strike="noStrike" sz="1800" u="none" kumimoji="0" normalizeH="0">
             <a:ln>
               <a:noFill/>
             </a:ln>
@@ -7037,7 +7333,7 @@
           <a:buFontTx/>
           <a:buNone/>
           <a:tabLst/>
-          <a:defRPr kumimoji="0" sz="1800" b="0" i="0" u="none" strike="noStrike" cap="none" spc="0" normalizeH="0" baseline="0">
+          <a:defRPr b="0" baseline="0" cap="none" i="0" spc="0" strike="noStrike" sz="1800" u="none" kumimoji="0" normalizeH="0">
             <a:ln>
               <a:noFill/>
             </a:ln>
@@ -7063,7 +7359,7 @@
           <a:buFontTx/>
           <a:buNone/>
           <a:tabLst/>
-          <a:defRPr kumimoji="0" sz="1800" b="0" i="0" u="none" strike="noStrike" cap="none" spc="0" normalizeH="0" baseline="0">
+          <a:defRPr b="0" baseline="0" cap="none" i="0" spc="0" strike="noStrike" sz="1800" u="none" kumimoji="0" normalizeH="0">
             <a:ln>
               <a:noFill/>
             </a:ln>
@@ -7089,7 +7385,7 @@
           <a:buFontTx/>
           <a:buNone/>
           <a:tabLst/>
-          <a:defRPr kumimoji="0" sz="1800" b="0" i="0" u="none" strike="noStrike" cap="none" spc="0" normalizeH="0" baseline="0">
+          <a:defRPr b="0" baseline="0" cap="none" i="0" spc="0" strike="noStrike" sz="1800" u="none" kumimoji="0" normalizeH="0">
             <a:ln>
               <a:noFill/>
             </a:ln>
@@ -7115,7 +7411,7 @@
           <a:buFontTx/>
           <a:buNone/>
           <a:tabLst/>
-          <a:defRPr kumimoji="0" sz="1800" b="0" i="0" u="none" strike="noStrike" cap="none" spc="0" normalizeH="0" baseline="0">
+          <a:defRPr b="0" baseline="0" cap="none" i="0" spc="0" strike="noStrike" sz="1800" u="none" kumimoji="0" normalizeH="0">
             <a:ln>
               <a:noFill/>
             </a:ln>
@@ -7128,15 +7424,9 @@
         </a:lvl9pPr>
       </a:lstStyle>
       <a:style>
-        <a:lnRef idx="0">
-          <a:scrgbClr r="0" g="0" b="0"/>
-        </a:lnRef>
-        <a:fillRef idx="0">
-          <a:scrgbClr r="0" g="0" b="0"/>
-        </a:fillRef>
-        <a:effectRef idx="0">
-          <a:scrgbClr r="0" g="0" b="0"/>
-        </a:effectRef>
+        <a:lnRef idx="0"/>
+        <a:fillRef idx="0"/>
+        <a:effectRef idx="0"/>
         <a:fontRef idx="none"/>
       </a:style>
     </a:spDef>
@@ -7151,14 +7441,14 @@
           <a:bevel/>
         </a:ln>
         <a:effectLst>
-          <a:outerShdw blurRad="38100" dist="20000" dir="5400000" rotWithShape="0">
+          <a:outerShdw sx="100000" sy="100000" kx="0" ky="0" algn="b" rotWithShape="0" blurRad="38100" dist="23000" dir="5400000">
             <a:srgbClr val="000000">
-              <a:alpha val="38000"/>
+              <a:alpha val="35000"/>
             </a:srgbClr>
           </a:outerShdw>
         </a:effectLst>
       </a:spPr>
-      <a:bodyPr rot="0" spcFirstLastPara="1" vertOverflow="overflow" horzOverflow="overflow" vert="horz" wrap="square" lIns="91439" tIns="45719" rIns="91439" bIns="45719" numCol="1" spcCol="38100" rtlCol="0" anchor="t">
+      <a:bodyPr rot="0" spcFirstLastPara="1" vertOverflow="overflow" horzOverflow="overflow" vert="horz" wrap="square" lIns="91439" tIns="45719" rIns="91439" bIns="45719" numCol="1" spcCol="38100" rtlCol="0" anchor="t" upright="0">
         <a:noAutofit/>
       </a:bodyPr>
       <a:lstStyle>
@@ -7177,7 +7467,7 @@
           <a:buFontTx/>
           <a:buNone/>
           <a:tabLst/>
-          <a:defRPr kumimoji="0" sz="1800" b="0" i="0" u="none" strike="noStrike" cap="none" spc="0" normalizeH="0" baseline="0">
+          <a:defRPr b="0" baseline="0" cap="none" i="0" spc="0" strike="noStrike" sz="1800" u="none" kumimoji="0" normalizeH="0">
             <a:ln>
               <a:noFill/>
             </a:ln>
@@ -7203,7 +7493,7 @@
           <a:buFontTx/>
           <a:buNone/>
           <a:tabLst/>
-          <a:defRPr kumimoji="0" sz="1800" b="0" i="0" u="none" strike="noStrike" cap="none" spc="0" normalizeH="0" baseline="0">
+          <a:defRPr b="0" baseline="0" cap="none" i="0" spc="0" strike="noStrike" sz="1800" u="none" kumimoji="0" normalizeH="0">
             <a:ln>
               <a:noFill/>
             </a:ln>
@@ -7229,7 +7519,7 @@
           <a:buFontTx/>
           <a:buNone/>
           <a:tabLst/>
-          <a:defRPr kumimoji="0" sz="1800" b="0" i="0" u="none" strike="noStrike" cap="none" spc="0" normalizeH="0" baseline="0">
+          <a:defRPr b="0" baseline="0" cap="none" i="0" spc="0" strike="noStrike" sz="1800" u="none" kumimoji="0" normalizeH="0">
             <a:ln>
               <a:noFill/>
             </a:ln>
@@ -7255,7 +7545,7 @@
           <a:buFontTx/>
           <a:buNone/>
           <a:tabLst/>
-          <a:defRPr kumimoji="0" sz="1800" b="0" i="0" u="none" strike="noStrike" cap="none" spc="0" normalizeH="0" baseline="0">
+          <a:defRPr b="0" baseline="0" cap="none" i="0" spc="0" strike="noStrike" sz="1800" u="none" kumimoji="0" normalizeH="0">
             <a:ln>
               <a:noFill/>
             </a:ln>
@@ -7281,7 +7571,7 @@
           <a:buFontTx/>
           <a:buNone/>
           <a:tabLst/>
-          <a:defRPr kumimoji="0" sz="1800" b="0" i="0" u="none" strike="noStrike" cap="none" spc="0" normalizeH="0" baseline="0">
+          <a:defRPr b="0" baseline="0" cap="none" i="0" spc="0" strike="noStrike" sz="1800" u="none" kumimoji="0" normalizeH="0">
             <a:ln>
               <a:noFill/>
             </a:ln>
@@ -7307,7 +7597,7 @@
           <a:buFontTx/>
           <a:buNone/>
           <a:tabLst/>
-          <a:defRPr kumimoji="0" sz="1800" b="0" i="0" u="none" strike="noStrike" cap="none" spc="0" normalizeH="0" baseline="0">
+          <a:defRPr b="0" baseline="0" cap="none" i="0" spc="0" strike="noStrike" sz="1800" u="none" kumimoji="0" normalizeH="0">
             <a:ln>
               <a:noFill/>
             </a:ln>
@@ -7333,7 +7623,7 @@
           <a:buFontTx/>
           <a:buNone/>
           <a:tabLst/>
-          <a:defRPr kumimoji="0" sz="1800" b="0" i="0" u="none" strike="noStrike" cap="none" spc="0" normalizeH="0" baseline="0">
+          <a:defRPr b="0" baseline="0" cap="none" i="0" spc="0" strike="noStrike" sz="1800" u="none" kumimoji="0" normalizeH="0">
             <a:ln>
               <a:noFill/>
             </a:ln>
@@ -7359,7 +7649,7 @@
           <a:buFontTx/>
           <a:buNone/>
           <a:tabLst/>
-          <a:defRPr kumimoji="0" sz="1800" b="0" i="0" u="none" strike="noStrike" cap="none" spc="0" normalizeH="0" baseline="0">
+          <a:defRPr b="0" baseline="0" cap="none" i="0" spc="0" strike="noStrike" sz="1800" u="none" kumimoji="0" normalizeH="0">
             <a:ln>
               <a:noFill/>
             </a:ln>
@@ -7385,7 +7675,7 @@
           <a:buFontTx/>
           <a:buNone/>
           <a:tabLst/>
-          <a:defRPr kumimoji="0" sz="1800" b="0" i="0" u="none" strike="noStrike" cap="none" spc="0" normalizeH="0" baseline="0">
+          <a:defRPr b="0" baseline="0" cap="none" i="0" spc="0" strike="noStrike" sz="1800" u="none" kumimoji="0" normalizeH="0">
             <a:ln>
               <a:noFill/>
             </a:ln>
@@ -7411,7 +7701,7 @@
           <a:buFontTx/>
           <a:buNone/>
           <a:tabLst/>
-          <a:defRPr kumimoji="0" sz="1800" b="0" i="0" u="none" strike="noStrike" cap="none" spc="0" normalizeH="0" baseline="0">
+          <a:defRPr b="0" baseline="0" cap="none" i="0" spc="0" strike="noStrike" sz="1800" u="none" kumimoji="0" normalizeH="0">
             <a:ln>
               <a:noFill/>
             </a:ln>
@@ -7424,15 +7714,9 @@
         </a:lvl9pPr>
       </a:lstStyle>
       <a:style>
-        <a:lnRef idx="0">
-          <a:scrgbClr r="0" g="0" b="0"/>
-        </a:lnRef>
-        <a:fillRef idx="0">
-          <a:scrgbClr r="0" g="0" b="0"/>
-        </a:fillRef>
-        <a:effectRef idx="0">
-          <a:scrgbClr r="0" g="0" b="0"/>
-        </a:effectRef>
+        <a:lnRef idx="0"/>
+        <a:fillRef idx="0"/>
+        <a:effectRef idx="0"/>
         <a:fontRef idx="none"/>
       </a:style>
     </a:lnDef>
@@ -7445,7 +7729,7 @@
         </a:ln>
         <a:effectLst/>
       </a:spPr>
-      <a:bodyPr rot="0" spcFirstLastPara="1" vertOverflow="overflow" horzOverflow="overflow" vert="horz" wrap="square" lIns="45719" tIns="45719" rIns="45719" bIns="45719" numCol="1" spcCol="38100" rtlCol="0" anchor="t">
+      <a:bodyPr rot="0" spcFirstLastPara="1" vertOverflow="overflow" horzOverflow="overflow" vert="horz" wrap="square" lIns="45718" tIns="45718" rIns="45718" bIns="45718" numCol="1" spcCol="38100" rtlCol="0" anchor="t" upright="0">
         <a:spAutoFit/>
       </a:bodyPr>
       <a:lstStyle>
@@ -7464,7 +7748,7 @@
           <a:buFontTx/>
           <a:buNone/>
           <a:tabLst/>
-          <a:defRPr kumimoji="0" sz="1800" b="0" i="0" u="none" strike="noStrike" cap="none" spc="0" normalizeH="0" baseline="0">
+          <a:defRPr b="0" baseline="0" cap="none" i="0" spc="0" strike="noStrike" sz="1800" u="none" kumimoji="0" normalizeH="0">
             <a:ln>
               <a:noFill/>
             </a:ln>
@@ -7473,10 +7757,10 @@
             </a:solidFill>
             <a:effectLst/>
             <a:uFillTx/>
-            <a:latin typeface="Calibri"/>
-            <a:ea typeface="Calibri"/>
-            <a:cs typeface="Calibri"/>
-            <a:sym typeface="Calibri"/>
+            <a:latin typeface="+mj-lt"/>
+            <a:ea typeface="+mj-ea"/>
+            <a:cs typeface="+mj-cs"/>
+            <a:sym typeface="Helvetica"/>
           </a:defRPr>
         </a:defPPr>
         <a:lvl1pPr marL="0" marR="0" indent="0" algn="l" defTabSz="914400" rtl="0" fontAlgn="auto" latinLnBrk="1" hangingPunct="0">
@@ -7494,7 +7778,7 @@
           <a:buFontTx/>
           <a:buNone/>
           <a:tabLst/>
-          <a:defRPr kumimoji="0" sz="1800" b="0" i="0" u="none" strike="noStrike" cap="none" spc="0" normalizeH="0" baseline="0">
+          <a:defRPr b="0" baseline="0" cap="none" i="0" spc="0" strike="noStrike" sz="1800" u="none" kumimoji="0" normalizeH="0">
             <a:ln>
               <a:noFill/>
             </a:ln>
@@ -7520,7 +7804,7 @@
           <a:buFontTx/>
           <a:buNone/>
           <a:tabLst/>
-          <a:defRPr kumimoji="0" sz="1800" b="0" i="0" u="none" strike="noStrike" cap="none" spc="0" normalizeH="0" baseline="0">
+          <a:defRPr b="0" baseline="0" cap="none" i="0" spc="0" strike="noStrike" sz="1800" u="none" kumimoji="0" normalizeH="0">
             <a:ln>
               <a:noFill/>
             </a:ln>
@@ -7546,7 +7830,7 @@
           <a:buFontTx/>
           <a:buNone/>
           <a:tabLst/>
-          <a:defRPr kumimoji="0" sz="1800" b="0" i="0" u="none" strike="noStrike" cap="none" spc="0" normalizeH="0" baseline="0">
+          <a:defRPr b="0" baseline="0" cap="none" i="0" spc="0" strike="noStrike" sz="1800" u="none" kumimoji="0" normalizeH="0">
             <a:ln>
               <a:noFill/>
             </a:ln>
@@ -7572,7 +7856,7 @@
           <a:buFontTx/>
           <a:buNone/>
           <a:tabLst/>
-          <a:defRPr kumimoji="0" sz="1800" b="0" i="0" u="none" strike="noStrike" cap="none" spc="0" normalizeH="0" baseline="0">
+          <a:defRPr b="0" baseline="0" cap="none" i="0" spc="0" strike="noStrike" sz="1800" u="none" kumimoji="0" normalizeH="0">
             <a:ln>
               <a:noFill/>
             </a:ln>
@@ -7598,7 +7882,7 @@
           <a:buFontTx/>
           <a:buNone/>
           <a:tabLst/>
-          <a:defRPr kumimoji="0" sz="1800" b="0" i="0" u="none" strike="noStrike" cap="none" spc="0" normalizeH="0" baseline="0">
+          <a:defRPr b="0" baseline="0" cap="none" i="0" spc="0" strike="noStrike" sz="1800" u="none" kumimoji="0" normalizeH="0">
             <a:ln>
               <a:noFill/>
             </a:ln>
@@ -7624,7 +7908,7 @@
           <a:buFontTx/>
           <a:buNone/>
           <a:tabLst/>
-          <a:defRPr kumimoji="0" sz="1800" b="0" i="0" u="none" strike="noStrike" cap="none" spc="0" normalizeH="0" baseline="0">
+          <a:defRPr b="0" baseline="0" cap="none" i="0" spc="0" strike="noStrike" sz="1800" u="none" kumimoji="0" normalizeH="0">
             <a:ln>
               <a:noFill/>
             </a:ln>
@@ -7650,7 +7934,7 @@
           <a:buFontTx/>
           <a:buNone/>
           <a:tabLst/>
-          <a:defRPr kumimoji="0" sz="1800" b="0" i="0" u="none" strike="noStrike" cap="none" spc="0" normalizeH="0" baseline="0">
+          <a:defRPr b="0" baseline="0" cap="none" i="0" spc="0" strike="noStrike" sz="1800" u="none" kumimoji="0" normalizeH="0">
             <a:ln>
               <a:noFill/>
             </a:ln>
@@ -7676,7 +7960,7 @@
           <a:buFontTx/>
           <a:buNone/>
           <a:tabLst/>
-          <a:defRPr kumimoji="0" sz="1800" b="0" i="0" u="none" strike="noStrike" cap="none" spc="0" normalizeH="0" baseline="0">
+          <a:defRPr b="0" baseline="0" cap="none" i="0" spc="0" strike="noStrike" sz="1800" u="none" kumimoji="0" normalizeH="0">
             <a:ln>
               <a:noFill/>
             </a:ln>
@@ -7702,7 +7986,7 @@
           <a:buFontTx/>
           <a:buNone/>
           <a:tabLst/>
-          <a:defRPr kumimoji="0" sz="1800" b="0" i="0" u="none" strike="noStrike" cap="none" spc="0" normalizeH="0" baseline="0">
+          <a:defRPr b="0" baseline="0" cap="none" i="0" spc="0" strike="noStrike" sz="1800" u="none" kumimoji="0" normalizeH="0">
             <a:ln>
               <a:noFill/>
             </a:ln>
@@ -7715,19 +7999,12 @@
         </a:lvl9pPr>
       </a:lstStyle>
       <a:style>
-        <a:lnRef idx="0">
-          <a:scrgbClr r="0" g="0" b="0"/>
-        </a:lnRef>
-        <a:fillRef idx="0">
-          <a:scrgbClr r="0" g="0" b="0"/>
-        </a:fillRef>
-        <a:effectRef idx="0">
-          <a:scrgbClr r="0" g="0" b="0"/>
-        </a:effectRef>
+        <a:lnRef idx="0"/>
+        <a:fillRef idx="0"/>
+        <a:effectRef idx="0"/>
         <a:fontRef idx="none"/>
       </a:style>
     </a:txDef>
   </a:objectDefaults>
-  <a:extraClrSchemeLst/>
 </a:theme>
 </file>
</xml_diff>